<commit_message>
- Add Doc and Testing code
</commit_message>
<xml_diff>
--- a/SD_Crawler4j/docs/Crawler4j_Introduction.pptx
+++ b/SD_Crawler4j/docs/Crawler4j_Introduction.pptx
@@ -3104,6 +3104,13 @@
   <p:clrMapOvr>
     <a:masterClrMapping/>
   </p:clrMapOvr>
+  <p:timing>
+    <p:tnLst>
+      <p:par>
+        <p:cTn id="1" dur="indefinite" restart="never" nodeType="tmRoot"/>
+      </p:par>
+    </p:tnLst>
+  </p:timing>
 </p:sld>
 </file>
 
@@ -3136,10 +3143,16 @@
         </p:nvSpPr>
         <p:spPr/>
         <p:txBody>
-          <a:bodyPr/>
-          <a:lstStyle/>
-          <a:p>
-            <a:endParaRPr lang="zh-TW" altLang="en-US"/>
+          <a:bodyPr>
+            <a:normAutofit/>
+          </a:bodyPr>
+          <a:lstStyle/>
+          <a:p>
+            <a:r>
+              <a:rPr lang="en-US" altLang="zh-TW" sz="3200" b="1" dirty="0" smtClean="0"/>
+              <a:t>Hello Word’s Sample Usage</a:t>
+            </a:r>
+            <a:endParaRPr lang="zh-TW" altLang="en-US" sz="3200" dirty="0"/>
           </a:p>
         </p:txBody>
       </p:sp>
@@ -3153,15 +3166,571 @@
             <p:ph idx="1"/>
           </p:nvPr>
         </p:nvSpPr>
-        <p:spPr/>
-        <p:txBody>
-          <a:bodyPr/>
-          <a:lstStyle/>
-          <a:p>
-            <a:endParaRPr lang="zh-TW" altLang="en-US"/>
-          </a:p>
-        </p:txBody>
-      </p:sp>
+        <p:spPr>
+          <a:xfrm>
+            <a:off x="457200" y="1412776"/>
+            <a:ext cx="8229600" cy="4713387"/>
+          </a:xfrm>
+        </p:spPr>
+        <p:txBody>
+          <a:bodyPr>
+            <a:normAutofit/>
+          </a:bodyPr>
+          <a:lstStyle/>
+          <a:p>
+            <a:r>
+              <a:rPr lang="en-US" altLang="zh-TW" sz="1800" dirty="0" smtClean="0"/>
+              <a:t>In the beginning, let’s check class diagram of what we will use later:</a:t>
+            </a:r>
+            <a:endParaRPr lang="zh-TW" altLang="en-US" sz="1800" dirty="0"/>
+          </a:p>
+        </p:txBody>
+      </p:sp>
+      <p:pic>
+        <p:nvPicPr>
+          <p:cNvPr id="4" name="圖片 3"/>
+          <p:cNvPicPr>
+            <a:picLocks noChangeAspect="1"/>
+          </p:cNvPicPr>
+          <p:nvPr/>
+        </p:nvPicPr>
+        <p:blipFill>
+          <a:blip r:embed="rId2">
+            <a:extLst>
+              <a:ext uri="{28A0092B-C50C-407E-A947-70E740481C1C}">
+                <a14:useLocalDpi xmlns:a14="http://schemas.microsoft.com/office/drawing/2010/main" val="0"/>
+              </a:ext>
+            </a:extLst>
+          </a:blip>
+          <a:stretch>
+            <a:fillRect/>
+          </a:stretch>
+        </p:blipFill>
+        <p:spPr>
+          <a:xfrm>
+            <a:off x="683568" y="1844824"/>
+            <a:ext cx="7719572" cy="4104456"/>
+          </a:xfrm>
+          <a:prstGeom prst="rect">
+            <a:avLst/>
+          </a:prstGeom>
+        </p:spPr>
+      </p:pic>
+      <p:sp>
+        <p:nvSpPr>
+          <p:cNvPr id="5" name="文字方塊 4"/>
+          <p:cNvSpPr txBox="1"/>
+          <p:nvPr/>
+        </p:nvSpPr>
+        <p:spPr>
+          <a:xfrm>
+            <a:off x="1475656" y="2564904"/>
+            <a:ext cx="1810624" cy="338554"/>
+          </a:xfrm>
+          <a:prstGeom prst="rect">
+            <a:avLst/>
+          </a:prstGeom>
+          <a:noFill/>
+        </p:spPr>
+        <p:txBody>
+          <a:bodyPr wrap="none" rtlCol="0">
+            <a:spAutoFit/>
+          </a:bodyPr>
+          <a:lstStyle/>
+          <a:p>
+            <a:r>
+              <a:rPr lang="en-US" altLang="zh-TW" sz="1600" b="1" dirty="0">
+                <a:solidFill>
+                  <a:srgbClr val="7030A0"/>
+                </a:solidFill>
+              </a:rPr>
+              <a:t>j</a:t>
+            </a:r>
+            <a:r>
+              <a:rPr lang="en-US" altLang="zh-TW" sz="1600" b="1" dirty="0" smtClean="0">
+                <a:solidFill>
+                  <a:srgbClr val="7030A0"/>
+                </a:solidFill>
+              </a:rPr>
+              <a:t>ava.lang.Runnable</a:t>
+            </a:r>
+            <a:endParaRPr lang="zh-TW" altLang="en-US" sz="1600" b="1" dirty="0">
+              <a:solidFill>
+                <a:srgbClr val="7030A0"/>
+              </a:solidFill>
+            </a:endParaRPr>
+          </a:p>
+        </p:txBody>
+      </p:sp>
+      <p:grpSp>
+        <p:nvGrpSpPr>
+          <p:cNvPr id="11" name="群組 10"/>
+          <p:cNvGrpSpPr/>
+          <p:nvPr/>
+        </p:nvGrpSpPr>
+        <p:grpSpPr>
+          <a:xfrm>
+            <a:off x="654224" y="3212976"/>
+            <a:ext cx="5544616" cy="1889051"/>
+            <a:chOff x="654224" y="3212976"/>
+            <a:chExt cx="5544616" cy="1889051"/>
+          </a:xfrm>
+        </p:grpSpPr>
+        <p:sp>
+          <p:nvSpPr>
+            <p:cNvPr id="6" name="文字方塊 5"/>
+            <p:cNvSpPr txBox="1"/>
+            <p:nvPr/>
+          </p:nvSpPr>
+          <p:spPr>
+            <a:xfrm>
+              <a:off x="654224" y="3717032"/>
+              <a:ext cx="5544616" cy="1384995"/>
+            </a:xfrm>
+            <a:prstGeom prst="rect">
+              <a:avLst/>
+            </a:prstGeom>
+            <a:solidFill>
+              <a:schemeClr val="accent5">
+                <a:lumMod val="40000"/>
+                <a:lumOff val="60000"/>
+              </a:schemeClr>
+            </a:solidFill>
+            <a:ln>
+              <a:solidFill>
+                <a:srgbClr val="002060"/>
+              </a:solidFill>
+            </a:ln>
+          </p:spPr>
+          <p:txBody>
+            <a:bodyPr wrap="square" rtlCol="0">
+              <a:spAutoFit/>
+            </a:bodyPr>
+            <a:lstStyle/>
+            <a:p>
+              <a:pPr marL="285750" indent="-285750">
+                <a:buFont typeface="Arial" panose="020B0604020202020204" pitchFamily="34" charset="0"/>
+                <a:buChar char="•"/>
+              </a:pPr>
+              <a:r>
+                <a:rPr lang="en-US" altLang="zh-TW" sz="1400" dirty="0" smtClean="0"/>
+                <a:t>User can define crawling behavior via overwriting below two APIs:</a:t>
+              </a:r>
+            </a:p>
+            <a:p>
+              <a:pPr marL="742950" lvl="1" indent="-285750">
+                <a:buFont typeface="Arial" panose="020B0604020202020204" pitchFamily="34" charset="0"/>
+                <a:buChar char="•"/>
+              </a:pPr>
+              <a:r>
+                <a:rPr lang="en-US" altLang="zh-TW" sz="1400" dirty="0">
+                  <a:solidFill>
+                    <a:srgbClr val="0070C0"/>
+                  </a:solidFill>
+                </a:rPr>
+                <a:t>shouldVisit(WebURL url</a:t>
+              </a:r>
+              <a:r>
+                <a:rPr lang="en-US" altLang="zh-TW" sz="1400" dirty="0" smtClean="0">
+                  <a:solidFill>
+                    <a:srgbClr val="0070C0"/>
+                  </a:solidFill>
+                </a:rPr>
+                <a:t>)</a:t>
+              </a:r>
+              <a:r>
+                <a:rPr lang="en-US" altLang="zh-TW" sz="1400" dirty="0" smtClean="0"/>
+                <a:t>: Crawling or not.</a:t>
+              </a:r>
+            </a:p>
+            <a:p>
+              <a:pPr marL="742950" lvl="1" indent="-285750">
+                <a:buFont typeface="Arial" panose="020B0604020202020204" pitchFamily="34" charset="0"/>
+                <a:buChar char="•"/>
+              </a:pPr>
+              <a:r>
+                <a:rPr lang="en-US" altLang="zh-TW" sz="1400" dirty="0" smtClean="0">
+                  <a:solidFill>
+                    <a:srgbClr val="0070C0"/>
+                  </a:solidFill>
+                </a:rPr>
+                <a:t>visit(Page </a:t>
+              </a:r>
+              <a:r>
+                <a:rPr lang="en-US" altLang="zh-TW" sz="1400" dirty="0">
+                  <a:solidFill>
+                    <a:srgbClr val="0070C0"/>
+                  </a:solidFill>
+                </a:rPr>
+                <a:t>page</a:t>
+              </a:r>
+              <a:r>
+                <a:rPr lang="en-US" altLang="zh-TW" sz="1400" dirty="0" smtClean="0">
+                  <a:solidFill>
+                    <a:srgbClr val="0070C0"/>
+                  </a:solidFill>
+                </a:rPr>
+                <a:t>)</a:t>
+              </a:r>
+              <a:r>
+                <a:rPr lang="en-US" altLang="zh-TW" sz="1400" dirty="0" smtClean="0"/>
+                <a:t>: The Crawling result is stored in </a:t>
+              </a:r>
+              <a:r>
+                <a:rPr lang="en-US" altLang="zh-TW" sz="1400" i="1" dirty="0" smtClean="0"/>
+                <a:t>page</a:t>
+              </a:r>
+              <a:r>
+                <a:rPr lang="en-US" altLang="zh-TW" sz="1400" dirty="0" smtClean="0"/>
+                <a:t> object.</a:t>
+              </a:r>
+            </a:p>
+            <a:p>
+              <a:pPr marL="285750" indent="-285750">
+                <a:buFont typeface="Arial" panose="020B0604020202020204" pitchFamily="34" charset="0"/>
+                <a:buChar char="•"/>
+              </a:pPr>
+              <a:r>
+                <a:rPr lang="en-US" altLang="zh-TW" sz="1400" b="1" dirty="0" smtClean="0">
+                  <a:solidFill>
+                    <a:srgbClr val="002060"/>
+                  </a:solidFill>
+                </a:rPr>
+                <a:t>CrawlController</a:t>
+              </a:r>
+              <a:r>
+                <a:rPr lang="en-US" altLang="zh-TW" sz="1400" dirty="0" smtClean="0"/>
+                <a:t> will be responsible in initializing this class and run it as thread. The thread number can be configured.</a:t>
+              </a:r>
+            </a:p>
+            <a:p>
+              <a:pPr marL="285750" indent="-285750">
+                <a:buFont typeface="Arial" panose="020B0604020202020204" pitchFamily="34" charset="0"/>
+                <a:buChar char="•"/>
+              </a:pPr>
+              <a:r>
+                <a:rPr lang="en-US" altLang="zh-TW" sz="1400" dirty="0" smtClean="0"/>
+                <a:t>The crawling behavior is dedicated to class </a:t>
+              </a:r>
+              <a:r>
+                <a:rPr lang="en-US" altLang="zh-TW" sz="1400" b="1" dirty="0" smtClean="0">
+                  <a:solidFill>
+                    <a:srgbClr val="002060"/>
+                  </a:solidFill>
+                </a:rPr>
+                <a:t>PageFetcher</a:t>
+              </a:r>
+              <a:r>
+                <a:rPr lang="en-US" altLang="zh-TW" sz="1400" dirty="0" smtClean="0"/>
+                <a:t>. </a:t>
+              </a:r>
+              <a:endParaRPr lang="zh-TW" altLang="en-US" sz="1400" dirty="0"/>
+            </a:p>
+          </p:txBody>
+        </p:sp>
+        <p:sp>
+          <p:nvSpPr>
+            <p:cNvPr id="7" name="矩形 6"/>
+            <p:cNvSpPr/>
+            <p:nvPr/>
+          </p:nvSpPr>
+          <p:spPr>
+            <a:xfrm>
+              <a:off x="923924" y="3212976"/>
+              <a:ext cx="911771" cy="432048"/>
+            </a:xfrm>
+            <a:prstGeom prst="rect">
+              <a:avLst/>
+            </a:prstGeom>
+            <a:noFill/>
+            <a:ln>
+              <a:solidFill>
+                <a:srgbClr val="FF0000"/>
+              </a:solidFill>
+            </a:ln>
+          </p:spPr>
+          <p:style>
+            <a:lnRef idx="2">
+              <a:schemeClr val="accent1">
+                <a:shade val="50000"/>
+              </a:schemeClr>
+            </a:lnRef>
+            <a:fillRef idx="1">
+              <a:schemeClr val="accent1"/>
+            </a:fillRef>
+            <a:effectRef idx="0">
+              <a:schemeClr val="accent1"/>
+            </a:effectRef>
+            <a:fontRef idx="minor">
+              <a:schemeClr val="lt1"/>
+            </a:fontRef>
+          </p:style>
+          <p:txBody>
+            <a:bodyPr rtlCol="0" anchor="ctr"/>
+            <a:lstStyle/>
+            <a:p>
+              <a:pPr algn="ctr"/>
+              <a:endParaRPr lang="zh-TW" altLang="en-US"/>
+            </a:p>
+          </p:txBody>
+        </p:sp>
+      </p:grpSp>
+      <p:grpSp>
+        <p:nvGrpSpPr>
+          <p:cNvPr id="10" name="群組 9"/>
+          <p:cNvGrpSpPr/>
+          <p:nvPr/>
+        </p:nvGrpSpPr>
+        <p:grpSpPr>
+          <a:xfrm>
+            <a:off x="1835695" y="2162175"/>
+            <a:ext cx="7200801" cy="1913737"/>
+            <a:chOff x="1835695" y="2162175"/>
+            <a:chExt cx="7200801" cy="1913737"/>
+          </a:xfrm>
+        </p:grpSpPr>
+        <p:sp>
+          <p:nvSpPr>
+            <p:cNvPr id="8" name="矩形 7"/>
+            <p:cNvSpPr/>
+            <p:nvPr/>
+          </p:nvSpPr>
+          <p:spPr>
+            <a:xfrm>
+              <a:off x="7400924" y="2162175"/>
+              <a:ext cx="876301" cy="438150"/>
+            </a:xfrm>
+            <a:prstGeom prst="rect">
+              <a:avLst/>
+            </a:prstGeom>
+            <a:noFill/>
+            <a:ln>
+              <a:solidFill>
+                <a:srgbClr val="FF0000"/>
+              </a:solidFill>
+            </a:ln>
+          </p:spPr>
+          <p:style>
+            <a:lnRef idx="2">
+              <a:schemeClr val="accent1">
+                <a:shade val="50000"/>
+              </a:schemeClr>
+            </a:lnRef>
+            <a:fillRef idx="1">
+              <a:schemeClr val="accent1"/>
+            </a:fillRef>
+            <a:effectRef idx="0">
+              <a:schemeClr val="accent1"/>
+            </a:effectRef>
+            <a:fontRef idx="minor">
+              <a:schemeClr val="lt1"/>
+            </a:fontRef>
+          </p:style>
+          <p:txBody>
+            <a:bodyPr rtlCol="0" anchor="ctr"/>
+            <a:lstStyle/>
+            <a:p>
+              <a:pPr algn="ctr"/>
+              <a:endParaRPr lang="zh-TW" altLang="en-US"/>
+            </a:p>
+          </p:txBody>
+        </p:sp>
+        <p:sp>
+          <p:nvSpPr>
+            <p:cNvPr id="9" name="文字方塊 8"/>
+            <p:cNvSpPr txBox="1"/>
+            <p:nvPr/>
+          </p:nvSpPr>
+          <p:spPr>
+            <a:xfrm>
+              <a:off x="1835695" y="2690917"/>
+              <a:ext cx="7200801" cy="1384995"/>
+            </a:xfrm>
+            <a:prstGeom prst="rect">
+              <a:avLst/>
+            </a:prstGeom>
+            <a:solidFill>
+              <a:schemeClr val="accent5">
+                <a:lumMod val="40000"/>
+                <a:lumOff val="60000"/>
+              </a:schemeClr>
+            </a:solidFill>
+            <a:ln>
+              <a:solidFill>
+                <a:srgbClr val="002060"/>
+              </a:solidFill>
+            </a:ln>
+          </p:spPr>
+          <p:txBody>
+            <a:bodyPr wrap="square" rtlCol="0">
+              <a:spAutoFit/>
+            </a:bodyPr>
+            <a:lstStyle>
+              <a:defPPr>
+                <a:defRPr lang="zh-TW"/>
+              </a:defPPr>
+              <a:lvl1pPr marL="285750" indent="-285750">
+                <a:buFont typeface="Arial" panose="020B0604020202020204" pitchFamily="34" charset="0"/>
+                <a:buChar char="•"/>
+                <a:defRPr sz="1400"/>
+              </a:lvl1pPr>
+              <a:lvl2pPr marL="742950" lvl="1" indent="-285750">
+                <a:buFont typeface="Arial" panose="020B0604020202020204" pitchFamily="34" charset="0"/>
+                <a:buChar char="•"/>
+                <a:defRPr sz="1400">
+                  <a:solidFill>
+                    <a:srgbClr val="0070C0"/>
+                  </a:solidFill>
+                </a:defRPr>
+              </a:lvl2pPr>
+            </a:lstStyle>
+            <a:p>
+              <a:r>
+                <a:rPr lang="en-US" altLang="zh-TW" dirty="0"/>
+                <a:t>This class hold crawling </a:t>
+              </a:r>
+              <a:r>
+                <a:rPr lang="en-US" altLang="zh-TW" dirty="0" smtClean="0"/>
+                <a:t>configuration</a:t>
+              </a:r>
+              <a:r>
+                <a:rPr lang="en-US" altLang="zh-TW" dirty="0"/>
+                <a:t>:</a:t>
+              </a:r>
+              <a:endParaRPr lang="en-US" altLang="zh-TW" dirty="0" smtClean="0"/>
+            </a:p>
+            <a:p>
+              <a:pPr lvl="1">
+                <a:buFont typeface="Wingdings" panose="05000000000000000000" pitchFamily="2" charset="2"/>
+                <a:buChar char="Ø"/>
+              </a:pPr>
+              <a:r>
+                <a:rPr lang="en-US" altLang="zh-TW" dirty="0" smtClean="0"/>
+                <a:t>setCrawlStorageFolder(String): </a:t>
+              </a:r>
+              <a:r>
+                <a:rPr lang="en-US" altLang="zh-TW" dirty="0" smtClean="0">
+                  <a:solidFill>
+                    <a:schemeClr val="tx1"/>
+                  </a:solidFill>
+                </a:rPr>
+                <a:t>Crawling </a:t>
+              </a:r>
+              <a:r>
+                <a:rPr lang="en-US" altLang="zh-TW" dirty="0">
+                  <a:solidFill>
+                    <a:schemeClr val="tx1"/>
+                  </a:solidFill>
+                </a:rPr>
+                <a:t>Storage </a:t>
+              </a:r>
+              <a:r>
+                <a:rPr lang="en-US" altLang="zh-TW" dirty="0" smtClean="0">
+                  <a:solidFill>
+                    <a:schemeClr val="tx1"/>
+                  </a:solidFill>
+                </a:rPr>
+                <a:t>Folder.</a:t>
+              </a:r>
+            </a:p>
+            <a:p>
+              <a:pPr lvl="1">
+                <a:buFont typeface="Wingdings" panose="05000000000000000000" pitchFamily="2" charset="2"/>
+                <a:buChar char="Ø"/>
+              </a:pPr>
+              <a:r>
+                <a:rPr lang="en-US" altLang="zh-TW" dirty="0" smtClean="0"/>
+                <a:t>setPolitenessDelay(</a:t>
+              </a:r>
+              <a:r>
+                <a:rPr lang="en-US" altLang="zh-TW" dirty="0" err="1" smtClean="0"/>
+                <a:t>int</a:t>
+              </a:r>
+              <a:r>
+                <a:rPr lang="en-US" altLang="zh-TW" dirty="0" smtClean="0"/>
+                <a:t>): </a:t>
+              </a:r>
+              <a:r>
+                <a:rPr lang="en-US" altLang="zh-TW" dirty="0">
+                  <a:solidFill>
+                    <a:schemeClr val="tx1"/>
+                  </a:solidFill>
+                </a:rPr>
+                <a:t>Make sure that we don't send more than 1 request </a:t>
+              </a:r>
+              <a:r>
+                <a:rPr lang="en-US" altLang="zh-TW" dirty="0" smtClean="0">
+                  <a:solidFill>
+                    <a:schemeClr val="tx1"/>
+                  </a:solidFill>
+                </a:rPr>
+                <a:t>per setting</a:t>
+              </a:r>
+            </a:p>
+            <a:p>
+              <a:pPr lvl="1">
+                <a:buFont typeface="Wingdings" panose="05000000000000000000" pitchFamily="2" charset="2"/>
+                <a:buChar char="Ø"/>
+              </a:pPr>
+              <a:r>
+                <a:rPr lang="en-US" altLang="zh-TW" dirty="0" smtClean="0"/>
+                <a:t>setMaxPagesToFetch(int): </a:t>
+              </a:r>
+              <a:r>
+                <a:rPr lang="en-US" altLang="zh-TW" dirty="0">
+                  <a:solidFill>
+                    <a:schemeClr val="tx1"/>
+                  </a:solidFill>
+                </a:rPr>
+                <a:t>Set </a:t>
+              </a:r>
+              <a:r>
+                <a:rPr lang="en-US" altLang="zh-TW" dirty="0">
+                  <a:solidFill>
+                    <a:schemeClr val="tx1"/>
+                  </a:solidFill>
+                </a:rPr>
+                <a:t>the maximum number of pages to crawl</a:t>
+              </a:r>
+              <a:r>
+                <a:rPr lang="en-US" altLang="zh-TW" dirty="0" smtClean="0">
+                  <a:solidFill>
+                    <a:schemeClr val="tx1"/>
+                  </a:solidFill>
+                </a:rPr>
+                <a:t>.</a:t>
+              </a:r>
+            </a:p>
+            <a:p>
+              <a:pPr lvl="1">
+                <a:buFont typeface="Wingdings" panose="05000000000000000000" pitchFamily="2" charset="2"/>
+                <a:buChar char="Ø"/>
+              </a:pPr>
+              <a:r>
+                <a:rPr lang="en-US" altLang="zh-TW" dirty="0" smtClean="0"/>
+                <a:t>setMaxDepthOfCrawling(int): </a:t>
+              </a:r>
+              <a:r>
+                <a:rPr lang="en-US" altLang="zh-TW" dirty="0">
+                  <a:solidFill>
+                    <a:schemeClr val="tx1"/>
+                  </a:solidFill>
+                </a:rPr>
+                <a:t>Maximum depth of crawling</a:t>
+              </a:r>
+            </a:p>
+            <a:p>
+              <a:r>
+                <a:rPr lang="en-US" altLang="zh-TW" dirty="0" smtClean="0">
+                  <a:hlinkClick r:id="rId3"/>
+                </a:rPr>
+                <a:t>More</a:t>
+              </a:r>
+              <a:endParaRPr lang="zh-TW" altLang="en-US" dirty="0"/>
+            </a:p>
+          </p:txBody>
+        </p:sp>
+      </p:grpSp>
     </p:spTree>
     <p:extLst>
       <p:ext uri="{BB962C8B-B14F-4D97-AF65-F5344CB8AC3E}">
@@ -3172,6 +3741,177 @@
   <p:clrMapOvr>
     <a:masterClrMapping/>
   </p:clrMapOvr>
+  <p:timing>
+    <p:tnLst>
+      <p:par>
+        <p:cTn id="1" dur="indefinite" restart="never" nodeType="tmRoot">
+          <p:childTnLst>
+            <p:seq concurrent="1" nextAc="seek">
+              <p:cTn id="2" dur="indefinite" nodeType="mainSeq">
+                <p:childTnLst>
+                  <p:par>
+                    <p:cTn id="3" fill="hold">
+                      <p:stCondLst>
+                        <p:cond delay="indefinite"/>
+                      </p:stCondLst>
+                      <p:childTnLst>
+                        <p:par>
+                          <p:cTn id="4" fill="hold">
+                            <p:stCondLst>
+                              <p:cond delay="0"/>
+                            </p:stCondLst>
+                            <p:childTnLst>
+                              <p:par>
+                                <p:cTn id="5" presetID="10" presetClass="entr" presetSubtype="0" fill="hold" nodeType="clickEffect">
+                                  <p:stCondLst>
+                                    <p:cond delay="0"/>
+                                  </p:stCondLst>
+                                  <p:childTnLst>
+                                    <p:set>
+                                      <p:cBhvr>
+                                        <p:cTn id="6" dur="1" fill="hold">
+                                          <p:stCondLst>
+                                            <p:cond delay="0"/>
+                                          </p:stCondLst>
+                                        </p:cTn>
+                                        <p:tgtEl>
+                                          <p:spTgt spid="11"/>
+                                        </p:tgtEl>
+                                        <p:attrNameLst>
+                                          <p:attrName>style.visibility</p:attrName>
+                                        </p:attrNameLst>
+                                      </p:cBhvr>
+                                      <p:to>
+                                        <p:strVal val="visible"/>
+                                      </p:to>
+                                    </p:set>
+                                    <p:animEffect transition="in" filter="fade">
+                                      <p:cBhvr>
+                                        <p:cTn id="7" dur="500"/>
+                                        <p:tgtEl>
+                                          <p:spTgt spid="11"/>
+                                        </p:tgtEl>
+                                      </p:cBhvr>
+                                    </p:animEffect>
+                                  </p:childTnLst>
+                                </p:cTn>
+                              </p:par>
+                            </p:childTnLst>
+                          </p:cTn>
+                        </p:par>
+                      </p:childTnLst>
+                    </p:cTn>
+                  </p:par>
+                  <p:par>
+                    <p:cTn id="8" fill="hold">
+                      <p:stCondLst>
+                        <p:cond delay="indefinite"/>
+                      </p:stCondLst>
+                      <p:childTnLst>
+                        <p:par>
+                          <p:cTn id="9" fill="hold">
+                            <p:stCondLst>
+                              <p:cond delay="0"/>
+                            </p:stCondLst>
+                            <p:childTnLst>
+                              <p:par>
+                                <p:cTn id="10" presetID="10" presetClass="exit" presetSubtype="0" fill="hold" nodeType="clickEffect">
+                                  <p:stCondLst>
+                                    <p:cond delay="0"/>
+                                  </p:stCondLst>
+                                  <p:childTnLst>
+                                    <p:animEffect transition="out" filter="fade">
+                                      <p:cBhvr>
+                                        <p:cTn id="11" dur="500"/>
+                                        <p:tgtEl>
+                                          <p:spTgt spid="11"/>
+                                        </p:tgtEl>
+                                      </p:cBhvr>
+                                    </p:animEffect>
+                                    <p:set>
+                                      <p:cBhvr>
+                                        <p:cTn id="12" dur="1" fill="hold">
+                                          <p:stCondLst>
+                                            <p:cond delay="499"/>
+                                          </p:stCondLst>
+                                        </p:cTn>
+                                        <p:tgtEl>
+                                          <p:spTgt spid="11"/>
+                                        </p:tgtEl>
+                                        <p:attrNameLst>
+                                          <p:attrName>style.visibility</p:attrName>
+                                        </p:attrNameLst>
+                                      </p:cBhvr>
+                                      <p:to>
+                                        <p:strVal val="hidden"/>
+                                      </p:to>
+                                    </p:set>
+                                  </p:childTnLst>
+                                </p:cTn>
+                              </p:par>
+                              <p:par>
+                                <p:cTn id="13" presetID="10" presetClass="entr" presetSubtype="0" fill="hold" nodeType="withEffect">
+                                  <p:stCondLst>
+                                    <p:cond delay="0"/>
+                                  </p:stCondLst>
+                                  <p:childTnLst>
+                                    <p:set>
+                                      <p:cBhvr>
+                                        <p:cTn id="14" dur="1" fill="hold">
+                                          <p:stCondLst>
+                                            <p:cond delay="0"/>
+                                          </p:stCondLst>
+                                        </p:cTn>
+                                        <p:tgtEl>
+                                          <p:spTgt spid="10"/>
+                                        </p:tgtEl>
+                                        <p:attrNameLst>
+                                          <p:attrName>style.visibility</p:attrName>
+                                        </p:attrNameLst>
+                                      </p:cBhvr>
+                                      <p:to>
+                                        <p:strVal val="visible"/>
+                                      </p:to>
+                                    </p:set>
+                                    <p:animEffect transition="in" filter="fade">
+                                      <p:cBhvr>
+                                        <p:cTn id="15" dur="500"/>
+                                        <p:tgtEl>
+                                          <p:spTgt spid="10"/>
+                                        </p:tgtEl>
+                                      </p:cBhvr>
+                                    </p:animEffect>
+                                  </p:childTnLst>
+                                </p:cTn>
+                              </p:par>
+                            </p:childTnLst>
+                          </p:cTn>
+                        </p:par>
+                      </p:childTnLst>
+                    </p:cTn>
+                  </p:par>
+                </p:childTnLst>
+              </p:cTn>
+              <p:prevCondLst>
+                <p:cond evt="onPrev" delay="0">
+                  <p:tgtEl>
+                    <p:sldTgt/>
+                  </p:tgtEl>
+                </p:cond>
+              </p:prevCondLst>
+              <p:nextCondLst>
+                <p:cond evt="onNext" delay="0">
+                  <p:tgtEl>
+                    <p:sldTgt/>
+                  </p:tgtEl>
+                </p:cond>
+              </p:nextCondLst>
+            </p:seq>
+          </p:childTnLst>
+        </p:cTn>
+      </p:par>
+    </p:tnLst>
+  </p:timing>
 </p:sld>
 </file>
 

</xml_diff>

<commit_message>
- Update Introduction Document - Enhance to support <script src> tag download
</commit_message>
<xml_diff>
--- a/SD_Crawler4j/docs/Crawler4j_Introduction.pptx
+++ b/SD_Crawler4j/docs/Crawler4j_Introduction.pptx
@@ -7,6 +7,10 @@
   <p:sldIdLst>
     <p:sldId id="256" r:id="rId2"/>
     <p:sldId id="257" r:id="rId3"/>
+    <p:sldId id="258" r:id="rId4"/>
+    <p:sldId id="259" r:id="rId5"/>
+    <p:sldId id="260" r:id="rId6"/>
+    <p:sldId id="261" r:id="rId7"/>
   </p:sldIdLst>
   <p:sldSz cx="9144000" cy="6858000" type="screen4x3"/>
   <p:notesSz cx="6858000" cy="9144000"/>
@@ -289,7 +293,7 @@
           <a:p>
             <a:fld id="{5BBEAD13-0566-4C6C-97E7-55F17F24B09F}" type="datetimeFigureOut">
               <a:rPr lang="zh-TW" altLang="en-US" smtClean="0"/>
-              <a:t>2014/3/14</a:t>
+              <a:t>2014/3/16</a:t>
             </a:fld>
             <a:endParaRPr lang="zh-TW" altLang="en-US"/>
           </a:p>
@@ -454,7 +458,7 @@
           <a:p>
             <a:fld id="{5BBEAD13-0566-4C6C-97E7-55F17F24B09F}" type="datetimeFigureOut">
               <a:rPr lang="zh-TW" altLang="en-US" smtClean="0"/>
-              <a:t>2014/3/14</a:t>
+              <a:t>2014/3/16</a:t>
             </a:fld>
             <a:endParaRPr lang="zh-TW" altLang="en-US"/>
           </a:p>
@@ -629,7 +633,7 @@
           <a:p>
             <a:fld id="{5BBEAD13-0566-4C6C-97E7-55F17F24B09F}" type="datetimeFigureOut">
               <a:rPr lang="zh-TW" altLang="en-US" smtClean="0"/>
-              <a:t>2014/3/14</a:t>
+              <a:t>2014/3/16</a:t>
             </a:fld>
             <a:endParaRPr lang="zh-TW" altLang="en-US"/>
           </a:p>
@@ -794,7 +798,7 @@
           <a:p>
             <a:fld id="{5BBEAD13-0566-4C6C-97E7-55F17F24B09F}" type="datetimeFigureOut">
               <a:rPr lang="zh-TW" altLang="en-US" smtClean="0"/>
-              <a:t>2014/3/14</a:t>
+              <a:t>2014/3/16</a:t>
             </a:fld>
             <a:endParaRPr lang="zh-TW" altLang="en-US"/>
           </a:p>
@@ -1035,7 +1039,7 @@
           <a:p>
             <a:fld id="{5BBEAD13-0566-4C6C-97E7-55F17F24B09F}" type="datetimeFigureOut">
               <a:rPr lang="zh-TW" altLang="en-US" smtClean="0"/>
-              <a:t>2014/3/14</a:t>
+              <a:t>2014/3/16</a:t>
             </a:fld>
             <a:endParaRPr lang="zh-TW" altLang="en-US"/>
           </a:p>
@@ -1318,7 +1322,7 @@
           <a:p>
             <a:fld id="{5BBEAD13-0566-4C6C-97E7-55F17F24B09F}" type="datetimeFigureOut">
               <a:rPr lang="zh-TW" altLang="en-US" smtClean="0"/>
-              <a:t>2014/3/14</a:t>
+              <a:t>2014/3/16</a:t>
             </a:fld>
             <a:endParaRPr lang="zh-TW" altLang="en-US"/>
           </a:p>
@@ -1735,7 +1739,7 @@
           <a:p>
             <a:fld id="{5BBEAD13-0566-4C6C-97E7-55F17F24B09F}" type="datetimeFigureOut">
               <a:rPr lang="zh-TW" altLang="en-US" smtClean="0"/>
-              <a:t>2014/3/14</a:t>
+              <a:t>2014/3/16</a:t>
             </a:fld>
             <a:endParaRPr lang="zh-TW" altLang="en-US"/>
           </a:p>
@@ -1848,7 +1852,7 @@
           <a:p>
             <a:fld id="{5BBEAD13-0566-4C6C-97E7-55F17F24B09F}" type="datetimeFigureOut">
               <a:rPr lang="zh-TW" altLang="en-US" smtClean="0"/>
-              <a:t>2014/3/14</a:t>
+              <a:t>2014/3/16</a:t>
             </a:fld>
             <a:endParaRPr lang="zh-TW" altLang="en-US"/>
           </a:p>
@@ -1938,7 +1942,7 @@
           <a:p>
             <a:fld id="{5BBEAD13-0566-4C6C-97E7-55F17F24B09F}" type="datetimeFigureOut">
               <a:rPr lang="zh-TW" altLang="en-US" smtClean="0"/>
-              <a:t>2014/3/14</a:t>
+              <a:t>2014/3/16</a:t>
             </a:fld>
             <a:endParaRPr lang="zh-TW" altLang="en-US"/>
           </a:p>
@@ -2210,7 +2214,7 @@
           <a:p>
             <a:fld id="{5BBEAD13-0566-4C6C-97E7-55F17F24B09F}" type="datetimeFigureOut">
               <a:rPr lang="zh-TW" altLang="en-US" smtClean="0"/>
-              <a:t>2014/3/14</a:t>
+              <a:t>2014/3/16</a:t>
             </a:fld>
             <a:endParaRPr lang="zh-TW" altLang="en-US"/>
           </a:p>
@@ -2458,7 +2462,7 @@
           <a:p>
             <a:fld id="{5BBEAD13-0566-4C6C-97E7-55F17F24B09F}" type="datetimeFigureOut">
               <a:rPr lang="zh-TW" altLang="en-US" smtClean="0"/>
-              <a:t>2014/3/14</a:t>
+              <a:t>2014/3/16</a:t>
             </a:fld>
             <a:endParaRPr lang="zh-TW" altLang="en-US"/>
           </a:p>
@@ -2666,7 +2670,7 @@
           <a:p>
             <a:fld id="{5BBEAD13-0566-4C6C-97E7-55F17F24B09F}" type="datetimeFigureOut">
               <a:rPr lang="zh-TW" altLang="en-US" smtClean="0"/>
-              <a:t>2014/3/14</a:t>
+              <a:t>2014/3/16</a:t>
             </a:fld>
             <a:endParaRPr lang="zh-TW" altLang="en-US"/>
           </a:p>
@@ -3133,31 +3137,6 @@
       </p:grpSpPr>
       <p:sp>
         <p:nvSpPr>
-          <p:cNvPr id="2" name="標題 1"/>
-          <p:cNvSpPr>
-            <a:spLocks noGrp="1"/>
-          </p:cNvSpPr>
-          <p:nvPr>
-            <p:ph type="title"/>
-          </p:nvPr>
-        </p:nvSpPr>
-        <p:spPr/>
-        <p:txBody>
-          <a:bodyPr>
-            <a:normAutofit/>
-          </a:bodyPr>
-          <a:lstStyle/>
-          <a:p>
-            <a:r>
-              <a:rPr lang="en-US" altLang="zh-TW" sz="3200" b="1" dirty="0" smtClean="0"/>
-              <a:t>Hello Word’s Sample Usage</a:t>
-            </a:r>
-            <a:endParaRPr lang="zh-TW" altLang="en-US" sz="3200" dirty="0"/>
-          </a:p>
-        </p:txBody>
-      </p:sp>
-      <p:sp>
-        <p:nvSpPr>
           <p:cNvPr id="3" name="內容版面配置區 2"/>
           <p:cNvSpPr>
             <a:spLocks noGrp="1"/>
@@ -3180,9 +3159,42 @@
           <a:p>
             <a:r>
               <a:rPr lang="en-US" altLang="zh-TW" sz="1800" dirty="0" smtClean="0"/>
-              <a:t>In the beginning, let’s check class diagram of what we will use later:</a:t>
+              <a:t>In the beginning, let’s </a:t>
+            </a:r>
+            <a:r>
+              <a:rPr lang="en-US" altLang="zh-TW" sz="1800" dirty="0" smtClean="0"/>
+              <a:t>check the </a:t>
+            </a:r>
+            <a:r>
+              <a:rPr lang="en-US" altLang="zh-TW" sz="1800" dirty="0" smtClean="0"/>
+              <a:t>class diagram of what we will use later:</a:t>
             </a:r>
             <a:endParaRPr lang="zh-TW" altLang="en-US" sz="1800" dirty="0"/>
+          </a:p>
+        </p:txBody>
+      </p:sp>
+      <p:sp>
+        <p:nvSpPr>
+          <p:cNvPr id="2" name="標題 1"/>
+          <p:cNvSpPr>
+            <a:spLocks noGrp="1"/>
+          </p:cNvSpPr>
+          <p:nvPr>
+            <p:ph type="title"/>
+          </p:nvPr>
+        </p:nvSpPr>
+        <p:spPr/>
+        <p:txBody>
+          <a:bodyPr>
+            <a:normAutofit/>
+          </a:bodyPr>
+          <a:lstStyle/>
+          <a:p>
+            <a:r>
+              <a:rPr lang="en-US" altLang="zh-TW" sz="3200" b="1" dirty="0" smtClean="0"/>
+              <a:t>Hello Word’s Sample Usage</a:t>
+            </a:r>
+            <a:endParaRPr lang="zh-TW" altLang="en-US" sz="3200" dirty="0"/>
           </a:p>
         </p:txBody>
       </p:sp>
@@ -3270,10 +3282,10 @@
         </p:nvGrpSpPr>
         <p:grpSpPr>
           <a:xfrm>
-            <a:off x="654224" y="3212976"/>
-            <a:ext cx="5544616" cy="1889051"/>
-            <a:chOff x="654224" y="3212976"/>
-            <a:chExt cx="5544616" cy="1889051"/>
+            <a:off x="107504" y="3212976"/>
+            <a:ext cx="5544616" cy="1898557"/>
+            <a:chOff x="107504" y="3212976"/>
+            <a:chExt cx="5544616" cy="1898557"/>
           </a:xfrm>
         </p:grpSpPr>
         <p:sp>
@@ -3284,7 +3296,7 @@
           </p:nvSpPr>
           <p:spPr>
             <a:xfrm>
-              <a:off x="654224" y="3717032"/>
+              <a:off x="107504" y="3726538"/>
               <a:ext cx="5544616" cy="1384995"/>
             </a:xfrm>
             <a:prstGeom prst="rect">
@@ -3483,10 +3495,10 @@
         </p:nvGrpSpPr>
         <p:grpSpPr>
           <a:xfrm>
-            <a:off x="1835695" y="2162175"/>
-            <a:ext cx="7200801" cy="1913737"/>
-            <a:chOff x="1835695" y="2162175"/>
-            <a:chExt cx="7200801" cy="1913737"/>
+            <a:off x="0" y="1310789"/>
+            <a:ext cx="8277225" cy="1384995"/>
+            <a:chOff x="0" y="1310789"/>
+            <a:chExt cx="8277225" cy="1384995"/>
           </a:xfrm>
         </p:grpSpPr>
         <p:sp>
@@ -3543,7 +3555,7 @@
           </p:nvSpPr>
           <p:spPr>
             <a:xfrm>
-              <a:off x="1835695" y="2690917"/>
+              <a:off x="0" y="1310789"/>
               <a:ext cx="7200801" cy="1384995"/>
             </a:xfrm>
             <a:prstGeom prst="rect">
@@ -3682,15 +3694,7 @@
                     <a:schemeClr val="tx1"/>
                   </a:solidFill>
                 </a:rPr>
-                <a:t>Set </a:t>
-              </a:r>
-              <a:r>
-                <a:rPr lang="en-US" altLang="zh-TW" dirty="0">
-                  <a:solidFill>
-                    <a:schemeClr val="tx1"/>
-                  </a:solidFill>
-                </a:rPr>
-                <a:t>the maximum number of pages to crawl</a:t>
+                <a:t>Set the maximum number of pages to crawl</a:t>
               </a:r>
               <a:r>
                 <a:rPr lang="en-US" altLang="zh-TW" dirty="0" smtClean="0">
@@ -3723,6 +3727,593 @@
               <a:r>
                 <a:rPr lang="en-US" altLang="zh-TW" dirty="0" smtClean="0">
                   <a:hlinkClick r:id="rId3"/>
+                </a:rPr>
+                <a:t>More</a:t>
+              </a:r>
+              <a:endParaRPr lang="zh-TW" altLang="en-US" dirty="0"/>
+            </a:p>
+          </p:txBody>
+        </p:sp>
+      </p:grpSp>
+      <p:grpSp>
+        <p:nvGrpSpPr>
+          <p:cNvPr id="14" name="群組 13"/>
+          <p:cNvGrpSpPr/>
+          <p:nvPr/>
+        </p:nvGrpSpPr>
+        <p:grpSpPr>
+          <a:xfrm>
+            <a:off x="1743843" y="2087850"/>
+            <a:ext cx="6513537" cy="1557174"/>
+            <a:chOff x="1743843" y="2087850"/>
+            <a:chExt cx="6513537" cy="1557174"/>
+          </a:xfrm>
+        </p:grpSpPr>
+        <p:sp>
+          <p:nvSpPr>
+            <p:cNvPr id="12" name="矩形 11"/>
+            <p:cNvSpPr/>
+            <p:nvPr/>
+          </p:nvSpPr>
+          <p:spPr>
+            <a:xfrm>
+              <a:off x="3059832" y="3212976"/>
+              <a:ext cx="1080120" cy="432048"/>
+            </a:xfrm>
+            <a:prstGeom prst="rect">
+              <a:avLst/>
+            </a:prstGeom>
+            <a:noFill/>
+            <a:ln>
+              <a:solidFill>
+                <a:srgbClr val="FF0000"/>
+              </a:solidFill>
+            </a:ln>
+          </p:spPr>
+          <p:style>
+            <a:lnRef idx="2">
+              <a:schemeClr val="accent1">
+                <a:shade val="50000"/>
+              </a:schemeClr>
+            </a:lnRef>
+            <a:fillRef idx="1">
+              <a:schemeClr val="accent1"/>
+            </a:fillRef>
+            <a:effectRef idx="0">
+              <a:schemeClr val="accent1"/>
+            </a:effectRef>
+            <a:fontRef idx="minor">
+              <a:schemeClr val="lt1"/>
+            </a:fontRef>
+          </p:style>
+          <p:txBody>
+            <a:bodyPr rtlCol="0" anchor="ctr"/>
+            <a:lstStyle/>
+            <a:p>
+              <a:pPr algn="ctr"/>
+              <a:endParaRPr lang="zh-TW" altLang="en-US"/>
+            </a:p>
+          </p:txBody>
+        </p:sp>
+        <p:sp>
+          <p:nvSpPr>
+            <p:cNvPr id="13" name="文字方塊 12"/>
+            <p:cNvSpPr txBox="1"/>
+            <p:nvPr/>
+          </p:nvSpPr>
+          <p:spPr>
+            <a:xfrm>
+              <a:off x="1743843" y="2087850"/>
+              <a:ext cx="6513537" cy="954107"/>
+            </a:xfrm>
+            <a:prstGeom prst="rect">
+              <a:avLst/>
+            </a:prstGeom>
+            <a:solidFill>
+              <a:schemeClr val="accent5">
+                <a:lumMod val="40000"/>
+                <a:lumOff val="60000"/>
+              </a:schemeClr>
+            </a:solidFill>
+            <a:ln>
+              <a:solidFill>
+                <a:srgbClr val="002060"/>
+              </a:solidFill>
+            </a:ln>
+          </p:spPr>
+          <p:txBody>
+            <a:bodyPr wrap="square" rtlCol="0">
+              <a:spAutoFit/>
+            </a:bodyPr>
+            <a:lstStyle>
+              <a:defPPr>
+                <a:defRPr lang="zh-TW"/>
+              </a:defPPr>
+              <a:lvl1pPr marL="285750" indent="-285750">
+                <a:buFont typeface="Arial" panose="020B0604020202020204" pitchFamily="34" charset="0"/>
+                <a:buChar char="•"/>
+                <a:defRPr sz="1400"/>
+              </a:lvl1pPr>
+              <a:lvl2pPr marL="742950" lvl="1" indent="-285750">
+                <a:buFont typeface="Wingdings" panose="05000000000000000000" pitchFamily="2" charset="2"/>
+                <a:buChar char="Ø"/>
+                <a:defRPr sz="1400">
+                  <a:solidFill>
+                    <a:srgbClr val="0070C0"/>
+                  </a:solidFill>
+                </a:defRPr>
+              </a:lvl2pPr>
+            </a:lstStyle>
+            <a:p>
+              <a:r>
+                <a:rPr lang="en-US" altLang="zh-TW" dirty="0" smtClean="0"/>
+                <a:t>User </a:t>
+              </a:r>
+              <a:r>
+                <a:rPr lang="en-US" altLang="zh-TW" dirty="0"/>
+                <a:t>provide </a:t>
+              </a:r>
+              <a:r>
+                <a:rPr lang="en-US" altLang="zh-TW" dirty="0" smtClean="0"/>
+                <a:t>crawling URLs here via </a:t>
+              </a:r>
+              <a:r>
+                <a:rPr lang="en-US" altLang="zh-TW" dirty="0" smtClean="0">
+                  <a:solidFill>
+                    <a:srgbClr val="0070C0"/>
+                  </a:solidFill>
+                </a:rPr>
+                <a:t>API:addSeed()</a:t>
+              </a:r>
+            </a:p>
+            <a:p>
+              <a:r>
+                <a:rPr lang="en-US" altLang="zh-TW" dirty="0" smtClean="0"/>
+                <a:t>User can decide how many working threads while start crawling via </a:t>
+              </a:r>
+              <a:r>
+                <a:rPr lang="en-US" altLang="zh-TW" dirty="0" smtClean="0">
+                  <a:solidFill>
+                    <a:srgbClr val="0070C0"/>
+                  </a:solidFill>
+                </a:rPr>
+                <a:t>API: start() </a:t>
+              </a:r>
+              <a:r>
+                <a:rPr lang="en-US" altLang="zh-TW" dirty="0" smtClean="0"/>
+                <a:t>or </a:t>
+              </a:r>
+              <a:r>
+                <a:rPr lang="en-US" altLang="zh-TW" dirty="0" smtClean="0">
+                  <a:solidFill>
+                    <a:srgbClr val="0070C0"/>
+                  </a:solidFill>
+                </a:rPr>
+                <a:t>API: startNonBlocking()</a:t>
+              </a:r>
+            </a:p>
+            <a:p>
+              <a:r>
+                <a:rPr lang="en-US" altLang="zh-TW" dirty="0" smtClean="0">
+                  <a:hlinkClick r:id="rId4"/>
+                </a:rPr>
+                <a:t>More</a:t>
+              </a:r>
+              <a:endParaRPr lang="zh-TW" altLang="en-US" dirty="0"/>
+            </a:p>
+          </p:txBody>
+        </p:sp>
+      </p:grpSp>
+      <p:grpSp>
+        <p:nvGrpSpPr>
+          <p:cNvPr id="17" name="群組 16"/>
+          <p:cNvGrpSpPr/>
+          <p:nvPr/>
+        </p:nvGrpSpPr>
+        <p:grpSpPr>
+          <a:xfrm>
+            <a:off x="2960629" y="2341543"/>
+            <a:ext cx="5442511" cy="2335231"/>
+            <a:chOff x="2960629" y="2341543"/>
+            <a:chExt cx="5442511" cy="2335231"/>
+          </a:xfrm>
+        </p:grpSpPr>
+        <p:sp>
+          <p:nvSpPr>
+            <p:cNvPr id="15" name="矩形 14"/>
+            <p:cNvSpPr/>
+            <p:nvPr/>
+          </p:nvSpPr>
+          <p:spPr>
+            <a:xfrm>
+              <a:off x="4543353" y="4077071"/>
+              <a:ext cx="2076521" cy="599703"/>
+            </a:xfrm>
+            <a:prstGeom prst="rect">
+              <a:avLst/>
+            </a:prstGeom>
+            <a:noFill/>
+            <a:ln>
+              <a:solidFill>
+                <a:srgbClr val="FF0000"/>
+              </a:solidFill>
+            </a:ln>
+          </p:spPr>
+          <p:style>
+            <a:lnRef idx="2">
+              <a:schemeClr val="accent1">
+                <a:shade val="50000"/>
+              </a:schemeClr>
+            </a:lnRef>
+            <a:fillRef idx="1">
+              <a:schemeClr val="accent1"/>
+            </a:fillRef>
+            <a:effectRef idx="0">
+              <a:schemeClr val="accent1"/>
+            </a:effectRef>
+            <a:fontRef idx="minor">
+              <a:schemeClr val="lt1"/>
+            </a:fontRef>
+          </p:style>
+          <p:txBody>
+            <a:bodyPr rtlCol="0" anchor="ctr"/>
+            <a:lstStyle/>
+            <a:p>
+              <a:pPr algn="ctr"/>
+              <a:endParaRPr lang="zh-TW" altLang="en-US"/>
+            </a:p>
+          </p:txBody>
+        </p:sp>
+        <p:sp>
+          <p:nvSpPr>
+            <p:cNvPr id="16" name="文字方塊 15"/>
+            <p:cNvSpPr txBox="1"/>
+            <p:nvPr/>
+          </p:nvSpPr>
+          <p:spPr>
+            <a:xfrm>
+              <a:off x="2960629" y="2341543"/>
+              <a:ext cx="5442511" cy="1384995"/>
+            </a:xfrm>
+            <a:prstGeom prst="rect">
+              <a:avLst/>
+            </a:prstGeom>
+            <a:solidFill>
+              <a:schemeClr val="accent5">
+                <a:lumMod val="40000"/>
+                <a:lumOff val="60000"/>
+              </a:schemeClr>
+            </a:solidFill>
+            <a:ln>
+              <a:solidFill>
+                <a:srgbClr val="002060"/>
+              </a:solidFill>
+            </a:ln>
+          </p:spPr>
+          <p:txBody>
+            <a:bodyPr wrap="square" rtlCol="0">
+              <a:spAutoFit/>
+            </a:bodyPr>
+            <a:lstStyle>
+              <a:defPPr>
+                <a:defRPr lang="zh-TW"/>
+              </a:defPPr>
+              <a:lvl1pPr marL="285750" indent="-285750">
+                <a:buFont typeface="Arial" panose="020B0604020202020204" pitchFamily="34" charset="0"/>
+                <a:buChar char="•"/>
+                <a:defRPr sz="1400"/>
+              </a:lvl1pPr>
+              <a:lvl2pPr marL="742950" lvl="1" indent="-285750">
+                <a:buFont typeface="Wingdings" panose="05000000000000000000" pitchFamily="2" charset="2"/>
+                <a:buChar char="Ø"/>
+                <a:defRPr sz="1400">
+                  <a:solidFill>
+                    <a:srgbClr val="0070C0"/>
+                  </a:solidFill>
+                </a:defRPr>
+              </a:lvl2pPr>
+            </a:lstStyle>
+            <a:p>
+              <a:r>
+                <a:rPr lang="en-US" altLang="zh-TW" dirty="0"/>
+                <a:t>This class use </a:t>
+              </a:r>
+              <a:r>
+                <a:rPr lang="en-US" altLang="zh-TW" b="1" dirty="0" smtClean="0">
+                  <a:hlinkClick r:id="rId5"/>
+                </a:rPr>
+                <a:t>Apache HttpClient</a:t>
+              </a:r>
+              <a:r>
+                <a:rPr lang="en-US" altLang="zh-TW" dirty="0" smtClean="0"/>
+                <a:t> </a:t>
+              </a:r>
+              <a:r>
+                <a:rPr lang="en-US" altLang="zh-TW" dirty="0"/>
+                <a:t>library to crawl </a:t>
+              </a:r>
+              <a:r>
+                <a:rPr lang="en-US" altLang="zh-TW" dirty="0" smtClean="0"/>
+                <a:t>pages; use </a:t>
+              </a:r>
+              <a:r>
+                <a:rPr lang="en-US" altLang="zh-TW" b="1" dirty="0" smtClean="0">
+                  <a:hlinkClick r:id="rId6"/>
+                </a:rPr>
+                <a:t>Apache </a:t>
+              </a:r>
+              <a:r>
+                <a:rPr lang="en-US" altLang="zh-TW" b="1" dirty="0" err="1" smtClean="0">
+                  <a:hlinkClick r:id="rId6"/>
+                </a:rPr>
+                <a:t>Tika</a:t>
+              </a:r>
+              <a:r>
+                <a:rPr lang="en-US" altLang="zh-TW" dirty="0" smtClean="0"/>
+                <a:t> library to parse HTML page for outgoing link.</a:t>
+              </a:r>
+            </a:p>
+            <a:p>
+              <a:r>
+                <a:rPr lang="en-US" altLang="zh-TW" dirty="0" smtClean="0"/>
+                <a:t>The crawling result will be stored in </a:t>
+              </a:r>
+              <a:r>
+                <a:rPr lang="en-US" altLang="zh-TW" b="1" dirty="0" smtClean="0">
+                  <a:hlinkClick r:id="rId7"/>
+                </a:rPr>
+                <a:t>PageFetchResult</a:t>
+              </a:r>
+              <a:r>
+                <a:rPr lang="en-US" altLang="zh-TW" dirty="0" smtClean="0"/>
+                <a:t> class .</a:t>
+              </a:r>
+            </a:p>
+            <a:p>
+              <a:r>
+                <a:rPr lang="en-US" altLang="zh-TW" dirty="0" smtClean="0"/>
+                <a:t>The max size of page to download is 1M bytes and it can be configured via attribute </a:t>
+              </a:r>
+              <a:r>
+                <a:rPr lang="en-US" altLang="zh-TW" i="1" dirty="0" err="1" smtClean="0">
+                  <a:solidFill>
+                    <a:srgbClr val="0070C0"/>
+                  </a:solidFill>
+                </a:rPr>
+                <a:t>maxDownloadSize</a:t>
+              </a:r>
+              <a:r>
+                <a:rPr lang="en-US" altLang="zh-TW" dirty="0" smtClean="0"/>
+                <a:t> of </a:t>
+              </a:r>
+              <a:r>
+                <a:rPr lang="en-US" altLang="zh-TW" b="1" dirty="0" err="1" smtClean="0">
+                  <a:hlinkClick r:id="rId3"/>
+                </a:rPr>
+                <a:t>CrawlConfig</a:t>
+              </a:r>
+              <a:r>
+                <a:rPr lang="en-US" altLang="zh-TW" dirty="0" smtClean="0"/>
+                <a:t>.</a:t>
+              </a:r>
+            </a:p>
+            <a:p>
+              <a:r>
+                <a:rPr lang="en-US" altLang="zh-TW" dirty="0" smtClean="0">
+                  <a:hlinkClick r:id="rId8"/>
+                </a:rPr>
+                <a:t>More</a:t>
+              </a:r>
+              <a:endParaRPr lang="zh-TW" altLang="en-US" dirty="0"/>
+            </a:p>
+          </p:txBody>
+        </p:sp>
+      </p:grpSp>
+      <p:grpSp>
+        <p:nvGrpSpPr>
+          <p:cNvPr id="20" name="群組 19"/>
+          <p:cNvGrpSpPr/>
+          <p:nvPr/>
+        </p:nvGrpSpPr>
+        <p:grpSpPr>
+          <a:xfrm>
+            <a:off x="1177363" y="3169130"/>
+            <a:ext cx="5442511" cy="2564126"/>
+            <a:chOff x="1177363" y="3169130"/>
+            <a:chExt cx="5442511" cy="2564126"/>
+          </a:xfrm>
+        </p:grpSpPr>
+        <p:sp>
+          <p:nvSpPr>
+            <p:cNvPr id="18" name="矩形 17"/>
+            <p:cNvSpPr/>
+            <p:nvPr/>
+          </p:nvSpPr>
+          <p:spPr>
+            <a:xfrm>
+              <a:off x="4283968" y="5286375"/>
+              <a:ext cx="716643" cy="446881"/>
+            </a:xfrm>
+            <a:prstGeom prst="rect">
+              <a:avLst/>
+            </a:prstGeom>
+            <a:noFill/>
+            <a:ln>
+              <a:solidFill>
+                <a:srgbClr val="FF0000"/>
+              </a:solidFill>
+            </a:ln>
+          </p:spPr>
+          <p:style>
+            <a:lnRef idx="2">
+              <a:schemeClr val="accent1">
+                <a:shade val="50000"/>
+              </a:schemeClr>
+            </a:lnRef>
+            <a:fillRef idx="1">
+              <a:schemeClr val="accent1"/>
+            </a:fillRef>
+            <a:effectRef idx="0">
+              <a:schemeClr val="accent1"/>
+            </a:effectRef>
+            <a:fontRef idx="minor">
+              <a:schemeClr val="lt1"/>
+            </a:fontRef>
+          </p:style>
+          <p:txBody>
+            <a:bodyPr rtlCol="0" anchor="ctr"/>
+            <a:lstStyle/>
+            <a:p>
+              <a:pPr algn="ctr"/>
+              <a:endParaRPr lang="zh-TW" altLang="en-US"/>
+            </a:p>
+          </p:txBody>
+        </p:sp>
+        <p:sp>
+          <p:nvSpPr>
+            <p:cNvPr id="19" name="文字方塊 18"/>
+            <p:cNvSpPr txBox="1"/>
+            <p:nvPr/>
+          </p:nvSpPr>
+          <p:spPr>
+            <a:xfrm>
+              <a:off x="1177363" y="3169130"/>
+              <a:ext cx="5442511" cy="1815882"/>
+            </a:xfrm>
+            <a:prstGeom prst="rect">
+              <a:avLst/>
+            </a:prstGeom>
+            <a:solidFill>
+              <a:schemeClr val="accent5">
+                <a:lumMod val="40000"/>
+                <a:lumOff val="60000"/>
+              </a:schemeClr>
+            </a:solidFill>
+            <a:ln>
+              <a:solidFill>
+                <a:srgbClr val="002060"/>
+              </a:solidFill>
+            </a:ln>
+          </p:spPr>
+          <p:txBody>
+            <a:bodyPr wrap="square" rtlCol="0">
+              <a:spAutoFit/>
+            </a:bodyPr>
+            <a:lstStyle>
+              <a:defPPr>
+                <a:defRPr lang="zh-TW"/>
+              </a:defPPr>
+              <a:lvl1pPr marL="285750" indent="-285750">
+                <a:buFont typeface="Arial" panose="020B0604020202020204" pitchFamily="34" charset="0"/>
+                <a:buChar char="•"/>
+                <a:defRPr sz="1400"/>
+              </a:lvl1pPr>
+              <a:lvl2pPr marL="742950" lvl="1" indent="-285750">
+                <a:buFont typeface="Wingdings" panose="05000000000000000000" pitchFamily="2" charset="2"/>
+                <a:buChar char="Ø"/>
+                <a:defRPr sz="1400">
+                  <a:solidFill>
+                    <a:srgbClr val="0070C0"/>
+                  </a:solidFill>
+                </a:defRPr>
+              </a:lvl2pPr>
+            </a:lstStyle>
+            <a:p>
+              <a:r>
+                <a:rPr lang="en-US" altLang="zh-TW" dirty="0"/>
+                <a:t>This class </a:t>
+              </a:r>
+              <a:r>
+                <a:rPr lang="en-US" altLang="zh-TW" dirty="0" smtClean="0"/>
+                <a:t>is used to store crawling.</a:t>
+              </a:r>
+            </a:p>
+            <a:p>
+              <a:r>
+                <a:rPr lang="en-US" altLang="zh-TW" dirty="0" smtClean="0"/>
+                <a:t>When storing URL in this class, it will parsed the URL:</a:t>
+              </a:r>
+            </a:p>
+            <a:p>
+              <a:pPr lvl="1">
+                <a:buFont typeface="Wingdings" panose="05000000000000000000" pitchFamily="2" charset="2"/>
+                <a:buChar char="ü"/>
+              </a:pPr>
+              <a:r>
+                <a:rPr lang="en-US" altLang="zh-TW" dirty="0" smtClean="0">
+                  <a:solidFill>
+                    <a:schemeClr val="tx1"/>
+                  </a:solidFill>
+                </a:rPr>
+                <a:t>domain</a:t>
+              </a:r>
+            </a:p>
+            <a:p>
+              <a:pPr lvl="1">
+                <a:buFont typeface="Wingdings" panose="05000000000000000000" pitchFamily="2" charset="2"/>
+                <a:buChar char="ü"/>
+              </a:pPr>
+              <a:r>
+                <a:rPr lang="en-US" altLang="zh-TW" dirty="0" smtClean="0">
+                  <a:solidFill>
+                    <a:schemeClr val="tx1"/>
+                  </a:solidFill>
+                </a:rPr>
+                <a:t>subDomain</a:t>
+              </a:r>
+            </a:p>
+            <a:p>
+              <a:pPr lvl="1">
+                <a:buFont typeface="Wingdings" panose="05000000000000000000" pitchFamily="2" charset="2"/>
+                <a:buChar char="ü"/>
+              </a:pPr>
+              <a:r>
+                <a:rPr lang="en-US" altLang="zh-TW" dirty="0" smtClean="0">
+                  <a:solidFill>
+                    <a:schemeClr val="tx1"/>
+                  </a:solidFill>
+                </a:rPr>
+                <a:t>Path</a:t>
+              </a:r>
+            </a:p>
+            <a:p>
+              <a:pPr lvl="1">
+                <a:buFont typeface="Wingdings" panose="05000000000000000000" pitchFamily="2" charset="2"/>
+                <a:buChar char="ü"/>
+              </a:pPr>
+              <a:r>
+                <a:rPr lang="en-US" altLang="zh-TW" dirty="0">
+                  <a:solidFill>
+                    <a:schemeClr val="tx1"/>
+                  </a:solidFill>
+                </a:rPr>
+                <a:t>Anchor text</a:t>
+              </a:r>
+              <a:endParaRPr lang="en-US" altLang="zh-TW" dirty="0">
+                <a:solidFill>
+                  <a:schemeClr val="tx1"/>
+                </a:solidFill>
+              </a:endParaRPr>
+            </a:p>
+            <a:p>
+              <a:r>
+                <a:rPr lang="en-US" altLang="zh-TW" dirty="0" smtClean="0">
+                  <a:solidFill>
+                    <a:schemeClr val="tx1"/>
+                  </a:solidFill>
+                </a:rPr>
+                <a:t>The crawling depth can be known here.</a:t>
+              </a:r>
+              <a:endParaRPr lang="en-US" altLang="zh-TW" dirty="0">
+                <a:solidFill>
+                  <a:schemeClr val="tx1"/>
+                </a:solidFill>
+              </a:endParaRPr>
+            </a:p>
+            <a:p>
+              <a:r>
+                <a:rPr lang="en-US" altLang="zh-TW" dirty="0" smtClean="0">
+                  <a:hlinkClick r:id="rId9"/>
                 </a:rPr>
                 <a:t>More</a:t>
               </a:r>
@@ -3878,6 +4469,3143 @@
                                         <p:cTn id="15" dur="500"/>
                                         <p:tgtEl>
                                           <p:spTgt spid="10"/>
+                                        </p:tgtEl>
+                                      </p:cBhvr>
+                                    </p:animEffect>
+                                  </p:childTnLst>
+                                </p:cTn>
+                              </p:par>
+                            </p:childTnLst>
+                          </p:cTn>
+                        </p:par>
+                      </p:childTnLst>
+                    </p:cTn>
+                  </p:par>
+                  <p:par>
+                    <p:cTn id="16" fill="hold">
+                      <p:stCondLst>
+                        <p:cond delay="indefinite"/>
+                      </p:stCondLst>
+                      <p:childTnLst>
+                        <p:par>
+                          <p:cTn id="17" fill="hold">
+                            <p:stCondLst>
+                              <p:cond delay="0"/>
+                            </p:stCondLst>
+                            <p:childTnLst>
+                              <p:par>
+                                <p:cTn id="18" presetID="10" presetClass="exit" presetSubtype="0" fill="hold" nodeType="clickEffect">
+                                  <p:stCondLst>
+                                    <p:cond delay="0"/>
+                                  </p:stCondLst>
+                                  <p:childTnLst>
+                                    <p:animEffect transition="out" filter="fade">
+                                      <p:cBhvr>
+                                        <p:cTn id="19" dur="500"/>
+                                        <p:tgtEl>
+                                          <p:spTgt spid="10"/>
+                                        </p:tgtEl>
+                                      </p:cBhvr>
+                                    </p:animEffect>
+                                    <p:set>
+                                      <p:cBhvr>
+                                        <p:cTn id="20" dur="1" fill="hold">
+                                          <p:stCondLst>
+                                            <p:cond delay="499"/>
+                                          </p:stCondLst>
+                                        </p:cTn>
+                                        <p:tgtEl>
+                                          <p:spTgt spid="10"/>
+                                        </p:tgtEl>
+                                        <p:attrNameLst>
+                                          <p:attrName>style.visibility</p:attrName>
+                                        </p:attrNameLst>
+                                      </p:cBhvr>
+                                      <p:to>
+                                        <p:strVal val="hidden"/>
+                                      </p:to>
+                                    </p:set>
+                                  </p:childTnLst>
+                                </p:cTn>
+                              </p:par>
+                              <p:par>
+                                <p:cTn id="21" presetID="10" presetClass="entr" presetSubtype="0" fill="hold" nodeType="withEffect">
+                                  <p:stCondLst>
+                                    <p:cond delay="0"/>
+                                  </p:stCondLst>
+                                  <p:childTnLst>
+                                    <p:set>
+                                      <p:cBhvr>
+                                        <p:cTn id="22" dur="1" fill="hold">
+                                          <p:stCondLst>
+                                            <p:cond delay="0"/>
+                                          </p:stCondLst>
+                                        </p:cTn>
+                                        <p:tgtEl>
+                                          <p:spTgt spid="14"/>
+                                        </p:tgtEl>
+                                        <p:attrNameLst>
+                                          <p:attrName>style.visibility</p:attrName>
+                                        </p:attrNameLst>
+                                      </p:cBhvr>
+                                      <p:to>
+                                        <p:strVal val="visible"/>
+                                      </p:to>
+                                    </p:set>
+                                    <p:animEffect transition="in" filter="fade">
+                                      <p:cBhvr>
+                                        <p:cTn id="23" dur="500"/>
+                                        <p:tgtEl>
+                                          <p:spTgt spid="14"/>
+                                        </p:tgtEl>
+                                      </p:cBhvr>
+                                    </p:animEffect>
+                                  </p:childTnLst>
+                                </p:cTn>
+                              </p:par>
+                            </p:childTnLst>
+                          </p:cTn>
+                        </p:par>
+                      </p:childTnLst>
+                    </p:cTn>
+                  </p:par>
+                  <p:par>
+                    <p:cTn id="24" fill="hold">
+                      <p:stCondLst>
+                        <p:cond delay="indefinite"/>
+                      </p:stCondLst>
+                      <p:childTnLst>
+                        <p:par>
+                          <p:cTn id="25" fill="hold">
+                            <p:stCondLst>
+                              <p:cond delay="0"/>
+                            </p:stCondLst>
+                            <p:childTnLst>
+                              <p:par>
+                                <p:cTn id="26" presetID="10" presetClass="exit" presetSubtype="0" fill="hold" nodeType="clickEffect">
+                                  <p:stCondLst>
+                                    <p:cond delay="0"/>
+                                  </p:stCondLst>
+                                  <p:childTnLst>
+                                    <p:animEffect transition="out" filter="fade">
+                                      <p:cBhvr>
+                                        <p:cTn id="27" dur="500"/>
+                                        <p:tgtEl>
+                                          <p:spTgt spid="14"/>
+                                        </p:tgtEl>
+                                      </p:cBhvr>
+                                    </p:animEffect>
+                                    <p:set>
+                                      <p:cBhvr>
+                                        <p:cTn id="28" dur="1" fill="hold">
+                                          <p:stCondLst>
+                                            <p:cond delay="499"/>
+                                          </p:stCondLst>
+                                        </p:cTn>
+                                        <p:tgtEl>
+                                          <p:spTgt spid="14"/>
+                                        </p:tgtEl>
+                                        <p:attrNameLst>
+                                          <p:attrName>style.visibility</p:attrName>
+                                        </p:attrNameLst>
+                                      </p:cBhvr>
+                                      <p:to>
+                                        <p:strVal val="hidden"/>
+                                      </p:to>
+                                    </p:set>
+                                  </p:childTnLst>
+                                </p:cTn>
+                              </p:par>
+                              <p:par>
+                                <p:cTn id="29" presetID="10" presetClass="entr" presetSubtype="0" fill="hold" nodeType="withEffect">
+                                  <p:stCondLst>
+                                    <p:cond delay="0"/>
+                                  </p:stCondLst>
+                                  <p:childTnLst>
+                                    <p:set>
+                                      <p:cBhvr>
+                                        <p:cTn id="30" dur="1" fill="hold">
+                                          <p:stCondLst>
+                                            <p:cond delay="0"/>
+                                          </p:stCondLst>
+                                        </p:cTn>
+                                        <p:tgtEl>
+                                          <p:spTgt spid="17"/>
+                                        </p:tgtEl>
+                                        <p:attrNameLst>
+                                          <p:attrName>style.visibility</p:attrName>
+                                        </p:attrNameLst>
+                                      </p:cBhvr>
+                                      <p:to>
+                                        <p:strVal val="visible"/>
+                                      </p:to>
+                                    </p:set>
+                                    <p:animEffect transition="in" filter="fade">
+                                      <p:cBhvr>
+                                        <p:cTn id="31" dur="500"/>
+                                        <p:tgtEl>
+                                          <p:spTgt spid="17"/>
+                                        </p:tgtEl>
+                                      </p:cBhvr>
+                                    </p:animEffect>
+                                  </p:childTnLst>
+                                </p:cTn>
+                              </p:par>
+                            </p:childTnLst>
+                          </p:cTn>
+                        </p:par>
+                      </p:childTnLst>
+                    </p:cTn>
+                  </p:par>
+                  <p:par>
+                    <p:cTn id="32" fill="hold">
+                      <p:stCondLst>
+                        <p:cond delay="indefinite"/>
+                      </p:stCondLst>
+                      <p:childTnLst>
+                        <p:par>
+                          <p:cTn id="33" fill="hold">
+                            <p:stCondLst>
+                              <p:cond delay="0"/>
+                            </p:stCondLst>
+                            <p:childTnLst>
+                              <p:par>
+                                <p:cTn id="34" presetID="10" presetClass="exit" presetSubtype="0" fill="hold" nodeType="clickEffect">
+                                  <p:stCondLst>
+                                    <p:cond delay="0"/>
+                                  </p:stCondLst>
+                                  <p:childTnLst>
+                                    <p:animEffect transition="out" filter="fade">
+                                      <p:cBhvr>
+                                        <p:cTn id="35" dur="500"/>
+                                        <p:tgtEl>
+                                          <p:spTgt spid="17"/>
+                                        </p:tgtEl>
+                                      </p:cBhvr>
+                                    </p:animEffect>
+                                    <p:set>
+                                      <p:cBhvr>
+                                        <p:cTn id="36" dur="1" fill="hold">
+                                          <p:stCondLst>
+                                            <p:cond delay="499"/>
+                                          </p:stCondLst>
+                                        </p:cTn>
+                                        <p:tgtEl>
+                                          <p:spTgt spid="17"/>
+                                        </p:tgtEl>
+                                        <p:attrNameLst>
+                                          <p:attrName>style.visibility</p:attrName>
+                                        </p:attrNameLst>
+                                      </p:cBhvr>
+                                      <p:to>
+                                        <p:strVal val="hidden"/>
+                                      </p:to>
+                                    </p:set>
+                                  </p:childTnLst>
+                                </p:cTn>
+                              </p:par>
+                              <p:par>
+                                <p:cTn id="37" presetID="10" presetClass="entr" presetSubtype="0" fill="hold" nodeType="withEffect">
+                                  <p:stCondLst>
+                                    <p:cond delay="0"/>
+                                  </p:stCondLst>
+                                  <p:childTnLst>
+                                    <p:set>
+                                      <p:cBhvr>
+                                        <p:cTn id="38" dur="1" fill="hold">
+                                          <p:stCondLst>
+                                            <p:cond delay="0"/>
+                                          </p:stCondLst>
+                                        </p:cTn>
+                                        <p:tgtEl>
+                                          <p:spTgt spid="20"/>
+                                        </p:tgtEl>
+                                        <p:attrNameLst>
+                                          <p:attrName>style.visibility</p:attrName>
+                                        </p:attrNameLst>
+                                      </p:cBhvr>
+                                      <p:to>
+                                        <p:strVal val="visible"/>
+                                      </p:to>
+                                    </p:set>
+                                    <p:animEffect transition="in" filter="fade">
+                                      <p:cBhvr>
+                                        <p:cTn id="39" dur="500"/>
+                                        <p:tgtEl>
+                                          <p:spTgt spid="20"/>
+                                        </p:tgtEl>
+                                      </p:cBhvr>
+                                    </p:animEffect>
+                                  </p:childTnLst>
+                                </p:cTn>
+                              </p:par>
+                            </p:childTnLst>
+                          </p:cTn>
+                        </p:par>
+                      </p:childTnLst>
+                    </p:cTn>
+                  </p:par>
+                </p:childTnLst>
+              </p:cTn>
+              <p:prevCondLst>
+                <p:cond evt="onPrev" delay="0">
+                  <p:tgtEl>
+                    <p:sldTgt/>
+                  </p:tgtEl>
+                </p:cond>
+              </p:prevCondLst>
+              <p:nextCondLst>
+                <p:cond evt="onNext" delay="0">
+                  <p:tgtEl>
+                    <p:sldTgt/>
+                  </p:tgtEl>
+                </p:cond>
+              </p:nextCondLst>
+            </p:seq>
+          </p:childTnLst>
+        </p:cTn>
+      </p:par>
+    </p:tnLst>
+  </p:timing>
+</p:sld>
+</file>
+
+<file path=ppt/slides/slide3.xml><?xml version="1.0" encoding="utf-8"?>
+<p:sld xmlns:a="http://schemas.openxmlformats.org/drawingml/2006/main" xmlns:r="http://schemas.openxmlformats.org/officeDocument/2006/relationships" xmlns:p="http://schemas.openxmlformats.org/presentationml/2006/main">
+  <p:cSld>
+    <p:spTree>
+      <p:nvGrpSpPr>
+        <p:cNvPr id="1" name=""/>
+        <p:cNvGrpSpPr/>
+        <p:nvPr/>
+      </p:nvGrpSpPr>
+      <p:grpSpPr>
+        <a:xfrm>
+          <a:off x="0" y="0"/>
+          <a:ext cx="0" cy="0"/>
+          <a:chOff x="0" y="0"/>
+          <a:chExt cx="0" cy="0"/>
+        </a:xfrm>
+      </p:grpSpPr>
+      <p:sp>
+        <p:nvSpPr>
+          <p:cNvPr id="2" name="標題 1"/>
+          <p:cNvSpPr>
+            <a:spLocks noGrp="1"/>
+          </p:cNvSpPr>
+          <p:nvPr>
+            <p:ph type="title"/>
+          </p:nvPr>
+        </p:nvSpPr>
+        <p:spPr/>
+        <p:txBody>
+          <a:bodyPr>
+            <a:normAutofit/>
+          </a:bodyPr>
+          <a:lstStyle/>
+          <a:p>
+            <a:r>
+              <a:rPr lang="en-US" altLang="zh-TW" sz="3200" b="1" dirty="0" smtClean="0"/>
+              <a:t>Hello Word’s Sample Usage</a:t>
+            </a:r>
+            <a:endParaRPr lang="zh-TW" altLang="en-US" sz="3200" dirty="0"/>
+          </a:p>
+        </p:txBody>
+      </p:sp>
+      <p:sp>
+        <p:nvSpPr>
+          <p:cNvPr id="3" name="內容版面配置區 2"/>
+          <p:cNvSpPr>
+            <a:spLocks noGrp="1"/>
+          </p:cNvSpPr>
+          <p:nvPr>
+            <p:ph idx="1"/>
+          </p:nvPr>
+        </p:nvSpPr>
+        <p:spPr>
+          <a:xfrm>
+            <a:off x="457200" y="1412776"/>
+            <a:ext cx="8686800" cy="5256584"/>
+          </a:xfrm>
+        </p:spPr>
+        <p:txBody>
+          <a:bodyPr>
+            <a:normAutofit/>
+          </a:bodyPr>
+          <a:lstStyle/>
+          <a:p>
+            <a:r>
+              <a:rPr lang="en-US" altLang="zh-TW" sz="1800" dirty="0" smtClean="0"/>
+              <a:t>Now is time to know how to use crawler4j. </a:t>
+            </a:r>
+            <a:r>
+              <a:rPr lang="en-US" altLang="zh-TW" sz="1800" dirty="0" smtClean="0"/>
+              <a:t>Actually, it is quite simple. Just only 4 steps is needed:</a:t>
+            </a:r>
+          </a:p>
+          <a:p>
+            <a:pPr marL="800100" lvl="1" indent="-342900">
+              <a:buFont typeface="+mj-lt"/>
+              <a:buAutoNum type="arabicPeriod"/>
+            </a:pPr>
+            <a:r>
+              <a:rPr lang="en-US" altLang="zh-TW" sz="1600" b="1" dirty="0" smtClean="0"/>
+              <a:t>Define your own Crawler: </a:t>
+            </a:r>
+            <a:r>
+              <a:rPr lang="en-US" altLang="zh-TW" sz="1600" dirty="0" smtClean="0"/>
+              <a:t>Extends the </a:t>
+            </a:r>
+            <a:r>
+              <a:rPr lang="en-US" altLang="zh-TW" sz="1600" b="1" dirty="0" smtClean="0">
+                <a:hlinkClick r:id="rId2"/>
+              </a:rPr>
+              <a:t>WebCrawler</a:t>
+            </a:r>
+            <a:r>
+              <a:rPr lang="en-US" altLang="zh-TW" sz="1600" dirty="0" smtClean="0"/>
+              <a:t> and overwrite below two API:</a:t>
+            </a:r>
+          </a:p>
+          <a:p>
+            <a:pPr marL="1200150" lvl="2" indent="-342900">
+              <a:buFont typeface="+mj-lt"/>
+              <a:buAutoNum type="arabicParenR"/>
+            </a:pPr>
+            <a:r>
+              <a:rPr lang="en-US" altLang="zh-TW" sz="1600" b="1" dirty="0" err="1"/>
+              <a:t>shouldVisit</a:t>
+            </a:r>
+            <a:r>
+              <a:rPr lang="en-US" altLang="zh-TW" sz="1600" b="1" dirty="0"/>
+              <a:t>(</a:t>
+            </a:r>
+            <a:r>
+              <a:rPr lang="en-US" altLang="zh-TW" sz="1600" b="1" dirty="0" err="1"/>
+              <a:t>WebURL</a:t>
+            </a:r>
+            <a:r>
+              <a:rPr lang="en-US" altLang="zh-TW" sz="1600" b="1" dirty="0"/>
+              <a:t> </a:t>
+            </a:r>
+            <a:r>
+              <a:rPr lang="en-US" altLang="zh-TW" sz="1600" b="1" dirty="0" err="1"/>
+              <a:t>url</a:t>
+            </a:r>
+            <a:r>
+              <a:rPr lang="en-US" altLang="zh-TW" sz="1600" b="1" dirty="0" smtClean="0"/>
+              <a:t>): </a:t>
+            </a:r>
+            <a:r>
+              <a:rPr lang="en-US" altLang="zh-TW" sz="1600" dirty="0" smtClean="0"/>
+              <a:t>You can decide whether to crawler the given </a:t>
+            </a:r>
+            <a:r>
+              <a:rPr lang="en-US" altLang="zh-TW" sz="1600" i="1" dirty="0" err="1" smtClean="0">
+                <a:solidFill>
+                  <a:srgbClr val="0070C0"/>
+                </a:solidFill>
+              </a:rPr>
+              <a:t>url</a:t>
+            </a:r>
+            <a:r>
+              <a:rPr lang="en-US" altLang="zh-TW" sz="1600" dirty="0" smtClean="0"/>
+              <a:t> or just abandon it by return false. One example is you can define regular expression to filter the file extension such as .</a:t>
+            </a:r>
+            <a:r>
+              <a:rPr lang="en-US" altLang="zh-TW" sz="1600" dirty="0" err="1" smtClean="0"/>
+              <a:t>js</a:t>
+            </a:r>
+            <a:r>
+              <a:rPr lang="en-US" altLang="zh-TW" sz="1600" dirty="0" smtClean="0"/>
+              <a:t>, .</a:t>
+            </a:r>
+            <a:r>
+              <a:rPr lang="en-US" altLang="zh-TW" sz="1600" dirty="0" err="1" smtClean="0"/>
+              <a:t>css</a:t>
+            </a:r>
+            <a:r>
+              <a:rPr lang="en-US" altLang="zh-TW" sz="1600" dirty="0" smtClean="0"/>
+              <a:t> or .mp3 etc.</a:t>
+            </a:r>
+          </a:p>
+          <a:p>
+            <a:pPr marL="1200150" lvl="2" indent="-342900">
+              <a:buFont typeface="+mj-lt"/>
+              <a:buAutoNum type="arabicParenR"/>
+            </a:pPr>
+            <a:r>
+              <a:rPr lang="en-US" altLang="zh-TW" sz="1600" b="1" dirty="0"/>
+              <a:t>visit(Page page</a:t>
+            </a:r>
+            <a:r>
+              <a:rPr lang="en-US" altLang="zh-TW" sz="1600" b="1" dirty="0" smtClean="0"/>
+              <a:t>): </a:t>
+            </a:r>
+            <a:r>
+              <a:rPr lang="en-US" altLang="zh-TW" sz="1600" dirty="0" smtClean="0"/>
+              <a:t>When this callback is called, the crawling result is stored in </a:t>
+            </a:r>
+            <a:r>
+              <a:rPr lang="en-US" altLang="zh-TW" sz="1600" i="1" dirty="0" smtClean="0">
+                <a:solidFill>
+                  <a:srgbClr val="0070C0"/>
+                </a:solidFill>
+              </a:rPr>
+              <a:t>page</a:t>
+            </a:r>
+            <a:r>
+              <a:rPr lang="en-US" altLang="zh-TW" sz="1600" dirty="0" smtClean="0"/>
+              <a:t> variable. You can use </a:t>
+            </a:r>
+            <a:r>
+              <a:rPr lang="en-US" altLang="zh-TW" sz="1600" dirty="0" err="1" smtClean="0"/>
+              <a:t>API:</a:t>
+            </a:r>
+            <a:r>
+              <a:rPr lang="en-US" altLang="zh-TW" sz="1600" b="1" dirty="0" err="1" smtClean="0">
+                <a:hlinkClick r:id="rId3"/>
+              </a:rPr>
+              <a:t>getParseData</a:t>
+            </a:r>
+            <a:r>
+              <a:rPr lang="en-US" altLang="zh-TW" sz="1600" dirty="0" smtClean="0">
+                <a:hlinkClick r:id="rId3"/>
+              </a:rPr>
+              <a:t>()</a:t>
+            </a:r>
+            <a:r>
+              <a:rPr lang="en-US" altLang="zh-TW" sz="1600" dirty="0" smtClean="0"/>
+              <a:t> to known the page is HTML file (</a:t>
+            </a:r>
+            <a:r>
+              <a:rPr lang="en-US" altLang="zh-TW" sz="1600" b="1" dirty="0" err="1">
+                <a:hlinkClick r:id="rId4" tooltip="class in edu.uci.ics.crawler4j.parser"/>
+              </a:rPr>
+              <a:t>HtmlParseData</a:t>
+            </a:r>
+            <a:r>
+              <a:rPr lang="en-US" altLang="zh-TW" sz="1600" dirty="0" smtClean="0"/>
+              <a:t>), text file (</a:t>
+            </a:r>
+            <a:r>
+              <a:rPr lang="en-US" altLang="zh-TW" sz="1600" b="1" dirty="0" err="1">
+                <a:hlinkClick r:id="rId5" tooltip="class in edu.uci.ics.crawler4j.parser"/>
+              </a:rPr>
+              <a:t>TextParseData</a:t>
+            </a:r>
+            <a:r>
+              <a:rPr lang="en-US" altLang="zh-TW" sz="1600" dirty="0" smtClean="0"/>
+              <a:t>) or a binary file (</a:t>
+            </a:r>
+            <a:r>
+              <a:rPr lang="en-US" altLang="zh-TW" sz="1600" b="1" dirty="0" err="1">
+                <a:hlinkClick r:id="rId6" tooltip="class in edu.uci.ics.crawler4j.parser"/>
+              </a:rPr>
+              <a:t>BinaryParseData</a:t>
+            </a:r>
+            <a:r>
+              <a:rPr lang="en-US" altLang="zh-TW" sz="1600" dirty="0" smtClean="0"/>
+              <a:t>).</a:t>
+            </a:r>
+          </a:p>
+          <a:p>
+            <a:pPr marL="800100" lvl="1" indent="-342900">
+              <a:buFont typeface="+mj-lt"/>
+              <a:buAutoNum type="arabicPeriod"/>
+            </a:pPr>
+            <a:r>
+              <a:rPr lang="en-US" altLang="zh-TW" sz="1600" b="1" dirty="0" smtClean="0"/>
+              <a:t>Initialize CrawlController:  </a:t>
+            </a:r>
+          </a:p>
+          <a:p>
+            <a:pPr marL="1200150" lvl="2" indent="-342900">
+              <a:buFont typeface="+mj-lt"/>
+              <a:buAutoNum type="arabicParenR"/>
+            </a:pPr>
+            <a:r>
+              <a:rPr lang="en-US" altLang="zh-TW" sz="1600" b="1" dirty="0"/>
+              <a:t>Initialize </a:t>
+            </a:r>
+            <a:r>
+              <a:rPr lang="en-US" altLang="zh-TW" sz="1600" b="1" dirty="0" err="1">
+                <a:hlinkClick r:id="rId7"/>
+              </a:rPr>
+              <a:t>CrawlConfig</a:t>
+            </a:r>
+            <a:r>
+              <a:rPr lang="en-US" altLang="zh-TW" sz="1600" b="1" dirty="0"/>
+              <a:t>: </a:t>
+            </a:r>
+            <a:r>
+              <a:rPr lang="en-US" altLang="zh-TW" sz="1600" dirty="0"/>
+              <a:t>Decide your crawling </a:t>
+            </a:r>
+            <a:r>
+              <a:rPr lang="en-US" altLang="zh-TW" sz="1600" dirty="0" smtClean="0"/>
+              <a:t>behavior</a:t>
+            </a:r>
+          </a:p>
+          <a:p>
+            <a:pPr marL="1200150" lvl="2" indent="-342900">
+              <a:buFont typeface="+mj-lt"/>
+              <a:buAutoNum type="arabicParenR"/>
+            </a:pPr>
+            <a:r>
+              <a:rPr lang="en-US" altLang="zh-TW" sz="1600" b="1" dirty="0"/>
+              <a:t>Initialize </a:t>
+            </a:r>
+            <a:r>
+              <a:rPr lang="en-US" altLang="zh-TW" sz="1600" b="1" dirty="0" err="1" smtClean="0">
+                <a:hlinkClick r:id="rId8"/>
+              </a:rPr>
+              <a:t>RobotstxtConfig</a:t>
+            </a:r>
+            <a:r>
+              <a:rPr lang="en-US" altLang="zh-TW" sz="1600" b="1" dirty="0" smtClean="0"/>
+              <a:t>/</a:t>
+            </a:r>
+            <a:r>
+              <a:rPr lang="en-US" altLang="zh-TW" sz="1600" b="1" dirty="0" err="1" smtClean="0">
+                <a:hlinkClick r:id="rId9"/>
+              </a:rPr>
+              <a:t>RobotstxtServer</a:t>
+            </a:r>
+            <a:r>
+              <a:rPr lang="en-US" altLang="zh-TW" sz="1600" b="1" dirty="0"/>
+              <a:t>: </a:t>
+            </a:r>
+            <a:r>
+              <a:rPr lang="en-US" altLang="zh-TW" sz="1600" dirty="0"/>
+              <a:t>It will read </a:t>
+            </a:r>
+            <a:r>
+              <a:rPr lang="en-US" altLang="zh-TW" sz="1600" dirty="0">
+                <a:hlinkClick r:id="rId10"/>
+              </a:rPr>
+              <a:t>robots.txt</a:t>
+            </a:r>
+            <a:r>
+              <a:rPr lang="en-US" altLang="zh-TW" sz="1600" dirty="0"/>
+              <a:t> to be a polite crawler.</a:t>
+            </a:r>
+          </a:p>
+          <a:p>
+            <a:pPr marL="1200150" lvl="2" indent="-342900">
+              <a:buFont typeface="+mj-lt"/>
+              <a:buAutoNum type="arabicParenR"/>
+            </a:pPr>
+            <a:r>
+              <a:rPr lang="en-US" altLang="zh-TW" sz="1600" b="1" dirty="0"/>
+              <a:t>Initialize </a:t>
+            </a:r>
+            <a:r>
+              <a:rPr lang="en-US" altLang="zh-TW" sz="1600" b="1" dirty="0" err="1">
+                <a:hlinkClick r:id="rId11"/>
+              </a:rPr>
+              <a:t>PageFetcher</a:t>
+            </a:r>
+            <a:r>
+              <a:rPr lang="en-US" altLang="zh-TW" sz="1600" b="1" dirty="0" smtClean="0"/>
+              <a:t>: </a:t>
+            </a:r>
+            <a:r>
+              <a:rPr lang="en-US" altLang="zh-TW" sz="1600" dirty="0" smtClean="0"/>
+              <a:t>Delegate the crawling work to it.</a:t>
+            </a:r>
+          </a:p>
+          <a:p>
+            <a:pPr marL="800100" lvl="1" indent="-342900">
+              <a:buFont typeface="+mj-lt"/>
+              <a:buAutoNum type="arabicPeriod"/>
+            </a:pPr>
+            <a:r>
+              <a:rPr lang="en-US" altLang="zh-TW" sz="1600" b="1" dirty="0" smtClean="0"/>
+              <a:t>Put URLs into controller via </a:t>
+            </a:r>
+            <a:r>
+              <a:rPr lang="en-US" altLang="zh-TW" sz="1600" b="1" dirty="0" err="1" smtClean="0"/>
+              <a:t>API:</a:t>
+            </a:r>
+            <a:r>
+              <a:rPr lang="en-US" altLang="zh-TW" sz="1600" b="1" dirty="0" err="1" smtClean="0"/>
+              <a:t>addSeed</a:t>
+            </a:r>
+            <a:r>
+              <a:rPr lang="en-US" altLang="zh-TW" sz="1600" b="1" dirty="0" smtClean="0"/>
+              <a:t>(…)</a:t>
+            </a:r>
+          </a:p>
+          <a:p>
+            <a:pPr marL="800100" lvl="1" indent="-342900">
+              <a:buFont typeface="+mj-lt"/>
+              <a:buAutoNum type="arabicPeriod"/>
+            </a:pPr>
+            <a:r>
+              <a:rPr lang="en-US" altLang="zh-TW" sz="1600" b="1" dirty="0" smtClean="0"/>
+              <a:t>Start the controller via </a:t>
+            </a:r>
+            <a:r>
+              <a:rPr lang="en-US" altLang="zh-TW" sz="1600" b="1" dirty="0" err="1" smtClean="0"/>
+              <a:t>API:start</a:t>
+            </a:r>
+            <a:r>
+              <a:rPr lang="en-US" altLang="zh-TW" sz="1600" b="1" dirty="0" smtClean="0"/>
+              <a:t>(…)</a:t>
+            </a:r>
+          </a:p>
+          <a:p>
+            <a:pPr marL="1200150" lvl="2" indent="-342900">
+              <a:buFont typeface="+mj-lt"/>
+              <a:buAutoNum type="arabicParenR"/>
+            </a:pPr>
+            <a:r>
+              <a:rPr lang="en-US" altLang="zh-TW" sz="1600" b="1" dirty="0" smtClean="0"/>
+              <a:t>Decide how many threads to open as working threads</a:t>
+            </a:r>
+          </a:p>
+          <a:p>
+            <a:pPr marL="1200150" lvl="2" indent="-342900">
+              <a:buFont typeface="+mj-lt"/>
+              <a:buAutoNum type="arabicParenR"/>
+            </a:pPr>
+            <a:r>
+              <a:rPr lang="en-US" altLang="zh-TW" sz="1600" b="1" dirty="0" smtClean="0"/>
+              <a:t>Decide your own Crawler implementation.</a:t>
+            </a:r>
+            <a:endParaRPr lang="zh-TW" altLang="en-US" sz="1600" b="1" dirty="0"/>
+          </a:p>
+        </p:txBody>
+      </p:sp>
+    </p:spTree>
+    <p:extLst>
+      <p:ext uri="{BB962C8B-B14F-4D97-AF65-F5344CB8AC3E}">
+        <p14:creationId xmlns:p14="http://schemas.microsoft.com/office/powerpoint/2010/main" val="3325503086"/>
+      </p:ext>
+    </p:extLst>
+  </p:cSld>
+  <p:clrMapOvr>
+    <a:masterClrMapping/>
+  </p:clrMapOvr>
+  <p:timing>
+    <p:tnLst>
+      <p:par>
+        <p:cTn id="1" dur="indefinite" restart="never" nodeType="tmRoot"/>
+      </p:par>
+    </p:tnLst>
+  </p:timing>
+</p:sld>
+</file>
+
+<file path=ppt/slides/slide4.xml><?xml version="1.0" encoding="utf-8"?>
+<p:sld xmlns:a="http://schemas.openxmlformats.org/drawingml/2006/main" xmlns:r="http://schemas.openxmlformats.org/officeDocument/2006/relationships" xmlns:p="http://schemas.openxmlformats.org/presentationml/2006/main">
+  <p:cSld>
+    <p:spTree>
+      <p:nvGrpSpPr>
+        <p:cNvPr id="1" name=""/>
+        <p:cNvGrpSpPr/>
+        <p:nvPr/>
+      </p:nvGrpSpPr>
+      <p:grpSpPr>
+        <a:xfrm>
+          <a:off x="0" y="0"/>
+          <a:ext cx="0" cy="0"/>
+          <a:chOff x="0" y="0"/>
+          <a:chExt cx="0" cy="0"/>
+        </a:xfrm>
+      </p:grpSpPr>
+      <p:sp>
+        <p:nvSpPr>
+          <p:cNvPr id="2" name="標題 1"/>
+          <p:cNvSpPr>
+            <a:spLocks noGrp="1"/>
+          </p:cNvSpPr>
+          <p:nvPr>
+            <p:ph type="title"/>
+          </p:nvPr>
+        </p:nvSpPr>
+        <p:spPr/>
+        <p:txBody>
+          <a:bodyPr>
+            <a:normAutofit/>
+          </a:bodyPr>
+          <a:lstStyle/>
+          <a:p>
+            <a:r>
+              <a:rPr lang="en-US" altLang="zh-TW" sz="3200" b="1" dirty="0" smtClean="0"/>
+              <a:t>Hello Word’s Sample Usage</a:t>
+            </a:r>
+            <a:endParaRPr lang="zh-TW" altLang="en-US" sz="3200" dirty="0"/>
+          </a:p>
+        </p:txBody>
+      </p:sp>
+      <p:sp>
+        <p:nvSpPr>
+          <p:cNvPr id="3" name="內容版面配置區 2"/>
+          <p:cNvSpPr>
+            <a:spLocks noGrp="1"/>
+          </p:cNvSpPr>
+          <p:nvPr>
+            <p:ph idx="1"/>
+          </p:nvPr>
+        </p:nvSpPr>
+        <p:spPr>
+          <a:xfrm>
+            <a:off x="457200" y="1412776"/>
+            <a:ext cx="8686800" cy="5256584"/>
+          </a:xfrm>
+        </p:spPr>
+        <p:txBody>
+          <a:bodyPr>
+            <a:normAutofit/>
+          </a:bodyPr>
+          <a:lstStyle/>
+          <a:p>
+            <a:r>
+              <a:rPr lang="en-US" altLang="zh-TW" sz="1800" dirty="0" smtClean="0"/>
+              <a:t>We need a testing page for sample </a:t>
+            </a:r>
+            <a:r>
+              <a:rPr lang="en-US" altLang="zh-TW" sz="1800" dirty="0"/>
+              <a:t>code: (</a:t>
+            </a:r>
+            <a:r>
+              <a:rPr lang="en-US" altLang="zh-TW" sz="1600" dirty="0">
+                <a:hlinkClick r:id="rId2"/>
+              </a:rPr>
+              <a:t>http://localhost/FF/crawlme/index.html</a:t>
+            </a:r>
+            <a:r>
+              <a:rPr lang="en-US" altLang="zh-TW" sz="1800" dirty="0"/>
+              <a:t>)</a:t>
+            </a:r>
+            <a:endParaRPr lang="en-US" altLang="zh-TW" sz="1800" dirty="0" smtClean="0"/>
+          </a:p>
+        </p:txBody>
+      </p:sp>
+      <p:pic>
+        <p:nvPicPr>
+          <p:cNvPr id="4" name="圖片 3"/>
+          <p:cNvPicPr>
+            <a:picLocks noChangeAspect="1"/>
+          </p:cNvPicPr>
+          <p:nvPr/>
+        </p:nvPicPr>
+        <p:blipFill>
+          <a:blip r:embed="rId3">
+            <a:extLst>
+              <a:ext uri="{28A0092B-C50C-407E-A947-70E740481C1C}">
+                <a14:useLocalDpi xmlns:a14="http://schemas.microsoft.com/office/drawing/2010/main" val="0"/>
+              </a:ext>
+            </a:extLst>
+          </a:blip>
+          <a:stretch>
+            <a:fillRect/>
+          </a:stretch>
+        </p:blipFill>
+        <p:spPr>
+          <a:xfrm>
+            <a:off x="467544" y="1142202"/>
+            <a:ext cx="6106378" cy="5715798"/>
+          </a:xfrm>
+          <a:prstGeom prst="rect">
+            <a:avLst/>
+          </a:prstGeom>
+        </p:spPr>
+      </p:pic>
+      <p:grpSp>
+        <p:nvGrpSpPr>
+          <p:cNvPr id="15" name="群組 14"/>
+          <p:cNvGrpSpPr/>
+          <p:nvPr/>
+        </p:nvGrpSpPr>
+        <p:grpSpPr>
+          <a:xfrm>
+            <a:off x="467544" y="1340768"/>
+            <a:ext cx="5186790" cy="1152128"/>
+            <a:chOff x="467544" y="1340768"/>
+            <a:chExt cx="5186790" cy="1152128"/>
+          </a:xfrm>
+        </p:grpSpPr>
+        <p:sp>
+          <p:nvSpPr>
+            <p:cNvPr id="5" name="矩形 4"/>
+            <p:cNvSpPr/>
+            <p:nvPr/>
+          </p:nvSpPr>
+          <p:spPr>
+            <a:xfrm>
+              <a:off x="467544" y="1340768"/>
+              <a:ext cx="4176464" cy="1152128"/>
+            </a:xfrm>
+            <a:prstGeom prst="rect">
+              <a:avLst/>
+            </a:prstGeom>
+            <a:noFill/>
+            <a:ln>
+              <a:solidFill>
+                <a:srgbClr val="FF0000"/>
+              </a:solidFill>
+            </a:ln>
+          </p:spPr>
+          <p:style>
+            <a:lnRef idx="2">
+              <a:schemeClr val="accent1">
+                <a:shade val="50000"/>
+              </a:schemeClr>
+            </a:lnRef>
+            <a:fillRef idx="1">
+              <a:schemeClr val="accent1"/>
+            </a:fillRef>
+            <a:effectRef idx="0">
+              <a:schemeClr val="accent1"/>
+            </a:effectRef>
+            <a:fontRef idx="minor">
+              <a:schemeClr val="lt1"/>
+            </a:fontRef>
+          </p:style>
+          <p:txBody>
+            <a:bodyPr rtlCol="0" anchor="ctr"/>
+            <a:lstStyle/>
+            <a:p>
+              <a:pPr algn="ctr"/>
+              <a:endParaRPr lang="zh-TW" altLang="en-US"/>
+            </a:p>
+          </p:txBody>
+        </p:sp>
+        <p:sp>
+          <p:nvSpPr>
+            <p:cNvPr id="6" name="文字方塊 5"/>
+            <p:cNvSpPr txBox="1"/>
+            <p:nvPr/>
+          </p:nvSpPr>
+          <p:spPr>
+            <a:xfrm>
+              <a:off x="4650854" y="1340768"/>
+              <a:ext cx="1003480" cy="338554"/>
+            </a:xfrm>
+            <a:prstGeom prst="rect">
+              <a:avLst/>
+            </a:prstGeom>
+            <a:noFill/>
+          </p:spPr>
+          <p:txBody>
+            <a:bodyPr wrap="none" rtlCol="0">
+              <a:spAutoFit/>
+            </a:bodyPr>
+            <a:lstStyle/>
+            <a:p>
+              <a:r>
+                <a:rPr lang="en-US" altLang="zh-TW" sz="1600" b="1" dirty="0" smtClean="0">
+                  <a:solidFill>
+                    <a:srgbClr val="FF0000"/>
+                  </a:solidFill>
+                </a:rPr>
+                <a:t>javascript</a:t>
+              </a:r>
+              <a:endParaRPr lang="zh-TW" altLang="en-US" sz="1600" b="1" dirty="0">
+                <a:solidFill>
+                  <a:srgbClr val="FF0000"/>
+                </a:solidFill>
+              </a:endParaRPr>
+            </a:p>
+          </p:txBody>
+        </p:sp>
+      </p:grpSp>
+      <p:grpSp>
+        <p:nvGrpSpPr>
+          <p:cNvPr id="16" name="群組 15"/>
+          <p:cNvGrpSpPr/>
+          <p:nvPr/>
+        </p:nvGrpSpPr>
+        <p:grpSpPr>
+          <a:xfrm>
+            <a:off x="467544" y="2552700"/>
+            <a:ext cx="5403286" cy="2532484"/>
+            <a:chOff x="467544" y="2552700"/>
+            <a:chExt cx="5403286" cy="2532484"/>
+          </a:xfrm>
+        </p:grpSpPr>
+        <p:sp>
+          <p:nvSpPr>
+            <p:cNvPr id="7" name="矩形 6"/>
+            <p:cNvSpPr/>
+            <p:nvPr/>
+          </p:nvSpPr>
+          <p:spPr>
+            <a:xfrm>
+              <a:off x="467544" y="2552700"/>
+              <a:ext cx="4968552" cy="2532484"/>
+            </a:xfrm>
+            <a:prstGeom prst="rect">
+              <a:avLst/>
+            </a:prstGeom>
+            <a:noFill/>
+            <a:ln>
+              <a:solidFill>
+                <a:srgbClr val="00B050"/>
+              </a:solidFill>
+            </a:ln>
+          </p:spPr>
+          <p:style>
+            <a:lnRef idx="2">
+              <a:schemeClr val="accent1">
+                <a:shade val="50000"/>
+              </a:schemeClr>
+            </a:lnRef>
+            <a:fillRef idx="1">
+              <a:schemeClr val="accent1"/>
+            </a:fillRef>
+            <a:effectRef idx="0">
+              <a:schemeClr val="accent1"/>
+            </a:effectRef>
+            <a:fontRef idx="minor">
+              <a:schemeClr val="lt1"/>
+            </a:fontRef>
+          </p:style>
+          <p:txBody>
+            <a:bodyPr rtlCol="0" anchor="ctr"/>
+            <a:lstStyle/>
+            <a:p>
+              <a:pPr algn="ctr"/>
+              <a:endParaRPr lang="zh-TW" altLang="en-US"/>
+            </a:p>
+          </p:txBody>
+        </p:sp>
+        <p:sp>
+          <p:nvSpPr>
+            <p:cNvPr id="8" name="文字方塊 7"/>
+            <p:cNvSpPr txBox="1"/>
+            <p:nvPr/>
+          </p:nvSpPr>
+          <p:spPr>
+            <a:xfrm>
+              <a:off x="5436096" y="2565147"/>
+              <a:ext cx="434734" cy="338554"/>
+            </a:xfrm>
+            <a:prstGeom prst="rect">
+              <a:avLst/>
+            </a:prstGeom>
+            <a:noFill/>
+            <a:ln>
+              <a:noFill/>
+            </a:ln>
+          </p:spPr>
+          <p:txBody>
+            <a:bodyPr wrap="none" rtlCol="0">
+              <a:spAutoFit/>
+            </a:bodyPr>
+            <a:lstStyle/>
+            <a:p>
+              <a:r>
+                <a:rPr lang="en-US" altLang="zh-TW" sz="1600" b="1" dirty="0" err="1" smtClean="0">
+                  <a:solidFill>
+                    <a:srgbClr val="00B050"/>
+                  </a:solidFill>
+                </a:rPr>
+                <a:t>css</a:t>
+              </a:r>
+              <a:endParaRPr lang="zh-TW" altLang="en-US" sz="1600" b="1" dirty="0">
+                <a:solidFill>
+                  <a:srgbClr val="00B050"/>
+                </a:solidFill>
+              </a:endParaRPr>
+            </a:p>
+          </p:txBody>
+        </p:sp>
+      </p:grpSp>
+      <p:grpSp>
+        <p:nvGrpSpPr>
+          <p:cNvPr id="17" name="群組 16"/>
+          <p:cNvGrpSpPr/>
+          <p:nvPr/>
+        </p:nvGrpSpPr>
+        <p:grpSpPr>
+          <a:xfrm>
+            <a:off x="611560" y="5429096"/>
+            <a:ext cx="6794050" cy="338554"/>
+            <a:chOff x="611560" y="5429096"/>
+            <a:chExt cx="6794050" cy="338554"/>
+          </a:xfrm>
+        </p:grpSpPr>
+        <p:sp>
+          <p:nvSpPr>
+            <p:cNvPr id="9" name="矩形 8"/>
+            <p:cNvSpPr/>
+            <p:nvPr/>
+          </p:nvSpPr>
+          <p:spPr>
+            <a:xfrm>
+              <a:off x="611560" y="5445224"/>
+              <a:ext cx="4824536" cy="279301"/>
+            </a:xfrm>
+            <a:prstGeom prst="rect">
+              <a:avLst/>
+            </a:prstGeom>
+            <a:noFill/>
+            <a:ln>
+              <a:solidFill>
+                <a:srgbClr val="FFC000"/>
+              </a:solidFill>
+            </a:ln>
+          </p:spPr>
+          <p:style>
+            <a:lnRef idx="2">
+              <a:schemeClr val="accent1">
+                <a:shade val="50000"/>
+              </a:schemeClr>
+            </a:lnRef>
+            <a:fillRef idx="1">
+              <a:schemeClr val="accent1"/>
+            </a:fillRef>
+            <a:effectRef idx="0">
+              <a:schemeClr val="accent1"/>
+            </a:effectRef>
+            <a:fontRef idx="minor">
+              <a:schemeClr val="lt1"/>
+            </a:fontRef>
+          </p:style>
+          <p:txBody>
+            <a:bodyPr rtlCol="0" anchor="ctr"/>
+            <a:lstStyle/>
+            <a:p>
+              <a:pPr algn="ctr"/>
+              <a:endParaRPr lang="zh-TW" altLang="en-US"/>
+            </a:p>
+          </p:txBody>
+        </p:sp>
+        <p:sp>
+          <p:nvSpPr>
+            <p:cNvPr id="10" name="文字方塊 9"/>
+            <p:cNvSpPr txBox="1"/>
+            <p:nvPr/>
+          </p:nvSpPr>
+          <p:spPr>
+            <a:xfrm>
+              <a:off x="5436096" y="5429096"/>
+              <a:ext cx="1969514" cy="338554"/>
+            </a:xfrm>
+            <a:prstGeom prst="rect">
+              <a:avLst/>
+            </a:prstGeom>
+            <a:noFill/>
+          </p:spPr>
+          <p:txBody>
+            <a:bodyPr wrap="none" rtlCol="0">
+              <a:spAutoFit/>
+            </a:bodyPr>
+            <a:lstStyle/>
+            <a:p>
+              <a:r>
+                <a:rPr lang="en-US" altLang="zh-TW" sz="1600" b="1" dirty="0" smtClean="0">
+                  <a:solidFill>
+                    <a:srgbClr val="FFC000"/>
+                  </a:solidFill>
+                </a:rPr>
+                <a:t>HTML page elements</a:t>
+              </a:r>
+              <a:endParaRPr lang="zh-TW" altLang="en-US" sz="1600" b="1" dirty="0">
+                <a:solidFill>
+                  <a:srgbClr val="FFC000"/>
+                </a:solidFill>
+              </a:endParaRPr>
+            </a:p>
+          </p:txBody>
+        </p:sp>
+      </p:grpSp>
+      <p:grpSp>
+        <p:nvGrpSpPr>
+          <p:cNvPr id="18" name="群組 17"/>
+          <p:cNvGrpSpPr/>
+          <p:nvPr/>
+        </p:nvGrpSpPr>
+        <p:grpSpPr>
+          <a:xfrm>
+            <a:off x="611560" y="5826750"/>
+            <a:ext cx="6732815" cy="338554"/>
+            <a:chOff x="611560" y="5826750"/>
+            <a:chExt cx="6732815" cy="338554"/>
+          </a:xfrm>
+        </p:grpSpPr>
+        <p:sp>
+          <p:nvSpPr>
+            <p:cNvPr id="11" name="矩形 10"/>
+            <p:cNvSpPr/>
+            <p:nvPr/>
+          </p:nvSpPr>
+          <p:spPr>
+            <a:xfrm>
+              <a:off x="611560" y="5877272"/>
+              <a:ext cx="4824536" cy="288032"/>
+            </a:xfrm>
+            <a:prstGeom prst="rect">
+              <a:avLst/>
+            </a:prstGeom>
+            <a:noFill/>
+            <a:ln>
+              <a:solidFill>
+                <a:srgbClr val="7030A0"/>
+              </a:solidFill>
+            </a:ln>
+          </p:spPr>
+          <p:style>
+            <a:lnRef idx="2">
+              <a:schemeClr val="accent1">
+                <a:shade val="50000"/>
+              </a:schemeClr>
+            </a:lnRef>
+            <a:fillRef idx="1">
+              <a:schemeClr val="accent1"/>
+            </a:fillRef>
+            <a:effectRef idx="0">
+              <a:schemeClr val="accent1"/>
+            </a:effectRef>
+            <a:fontRef idx="minor">
+              <a:schemeClr val="lt1"/>
+            </a:fontRef>
+          </p:style>
+          <p:txBody>
+            <a:bodyPr rtlCol="0" anchor="ctr"/>
+            <a:lstStyle/>
+            <a:p>
+              <a:pPr algn="ctr"/>
+              <a:endParaRPr lang="zh-TW" altLang="en-US"/>
+            </a:p>
+          </p:txBody>
+        </p:sp>
+        <p:sp>
+          <p:nvSpPr>
+            <p:cNvPr id="12" name="文字方塊 11"/>
+            <p:cNvSpPr txBox="1"/>
+            <p:nvPr/>
+          </p:nvSpPr>
+          <p:spPr>
+            <a:xfrm>
+              <a:off x="5436096" y="5826750"/>
+              <a:ext cx="1908279" cy="338554"/>
+            </a:xfrm>
+            <a:prstGeom prst="rect">
+              <a:avLst/>
+            </a:prstGeom>
+            <a:noFill/>
+          </p:spPr>
+          <p:txBody>
+            <a:bodyPr wrap="none" rtlCol="0">
+              <a:spAutoFit/>
+            </a:bodyPr>
+            <a:lstStyle/>
+            <a:p>
+              <a:r>
+                <a:rPr lang="en-US" altLang="zh-TW" sz="1600" b="1" dirty="0" smtClean="0">
+                  <a:solidFill>
+                    <a:srgbClr val="7030A0"/>
+                  </a:solidFill>
+                </a:rPr>
+                <a:t>Valid/Invalid outlink</a:t>
+              </a:r>
+              <a:endParaRPr lang="zh-TW" altLang="en-US" sz="1600" b="1" dirty="0">
+                <a:solidFill>
+                  <a:srgbClr val="7030A0"/>
+                </a:solidFill>
+              </a:endParaRPr>
+            </a:p>
+          </p:txBody>
+        </p:sp>
+      </p:grpSp>
+      <p:grpSp>
+        <p:nvGrpSpPr>
+          <p:cNvPr id="19" name="群組 18"/>
+          <p:cNvGrpSpPr/>
+          <p:nvPr/>
+        </p:nvGrpSpPr>
+        <p:grpSpPr>
+          <a:xfrm>
+            <a:off x="611560" y="6392071"/>
+            <a:ext cx="3433559" cy="338554"/>
+            <a:chOff x="611560" y="6392071"/>
+            <a:chExt cx="3433559" cy="338554"/>
+          </a:xfrm>
+        </p:grpSpPr>
+        <p:sp>
+          <p:nvSpPr>
+            <p:cNvPr id="13" name="矩形 12"/>
+            <p:cNvSpPr/>
+            <p:nvPr/>
+          </p:nvSpPr>
+          <p:spPr>
+            <a:xfrm>
+              <a:off x="611560" y="6453336"/>
+              <a:ext cx="2412268" cy="216024"/>
+            </a:xfrm>
+            <a:prstGeom prst="rect">
+              <a:avLst/>
+            </a:prstGeom>
+            <a:noFill/>
+            <a:ln>
+              <a:solidFill>
+                <a:srgbClr val="0070C0"/>
+              </a:solidFill>
+            </a:ln>
+          </p:spPr>
+          <p:style>
+            <a:lnRef idx="2">
+              <a:schemeClr val="accent1">
+                <a:shade val="50000"/>
+              </a:schemeClr>
+            </a:lnRef>
+            <a:fillRef idx="1">
+              <a:schemeClr val="accent1"/>
+            </a:fillRef>
+            <a:effectRef idx="0">
+              <a:schemeClr val="accent1"/>
+            </a:effectRef>
+            <a:fontRef idx="minor">
+              <a:schemeClr val="lt1"/>
+            </a:fontRef>
+          </p:style>
+          <p:txBody>
+            <a:bodyPr rtlCol="0" anchor="ctr"/>
+            <a:lstStyle/>
+            <a:p>
+              <a:pPr algn="ctr"/>
+              <a:endParaRPr lang="zh-TW" altLang="en-US"/>
+            </a:p>
+          </p:txBody>
+        </p:sp>
+        <p:sp>
+          <p:nvSpPr>
+            <p:cNvPr id="14" name="文字方塊 13"/>
+            <p:cNvSpPr txBox="1"/>
+            <p:nvPr/>
+          </p:nvSpPr>
+          <p:spPr>
+            <a:xfrm>
+              <a:off x="3030674" y="6392071"/>
+              <a:ext cx="1014445" cy="338554"/>
+            </a:xfrm>
+            <a:prstGeom prst="rect">
+              <a:avLst/>
+            </a:prstGeom>
+            <a:noFill/>
+          </p:spPr>
+          <p:txBody>
+            <a:bodyPr wrap="none" rtlCol="0">
+              <a:spAutoFit/>
+            </a:bodyPr>
+            <a:lstStyle/>
+            <a:p>
+              <a:r>
+                <a:rPr lang="en-US" altLang="zh-TW" sz="1600" b="1" dirty="0">
+                  <a:solidFill>
+                    <a:srgbClr val="0070C0"/>
+                  </a:solidFill>
+                </a:rPr>
+                <a:t>i</a:t>
+              </a:r>
+              <a:r>
+                <a:rPr lang="en-US" altLang="zh-TW" sz="1600" b="1" dirty="0" smtClean="0">
+                  <a:solidFill>
+                    <a:srgbClr val="0070C0"/>
+                  </a:solidFill>
+                </a:rPr>
+                <a:t>mage file</a:t>
+              </a:r>
+              <a:endParaRPr lang="zh-TW" altLang="en-US" sz="1600" b="1" dirty="0">
+                <a:solidFill>
+                  <a:srgbClr val="0070C0"/>
+                </a:solidFill>
+              </a:endParaRPr>
+            </a:p>
+          </p:txBody>
+        </p:sp>
+      </p:grpSp>
+    </p:spTree>
+    <p:extLst>
+      <p:ext uri="{BB962C8B-B14F-4D97-AF65-F5344CB8AC3E}">
+        <p14:creationId xmlns:p14="http://schemas.microsoft.com/office/powerpoint/2010/main" val="1092755802"/>
+      </p:ext>
+    </p:extLst>
+  </p:cSld>
+  <p:clrMapOvr>
+    <a:masterClrMapping/>
+  </p:clrMapOvr>
+  <p:timing>
+    <p:tnLst>
+      <p:par>
+        <p:cTn id="1" dur="indefinite" restart="never" nodeType="tmRoot">
+          <p:childTnLst>
+            <p:seq concurrent="1" nextAc="seek">
+              <p:cTn id="2" dur="indefinite" nodeType="mainSeq">
+                <p:childTnLst>
+                  <p:par>
+                    <p:cTn id="3" fill="hold">
+                      <p:stCondLst>
+                        <p:cond delay="indefinite"/>
+                      </p:stCondLst>
+                      <p:childTnLst>
+                        <p:par>
+                          <p:cTn id="4" fill="hold">
+                            <p:stCondLst>
+                              <p:cond delay="0"/>
+                            </p:stCondLst>
+                            <p:childTnLst>
+                              <p:par>
+                                <p:cTn id="5" presetID="10" presetClass="entr" presetSubtype="0" fill="hold" nodeType="clickEffect">
+                                  <p:stCondLst>
+                                    <p:cond delay="0"/>
+                                  </p:stCondLst>
+                                  <p:childTnLst>
+                                    <p:set>
+                                      <p:cBhvr>
+                                        <p:cTn id="6" dur="1" fill="hold">
+                                          <p:stCondLst>
+                                            <p:cond delay="0"/>
+                                          </p:stCondLst>
+                                        </p:cTn>
+                                        <p:tgtEl>
+                                          <p:spTgt spid="4"/>
+                                        </p:tgtEl>
+                                        <p:attrNameLst>
+                                          <p:attrName>style.visibility</p:attrName>
+                                        </p:attrNameLst>
+                                      </p:cBhvr>
+                                      <p:to>
+                                        <p:strVal val="visible"/>
+                                      </p:to>
+                                    </p:set>
+                                    <p:animEffect transition="in" filter="fade">
+                                      <p:cBhvr>
+                                        <p:cTn id="7" dur="500"/>
+                                        <p:tgtEl>
+                                          <p:spTgt spid="4"/>
+                                        </p:tgtEl>
+                                      </p:cBhvr>
+                                    </p:animEffect>
+                                  </p:childTnLst>
+                                </p:cTn>
+                              </p:par>
+                            </p:childTnLst>
+                          </p:cTn>
+                        </p:par>
+                      </p:childTnLst>
+                    </p:cTn>
+                  </p:par>
+                  <p:par>
+                    <p:cTn id="8" fill="hold">
+                      <p:stCondLst>
+                        <p:cond delay="indefinite"/>
+                      </p:stCondLst>
+                      <p:childTnLst>
+                        <p:par>
+                          <p:cTn id="9" fill="hold">
+                            <p:stCondLst>
+                              <p:cond delay="0"/>
+                            </p:stCondLst>
+                            <p:childTnLst>
+                              <p:par>
+                                <p:cTn id="10" presetID="10" presetClass="entr" presetSubtype="0" fill="hold" nodeType="clickEffect">
+                                  <p:stCondLst>
+                                    <p:cond delay="0"/>
+                                  </p:stCondLst>
+                                  <p:childTnLst>
+                                    <p:set>
+                                      <p:cBhvr>
+                                        <p:cTn id="11" dur="1" fill="hold">
+                                          <p:stCondLst>
+                                            <p:cond delay="0"/>
+                                          </p:stCondLst>
+                                        </p:cTn>
+                                        <p:tgtEl>
+                                          <p:spTgt spid="15"/>
+                                        </p:tgtEl>
+                                        <p:attrNameLst>
+                                          <p:attrName>style.visibility</p:attrName>
+                                        </p:attrNameLst>
+                                      </p:cBhvr>
+                                      <p:to>
+                                        <p:strVal val="visible"/>
+                                      </p:to>
+                                    </p:set>
+                                    <p:animEffect transition="in" filter="fade">
+                                      <p:cBhvr>
+                                        <p:cTn id="12" dur="500"/>
+                                        <p:tgtEl>
+                                          <p:spTgt spid="15"/>
+                                        </p:tgtEl>
+                                      </p:cBhvr>
+                                    </p:animEffect>
+                                  </p:childTnLst>
+                                </p:cTn>
+                              </p:par>
+                            </p:childTnLst>
+                          </p:cTn>
+                        </p:par>
+                      </p:childTnLst>
+                    </p:cTn>
+                  </p:par>
+                  <p:par>
+                    <p:cTn id="13" fill="hold">
+                      <p:stCondLst>
+                        <p:cond delay="indefinite"/>
+                      </p:stCondLst>
+                      <p:childTnLst>
+                        <p:par>
+                          <p:cTn id="14" fill="hold">
+                            <p:stCondLst>
+                              <p:cond delay="0"/>
+                            </p:stCondLst>
+                            <p:childTnLst>
+                              <p:par>
+                                <p:cTn id="15" presetID="10" presetClass="entr" presetSubtype="0" fill="hold" nodeType="clickEffect">
+                                  <p:stCondLst>
+                                    <p:cond delay="0"/>
+                                  </p:stCondLst>
+                                  <p:childTnLst>
+                                    <p:set>
+                                      <p:cBhvr>
+                                        <p:cTn id="16" dur="1" fill="hold">
+                                          <p:stCondLst>
+                                            <p:cond delay="0"/>
+                                          </p:stCondLst>
+                                        </p:cTn>
+                                        <p:tgtEl>
+                                          <p:spTgt spid="16"/>
+                                        </p:tgtEl>
+                                        <p:attrNameLst>
+                                          <p:attrName>style.visibility</p:attrName>
+                                        </p:attrNameLst>
+                                      </p:cBhvr>
+                                      <p:to>
+                                        <p:strVal val="visible"/>
+                                      </p:to>
+                                    </p:set>
+                                    <p:animEffect transition="in" filter="fade">
+                                      <p:cBhvr>
+                                        <p:cTn id="17" dur="500"/>
+                                        <p:tgtEl>
+                                          <p:spTgt spid="16"/>
+                                        </p:tgtEl>
+                                      </p:cBhvr>
+                                    </p:animEffect>
+                                  </p:childTnLst>
+                                </p:cTn>
+                              </p:par>
+                            </p:childTnLst>
+                          </p:cTn>
+                        </p:par>
+                      </p:childTnLst>
+                    </p:cTn>
+                  </p:par>
+                  <p:par>
+                    <p:cTn id="18" fill="hold">
+                      <p:stCondLst>
+                        <p:cond delay="indefinite"/>
+                      </p:stCondLst>
+                      <p:childTnLst>
+                        <p:par>
+                          <p:cTn id="19" fill="hold">
+                            <p:stCondLst>
+                              <p:cond delay="0"/>
+                            </p:stCondLst>
+                            <p:childTnLst>
+                              <p:par>
+                                <p:cTn id="20" presetID="10" presetClass="entr" presetSubtype="0" fill="hold" nodeType="clickEffect">
+                                  <p:stCondLst>
+                                    <p:cond delay="0"/>
+                                  </p:stCondLst>
+                                  <p:childTnLst>
+                                    <p:set>
+                                      <p:cBhvr>
+                                        <p:cTn id="21" dur="1" fill="hold">
+                                          <p:stCondLst>
+                                            <p:cond delay="0"/>
+                                          </p:stCondLst>
+                                        </p:cTn>
+                                        <p:tgtEl>
+                                          <p:spTgt spid="17"/>
+                                        </p:tgtEl>
+                                        <p:attrNameLst>
+                                          <p:attrName>style.visibility</p:attrName>
+                                        </p:attrNameLst>
+                                      </p:cBhvr>
+                                      <p:to>
+                                        <p:strVal val="visible"/>
+                                      </p:to>
+                                    </p:set>
+                                    <p:animEffect transition="in" filter="fade">
+                                      <p:cBhvr>
+                                        <p:cTn id="22" dur="500"/>
+                                        <p:tgtEl>
+                                          <p:spTgt spid="17"/>
+                                        </p:tgtEl>
+                                      </p:cBhvr>
+                                    </p:animEffect>
+                                  </p:childTnLst>
+                                </p:cTn>
+                              </p:par>
+                            </p:childTnLst>
+                          </p:cTn>
+                        </p:par>
+                      </p:childTnLst>
+                    </p:cTn>
+                  </p:par>
+                  <p:par>
+                    <p:cTn id="23" fill="hold">
+                      <p:stCondLst>
+                        <p:cond delay="indefinite"/>
+                      </p:stCondLst>
+                      <p:childTnLst>
+                        <p:par>
+                          <p:cTn id="24" fill="hold">
+                            <p:stCondLst>
+                              <p:cond delay="0"/>
+                            </p:stCondLst>
+                            <p:childTnLst>
+                              <p:par>
+                                <p:cTn id="25" presetID="10" presetClass="entr" presetSubtype="0" fill="hold" nodeType="clickEffect">
+                                  <p:stCondLst>
+                                    <p:cond delay="0"/>
+                                  </p:stCondLst>
+                                  <p:childTnLst>
+                                    <p:set>
+                                      <p:cBhvr>
+                                        <p:cTn id="26" dur="1" fill="hold">
+                                          <p:stCondLst>
+                                            <p:cond delay="0"/>
+                                          </p:stCondLst>
+                                        </p:cTn>
+                                        <p:tgtEl>
+                                          <p:spTgt spid="18"/>
+                                        </p:tgtEl>
+                                        <p:attrNameLst>
+                                          <p:attrName>style.visibility</p:attrName>
+                                        </p:attrNameLst>
+                                      </p:cBhvr>
+                                      <p:to>
+                                        <p:strVal val="visible"/>
+                                      </p:to>
+                                    </p:set>
+                                    <p:animEffect transition="in" filter="fade">
+                                      <p:cBhvr>
+                                        <p:cTn id="27" dur="500"/>
+                                        <p:tgtEl>
+                                          <p:spTgt spid="18"/>
+                                        </p:tgtEl>
+                                      </p:cBhvr>
+                                    </p:animEffect>
+                                  </p:childTnLst>
+                                </p:cTn>
+                              </p:par>
+                            </p:childTnLst>
+                          </p:cTn>
+                        </p:par>
+                      </p:childTnLst>
+                    </p:cTn>
+                  </p:par>
+                  <p:par>
+                    <p:cTn id="28" fill="hold">
+                      <p:stCondLst>
+                        <p:cond delay="indefinite"/>
+                      </p:stCondLst>
+                      <p:childTnLst>
+                        <p:par>
+                          <p:cTn id="29" fill="hold">
+                            <p:stCondLst>
+                              <p:cond delay="0"/>
+                            </p:stCondLst>
+                            <p:childTnLst>
+                              <p:par>
+                                <p:cTn id="30" presetID="10" presetClass="entr" presetSubtype="0" fill="hold" nodeType="clickEffect">
+                                  <p:stCondLst>
+                                    <p:cond delay="0"/>
+                                  </p:stCondLst>
+                                  <p:childTnLst>
+                                    <p:set>
+                                      <p:cBhvr>
+                                        <p:cTn id="31" dur="1" fill="hold">
+                                          <p:stCondLst>
+                                            <p:cond delay="0"/>
+                                          </p:stCondLst>
+                                        </p:cTn>
+                                        <p:tgtEl>
+                                          <p:spTgt spid="19"/>
+                                        </p:tgtEl>
+                                        <p:attrNameLst>
+                                          <p:attrName>style.visibility</p:attrName>
+                                        </p:attrNameLst>
+                                      </p:cBhvr>
+                                      <p:to>
+                                        <p:strVal val="visible"/>
+                                      </p:to>
+                                    </p:set>
+                                    <p:animEffect transition="in" filter="fade">
+                                      <p:cBhvr>
+                                        <p:cTn id="32" dur="500"/>
+                                        <p:tgtEl>
+                                          <p:spTgt spid="19"/>
+                                        </p:tgtEl>
+                                      </p:cBhvr>
+                                    </p:animEffect>
+                                  </p:childTnLst>
+                                </p:cTn>
+                              </p:par>
+                            </p:childTnLst>
+                          </p:cTn>
+                        </p:par>
+                      </p:childTnLst>
+                    </p:cTn>
+                  </p:par>
+                </p:childTnLst>
+              </p:cTn>
+              <p:prevCondLst>
+                <p:cond evt="onPrev" delay="0">
+                  <p:tgtEl>
+                    <p:sldTgt/>
+                  </p:tgtEl>
+                </p:cond>
+              </p:prevCondLst>
+              <p:nextCondLst>
+                <p:cond evt="onNext" delay="0">
+                  <p:tgtEl>
+                    <p:sldTgt/>
+                  </p:tgtEl>
+                </p:cond>
+              </p:nextCondLst>
+            </p:seq>
+          </p:childTnLst>
+        </p:cTn>
+      </p:par>
+    </p:tnLst>
+  </p:timing>
+</p:sld>
+</file>
+
+<file path=ppt/slides/slide5.xml><?xml version="1.0" encoding="utf-8"?>
+<p:sld xmlns:a="http://schemas.openxmlformats.org/drawingml/2006/main" xmlns:r="http://schemas.openxmlformats.org/officeDocument/2006/relationships" xmlns:p="http://schemas.openxmlformats.org/presentationml/2006/main">
+  <p:cSld>
+    <p:spTree>
+      <p:nvGrpSpPr>
+        <p:cNvPr id="1" name=""/>
+        <p:cNvGrpSpPr/>
+        <p:nvPr/>
+      </p:nvGrpSpPr>
+      <p:grpSpPr>
+        <a:xfrm>
+          <a:off x="0" y="0"/>
+          <a:ext cx="0" cy="0"/>
+          <a:chOff x="0" y="0"/>
+          <a:chExt cx="0" cy="0"/>
+        </a:xfrm>
+      </p:grpSpPr>
+      <p:sp>
+        <p:nvSpPr>
+          <p:cNvPr id="2" name="標題 1"/>
+          <p:cNvSpPr>
+            <a:spLocks noGrp="1"/>
+          </p:cNvSpPr>
+          <p:nvPr>
+            <p:ph type="title"/>
+          </p:nvPr>
+        </p:nvSpPr>
+        <p:spPr/>
+        <p:txBody>
+          <a:bodyPr>
+            <a:normAutofit/>
+          </a:bodyPr>
+          <a:lstStyle/>
+          <a:p>
+            <a:r>
+              <a:rPr lang="en-US" altLang="zh-TW" sz="3200" b="1" dirty="0" smtClean="0"/>
+              <a:t>Hello Word’s Sample Usage</a:t>
+            </a:r>
+            <a:endParaRPr lang="zh-TW" altLang="en-US" sz="3200" dirty="0"/>
+          </a:p>
+        </p:txBody>
+      </p:sp>
+      <p:sp>
+        <p:nvSpPr>
+          <p:cNvPr id="3" name="內容版面配置區 2"/>
+          <p:cNvSpPr>
+            <a:spLocks noGrp="1"/>
+          </p:cNvSpPr>
+          <p:nvPr>
+            <p:ph idx="1"/>
+          </p:nvPr>
+        </p:nvSpPr>
+        <p:spPr>
+          <a:xfrm>
+            <a:off x="457200" y="1412776"/>
+            <a:ext cx="8686800" cy="5256584"/>
+          </a:xfrm>
+        </p:spPr>
+        <p:txBody>
+          <a:bodyPr>
+            <a:normAutofit/>
+          </a:bodyPr>
+          <a:lstStyle/>
+          <a:p>
+            <a:r>
+              <a:rPr lang="en-US" altLang="zh-TW" sz="1800" dirty="0" smtClean="0"/>
+              <a:t>Below is the sample code:</a:t>
+            </a:r>
+          </a:p>
+          <a:p>
+            <a:pPr lvl="1"/>
+            <a:r>
+              <a:rPr lang="en-US" altLang="zh-TW" sz="1600" dirty="0" smtClean="0"/>
+              <a:t>Step1. MyCrawler.java (Only display crawling information)</a:t>
+            </a:r>
+          </a:p>
+          <a:p>
+            <a:pPr lvl="1"/>
+            <a:r>
+              <a:rPr lang="en-US" altLang="zh-TW" sz="1600" dirty="0" smtClean="0"/>
+              <a:t>Step2. Initialize CrawlController</a:t>
+            </a:r>
+          </a:p>
+          <a:p>
+            <a:pPr lvl="1"/>
+            <a:r>
+              <a:rPr lang="en-US" altLang="zh-TW" sz="1600" dirty="0" smtClean="0"/>
+              <a:t>Step3. Give your crawling URL(s)</a:t>
+            </a:r>
+          </a:p>
+          <a:p>
+            <a:pPr lvl="1"/>
+            <a:endParaRPr lang="en-US" altLang="zh-TW" sz="1600" dirty="0"/>
+          </a:p>
+          <a:p>
+            <a:pPr lvl="1"/>
+            <a:endParaRPr lang="en-US" altLang="zh-TW" sz="1600" dirty="0" smtClean="0"/>
+          </a:p>
+          <a:p>
+            <a:pPr lvl="1"/>
+            <a:endParaRPr lang="en-US" altLang="zh-TW" sz="1600" dirty="0"/>
+          </a:p>
+          <a:p>
+            <a:pPr lvl="1"/>
+            <a:endParaRPr lang="en-US" altLang="zh-TW" sz="1600" dirty="0" smtClean="0"/>
+          </a:p>
+          <a:p>
+            <a:pPr lvl="1"/>
+            <a:endParaRPr lang="en-US" altLang="zh-TW" sz="1600" dirty="0" smtClean="0"/>
+          </a:p>
+          <a:p>
+            <a:pPr lvl="1"/>
+            <a:endParaRPr lang="en-US" altLang="zh-TW" sz="1600" dirty="0"/>
+          </a:p>
+          <a:p>
+            <a:pPr lvl="1"/>
+            <a:r>
+              <a:rPr lang="en-US" altLang="zh-TW" sz="1600" dirty="0" smtClean="0"/>
+              <a:t>Step4. Start crawling:</a:t>
+            </a:r>
+          </a:p>
+          <a:p>
+            <a:pPr lvl="1"/>
+            <a:endParaRPr lang="en-US" altLang="zh-TW" sz="1600" dirty="0" smtClean="0"/>
+          </a:p>
+        </p:txBody>
+      </p:sp>
+      <p:pic>
+        <p:nvPicPr>
+          <p:cNvPr id="22" name="圖片 21"/>
+          <p:cNvPicPr>
+            <a:picLocks noChangeAspect="1"/>
+          </p:cNvPicPr>
+          <p:nvPr/>
+        </p:nvPicPr>
+        <p:blipFill>
+          <a:blip r:embed="rId2">
+            <a:extLst>
+              <a:ext uri="{28A0092B-C50C-407E-A947-70E740481C1C}">
+                <a14:useLocalDpi xmlns:a14="http://schemas.microsoft.com/office/drawing/2010/main" val="0"/>
+              </a:ext>
+            </a:extLst>
+          </a:blip>
+          <a:stretch>
+            <a:fillRect/>
+          </a:stretch>
+        </p:blipFill>
+        <p:spPr>
+          <a:xfrm>
+            <a:off x="971600" y="2348880"/>
+            <a:ext cx="6754168" cy="1676634"/>
+          </a:xfrm>
+          <a:prstGeom prst="rect">
+            <a:avLst/>
+          </a:prstGeom>
+        </p:spPr>
+      </p:pic>
+      <p:pic>
+        <p:nvPicPr>
+          <p:cNvPr id="23" name="圖片 22"/>
+          <p:cNvPicPr>
+            <a:picLocks noChangeAspect="1"/>
+          </p:cNvPicPr>
+          <p:nvPr/>
+        </p:nvPicPr>
+        <p:blipFill>
+          <a:blip r:embed="rId3">
+            <a:extLst>
+              <a:ext uri="{28A0092B-C50C-407E-A947-70E740481C1C}">
+                <a14:useLocalDpi xmlns:a14="http://schemas.microsoft.com/office/drawing/2010/main" val="0"/>
+              </a:ext>
+            </a:extLst>
+          </a:blip>
+          <a:stretch>
+            <a:fillRect/>
+          </a:stretch>
+        </p:blipFill>
+        <p:spPr>
+          <a:xfrm>
+            <a:off x="996008" y="2687064"/>
+            <a:ext cx="5801535" cy="1000265"/>
+          </a:xfrm>
+          <a:prstGeom prst="rect">
+            <a:avLst/>
+          </a:prstGeom>
+          <a:effectLst>
+            <a:glow rad="228600">
+              <a:schemeClr val="accent4">
+                <a:satMod val="175000"/>
+                <a:alpha val="40000"/>
+              </a:schemeClr>
+            </a:glow>
+          </a:effectLst>
+        </p:spPr>
+      </p:pic>
+      <p:pic>
+        <p:nvPicPr>
+          <p:cNvPr id="24" name="圖片 23"/>
+          <p:cNvPicPr>
+            <a:picLocks noChangeAspect="1"/>
+          </p:cNvPicPr>
+          <p:nvPr/>
+        </p:nvPicPr>
+        <p:blipFill>
+          <a:blip r:embed="rId4">
+            <a:extLst>
+              <a:ext uri="{28A0092B-C50C-407E-A947-70E740481C1C}">
+                <a14:useLocalDpi xmlns:a14="http://schemas.microsoft.com/office/drawing/2010/main" val="0"/>
+              </a:ext>
+            </a:extLst>
+          </a:blip>
+          <a:stretch>
+            <a:fillRect/>
+          </a:stretch>
+        </p:blipFill>
+        <p:spPr>
+          <a:xfrm>
+            <a:off x="1115616" y="2780928"/>
+            <a:ext cx="6192115" cy="1000265"/>
+          </a:xfrm>
+          <a:prstGeom prst="rect">
+            <a:avLst/>
+          </a:prstGeom>
+          <a:effectLst>
+            <a:glow rad="228600">
+              <a:schemeClr val="accent4">
+                <a:satMod val="175000"/>
+                <a:alpha val="40000"/>
+              </a:schemeClr>
+            </a:glow>
+          </a:effectLst>
+        </p:spPr>
+      </p:pic>
+      <p:pic>
+        <p:nvPicPr>
+          <p:cNvPr id="25" name="圖片 24"/>
+          <p:cNvPicPr>
+            <a:picLocks noChangeAspect="1"/>
+          </p:cNvPicPr>
+          <p:nvPr/>
+        </p:nvPicPr>
+        <p:blipFill>
+          <a:blip r:embed="rId5">
+            <a:extLst>
+              <a:ext uri="{28A0092B-C50C-407E-A947-70E740481C1C}">
+                <a14:useLocalDpi xmlns:a14="http://schemas.microsoft.com/office/drawing/2010/main" val="0"/>
+              </a:ext>
+            </a:extLst>
+          </a:blip>
+          <a:stretch>
+            <a:fillRect/>
+          </a:stretch>
+        </p:blipFill>
+        <p:spPr>
+          <a:xfrm>
+            <a:off x="1157363" y="2853775"/>
+            <a:ext cx="6382641" cy="1667108"/>
+          </a:xfrm>
+          <a:prstGeom prst="rect">
+            <a:avLst/>
+          </a:prstGeom>
+          <a:effectLst>
+            <a:glow rad="228600">
+              <a:schemeClr val="accent4">
+                <a:satMod val="175000"/>
+                <a:alpha val="40000"/>
+              </a:schemeClr>
+            </a:glow>
+          </a:effectLst>
+        </p:spPr>
+      </p:pic>
+      <p:pic>
+        <p:nvPicPr>
+          <p:cNvPr id="26" name="圖片 25"/>
+          <p:cNvPicPr>
+            <a:picLocks noChangeAspect="1"/>
+          </p:cNvPicPr>
+          <p:nvPr/>
+        </p:nvPicPr>
+        <p:blipFill>
+          <a:blip r:embed="rId6">
+            <a:extLst>
+              <a:ext uri="{28A0092B-C50C-407E-A947-70E740481C1C}">
+                <a14:useLocalDpi xmlns:a14="http://schemas.microsoft.com/office/drawing/2010/main" val="0"/>
+              </a:ext>
+            </a:extLst>
+          </a:blip>
+          <a:stretch>
+            <a:fillRect/>
+          </a:stretch>
+        </p:blipFill>
+        <p:spPr>
+          <a:xfrm>
+            <a:off x="1185591" y="2914334"/>
+            <a:ext cx="7563906" cy="1286055"/>
+          </a:xfrm>
+          <a:prstGeom prst="rect">
+            <a:avLst/>
+          </a:prstGeom>
+          <a:effectLst>
+            <a:glow rad="228600">
+              <a:schemeClr val="accent4">
+                <a:satMod val="175000"/>
+                <a:alpha val="40000"/>
+              </a:schemeClr>
+            </a:glow>
+          </a:effectLst>
+        </p:spPr>
+      </p:pic>
+      <p:pic>
+        <p:nvPicPr>
+          <p:cNvPr id="27" name="圖片 26"/>
+          <p:cNvPicPr>
+            <a:picLocks noChangeAspect="1"/>
+          </p:cNvPicPr>
+          <p:nvPr/>
+        </p:nvPicPr>
+        <p:blipFill>
+          <a:blip r:embed="rId7">
+            <a:extLst>
+              <a:ext uri="{28A0092B-C50C-407E-A947-70E740481C1C}">
+                <a14:useLocalDpi xmlns:a14="http://schemas.microsoft.com/office/drawing/2010/main" val="0"/>
+              </a:ext>
+            </a:extLst>
+          </a:blip>
+          <a:stretch>
+            <a:fillRect/>
+          </a:stretch>
+        </p:blipFill>
+        <p:spPr>
+          <a:xfrm>
+            <a:off x="1087610" y="2853775"/>
+            <a:ext cx="6220694" cy="1114581"/>
+          </a:xfrm>
+          <a:prstGeom prst="rect">
+            <a:avLst/>
+          </a:prstGeom>
+        </p:spPr>
+      </p:pic>
+      <p:pic>
+        <p:nvPicPr>
+          <p:cNvPr id="28" name="圖片 27"/>
+          <p:cNvPicPr>
+            <a:picLocks noChangeAspect="1"/>
+          </p:cNvPicPr>
+          <p:nvPr/>
+        </p:nvPicPr>
+        <p:blipFill>
+          <a:blip r:embed="rId8">
+            <a:extLst>
+              <a:ext uri="{28A0092B-C50C-407E-A947-70E740481C1C}">
+                <a14:useLocalDpi xmlns:a14="http://schemas.microsoft.com/office/drawing/2010/main" val="0"/>
+              </a:ext>
+            </a:extLst>
+          </a:blip>
+          <a:stretch>
+            <a:fillRect/>
+          </a:stretch>
+        </p:blipFill>
+        <p:spPr>
+          <a:xfrm>
+            <a:off x="1145810" y="4823485"/>
+            <a:ext cx="6296904" cy="933580"/>
+          </a:xfrm>
+          <a:prstGeom prst="rect">
+            <a:avLst/>
+          </a:prstGeom>
+          <a:effectLst/>
+        </p:spPr>
+      </p:pic>
+    </p:spTree>
+    <p:extLst>
+      <p:ext uri="{BB962C8B-B14F-4D97-AF65-F5344CB8AC3E}">
+        <p14:creationId xmlns:p14="http://schemas.microsoft.com/office/powerpoint/2010/main" val="3995452348"/>
+      </p:ext>
+    </p:extLst>
+  </p:cSld>
+  <p:clrMapOvr>
+    <a:masterClrMapping/>
+  </p:clrMapOvr>
+  <p:timing>
+    <p:tnLst>
+      <p:par>
+        <p:cTn id="1" dur="indefinite" restart="never" nodeType="tmRoot">
+          <p:childTnLst>
+            <p:seq concurrent="1" nextAc="seek">
+              <p:cTn id="2" dur="indefinite" nodeType="mainSeq">
+                <p:childTnLst>
+                  <p:par>
+                    <p:cTn id="3" fill="hold">
+                      <p:stCondLst>
+                        <p:cond delay="indefinite"/>
+                      </p:stCondLst>
+                      <p:childTnLst>
+                        <p:par>
+                          <p:cTn id="4" fill="hold">
+                            <p:stCondLst>
+                              <p:cond delay="0"/>
+                            </p:stCondLst>
+                            <p:childTnLst>
+                              <p:par>
+                                <p:cTn id="5" presetID="10" presetClass="entr" presetSubtype="0" fill="hold" nodeType="clickEffect">
+                                  <p:stCondLst>
+                                    <p:cond delay="0"/>
+                                  </p:stCondLst>
+                                  <p:childTnLst>
+                                    <p:set>
+                                      <p:cBhvr>
+                                        <p:cTn id="6" dur="1" fill="hold">
+                                          <p:stCondLst>
+                                            <p:cond delay="0"/>
+                                          </p:stCondLst>
+                                        </p:cTn>
+                                        <p:tgtEl>
+                                          <p:spTgt spid="22"/>
+                                        </p:tgtEl>
+                                        <p:attrNameLst>
+                                          <p:attrName>style.visibility</p:attrName>
+                                        </p:attrNameLst>
+                                      </p:cBhvr>
+                                      <p:to>
+                                        <p:strVal val="visible"/>
+                                      </p:to>
+                                    </p:set>
+                                    <p:animEffect transition="in" filter="fade">
+                                      <p:cBhvr>
+                                        <p:cTn id="7" dur="500"/>
+                                        <p:tgtEl>
+                                          <p:spTgt spid="22"/>
+                                        </p:tgtEl>
+                                      </p:cBhvr>
+                                    </p:animEffect>
+                                  </p:childTnLst>
+                                </p:cTn>
+                              </p:par>
+                            </p:childTnLst>
+                          </p:cTn>
+                        </p:par>
+                      </p:childTnLst>
+                    </p:cTn>
+                  </p:par>
+                  <p:par>
+                    <p:cTn id="8" fill="hold">
+                      <p:stCondLst>
+                        <p:cond delay="indefinite"/>
+                      </p:stCondLst>
+                      <p:childTnLst>
+                        <p:par>
+                          <p:cTn id="9" fill="hold">
+                            <p:stCondLst>
+                              <p:cond delay="0"/>
+                            </p:stCondLst>
+                            <p:childTnLst>
+                              <p:par>
+                                <p:cTn id="10" presetID="10" presetClass="entr" presetSubtype="0" fill="hold" nodeType="clickEffect">
+                                  <p:stCondLst>
+                                    <p:cond delay="0"/>
+                                  </p:stCondLst>
+                                  <p:childTnLst>
+                                    <p:set>
+                                      <p:cBhvr>
+                                        <p:cTn id="11" dur="1" fill="hold">
+                                          <p:stCondLst>
+                                            <p:cond delay="0"/>
+                                          </p:stCondLst>
+                                        </p:cTn>
+                                        <p:tgtEl>
+                                          <p:spTgt spid="23"/>
+                                        </p:tgtEl>
+                                        <p:attrNameLst>
+                                          <p:attrName>style.visibility</p:attrName>
+                                        </p:attrNameLst>
+                                      </p:cBhvr>
+                                      <p:to>
+                                        <p:strVal val="visible"/>
+                                      </p:to>
+                                    </p:set>
+                                    <p:animEffect transition="in" filter="fade">
+                                      <p:cBhvr>
+                                        <p:cTn id="12" dur="500"/>
+                                        <p:tgtEl>
+                                          <p:spTgt spid="23"/>
+                                        </p:tgtEl>
+                                      </p:cBhvr>
+                                    </p:animEffect>
+                                  </p:childTnLst>
+                                </p:cTn>
+                              </p:par>
+                            </p:childTnLst>
+                          </p:cTn>
+                        </p:par>
+                      </p:childTnLst>
+                    </p:cTn>
+                  </p:par>
+                  <p:par>
+                    <p:cTn id="13" fill="hold">
+                      <p:stCondLst>
+                        <p:cond delay="indefinite"/>
+                      </p:stCondLst>
+                      <p:childTnLst>
+                        <p:par>
+                          <p:cTn id="14" fill="hold">
+                            <p:stCondLst>
+                              <p:cond delay="0"/>
+                            </p:stCondLst>
+                            <p:childTnLst>
+                              <p:par>
+                                <p:cTn id="15" presetID="10" presetClass="entr" presetSubtype="0" fill="hold" nodeType="clickEffect">
+                                  <p:stCondLst>
+                                    <p:cond delay="0"/>
+                                  </p:stCondLst>
+                                  <p:childTnLst>
+                                    <p:set>
+                                      <p:cBhvr>
+                                        <p:cTn id="16" dur="1" fill="hold">
+                                          <p:stCondLst>
+                                            <p:cond delay="0"/>
+                                          </p:stCondLst>
+                                        </p:cTn>
+                                        <p:tgtEl>
+                                          <p:spTgt spid="24"/>
+                                        </p:tgtEl>
+                                        <p:attrNameLst>
+                                          <p:attrName>style.visibility</p:attrName>
+                                        </p:attrNameLst>
+                                      </p:cBhvr>
+                                      <p:to>
+                                        <p:strVal val="visible"/>
+                                      </p:to>
+                                    </p:set>
+                                    <p:animEffect transition="in" filter="fade">
+                                      <p:cBhvr>
+                                        <p:cTn id="17" dur="500"/>
+                                        <p:tgtEl>
+                                          <p:spTgt spid="24"/>
+                                        </p:tgtEl>
+                                      </p:cBhvr>
+                                    </p:animEffect>
+                                  </p:childTnLst>
+                                </p:cTn>
+                              </p:par>
+                            </p:childTnLst>
+                          </p:cTn>
+                        </p:par>
+                      </p:childTnLst>
+                    </p:cTn>
+                  </p:par>
+                  <p:par>
+                    <p:cTn id="18" fill="hold">
+                      <p:stCondLst>
+                        <p:cond delay="indefinite"/>
+                      </p:stCondLst>
+                      <p:childTnLst>
+                        <p:par>
+                          <p:cTn id="19" fill="hold">
+                            <p:stCondLst>
+                              <p:cond delay="0"/>
+                            </p:stCondLst>
+                            <p:childTnLst>
+                              <p:par>
+                                <p:cTn id="20" presetID="10" presetClass="entr" presetSubtype="0" fill="hold" nodeType="clickEffect">
+                                  <p:stCondLst>
+                                    <p:cond delay="0"/>
+                                  </p:stCondLst>
+                                  <p:childTnLst>
+                                    <p:set>
+                                      <p:cBhvr>
+                                        <p:cTn id="21" dur="1" fill="hold">
+                                          <p:stCondLst>
+                                            <p:cond delay="0"/>
+                                          </p:stCondLst>
+                                        </p:cTn>
+                                        <p:tgtEl>
+                                          <p:spTgt spid="25"/>
+                                        </p:tgtEl>
+                                        <p:attrNameLst>
+                                          <p:attrName>style.visibility</p:attrName>
+                                        </p:attrNameLst>
+                                      </p:cBhvr>
+                                      <p:to>
+                                        <p:strVal val="visible"/>
+                                      </p:to>
+                                    </p:set>
+                                    <p:animEffect transition="in" filter="fade">
+                                      <p:cBhvr>
+                                        <p:cTn id="22" dur="500"/>
+                                        <p:tgtEl>
+                                          <p:spTgt spid="25"/>
+                                        </p:tgtEl>
+                                      </p:cBhvr>
+                                    </p:animEffect>
+                                  </p:childTnLst>
+                                </p:cTn>
+                              </p:par>
+                            </p:childTnLst>
+                          </p:cTn>
+                        </p:par>
+                      </p:childTnLst>
+                    </p:cTn>
+                  </p:par>
+                  <p:par>
+                    <p:cTn id="23" fill="hold">
+                      <p:stCondLst>
+                        <p:cond delay="indefinite"/>
+                      </p:stCondLst>
+                      <p:childTnLst>
+                        <p:par>
+                          <p:cTn id="24" fill="hold">
+                            <p:stCondLst>
+                              <p:cond delay="0"/>
+                            </p:stCondLst>
+                            <p:childTnLst>
+                              <p:par>
+                                <p:cTn id="25" presetID="10" presetClass="entr" presetSubtype="0" fill="hold" nodeType="clickEffect">
+                                  <p:stCondLst>
+                                    <p:cond delay="0"/>
+                                  </p:stCondLst>
+                                  <p:childTnLst>
+                                    <p:set>
+                                      <p:cBhvr>
+                                        <p:cTn id="26" dur="1" fill="hold">
+                                          <p:stCondLst>
+                                            <p:cond delay="0"/>
+                                          </p:stCondLst>
+                                        </p:cTn>
+                                        <p:tgtEl>
+                                          <p:spTgt spid="26"/>
+                                        </p:tgtEl>
+                                        <p:attrNameLst>
+                                          <p:attrName>style.visibility</p:attrName>
+                                        </p:attrNameLst>
+                                      </p:cBhvr>
+                                      <p:to>
+                                        <p:strVal val="visible"/>
+                                      </p:to>
+                                    </p:set>
+                                    <p:animEffect transition="in" filter="fade">
+                                      <p:cBhvr>
+                                        <p:cTn id="27" dur="500"/>
+                                        <p:tgtEl>
+                                          <p:spTgt spid="26"/>
+                                        </p:tgtEl>
+                                      </p:cBhvr>
+                                    </p:animEffect>
+                                  </p:childTnLst>
+                                </p:cTn>
+                              </p:par>
+                            </p:childTnLst>
+                          </p:cTn>
+                        </p:par>
+                      </p:childTnLst>
+                    </p:cTn>
+                  </p:par>
+                  <p:par>
+                    <p:cTn id="28" fill="hold">
+                      <p:stCondLst>
+                        <p:cond delay="indefinite"/>
+                      </p:stCondLst>
+                      <p:childTnLst>
+                        <p:par>
+                          <p:cTn id="29" fill="hold">
+                            <p:stCondLst>
+                              <p:cond delay="0"/>
+                            </p:stCondLst>
+                            <p:childTnLst>
+                              <p:par>
+                                <p:cTn id="30" presetID="10" presetClass="exit" presetSubtype="0" fill="hold" nodeType="clickEffect">
+                                  <p:stCondLst>
+                                    <p:cond delay="0"/>
+                                  </p:stCondLst>
+                                  <p:childTnLst>
+                                    <p:animEffect transition="out" filter="fade">
+                                      <p:cBhvr>
+                                        <p:cTn id="31" dur="500"/>
+                                        <p:tgtEl>
+                                          <p:spTgt spid="22"/>
+                                        </p:tgtEl>
+                                      </p:cBhvr>
+                                    </p:animEffect>
+                                    <p:set>
+                                      <p:cBhvr>
+                                        <p:cTn id="32" dur="1" fill="hold">
+                                          <p:stCondLst>
+                                            <p:cond delay="499"/>
+                                          </p:stCondLst>
+                                        </p:cTn>
+                                        <p:tgtEl>
+                                          <p:spTgt spid="22"/>
+                                        </p:tgtEl>
+                                        <p:attrNameLst>
+                                          <p:attrName>style.visibility</p:attrName>
+                                        </p:attrNameLst>
+                                      </p:cBhvr>
+                                      <p:to>
+                                        <p:strVal val="hidden"/>
+                                      </p:to>
+                                    </p:set>
+                                  </p:childTnLst>
+                                </p:cTn>
+                              </p:par>
+                              <p:par>
+                                <p:cTn id="33" presetID="10" presetClass="exit" presetSubtype="0" fill="hold" nodeType="withEffect">
+                                  <p:stCondLst>
+                                    <p:cond delay="0"/>
+                                  </p:stCondLst>
+                                  <p:childTnLst>
+                                    <p:animEffect transition="out" filter="fade">
+                                      <p:cBhvr>
+                                        <p:cTn id="34" dur="500"/>
+                                        <p:tgtEl>
+                                          <p:spTgt spid="23"/>
+                                        </p:tgtEl>
+                                      </p:cBhvr>
+                                    </p:animEffect>
+                                    <p:set>
+                                      <p:cBhvr>
+                                        <p:cTn id="35" dur="1" fill="hold">
+                                          <p:stCondLst>
+                                            <p:cond delay="499"/>
+                                          </p:stCondLst>
+                                        </p:cTn>
+                                        <p:tgtEl>
+                                          <p:spTgt spid="23"/>
+                                        </p:tgtEl>
+                                        <p:attrNameLst>
+                                          <p:attrName>style.visibility</p:attrName>
+                                        </p:attrNameLst>
+                                      </p:cBhvr>
+                                      <p:to>
+                                        <p:strVal val="hidden"/>
+                                      </p:to>
+                                    </p:set>
+                                  </p:childTnLst>
+                                </p:cTn>
+                              </p:par>
+                              <p:par>
+                                <p:cTn id="36" presetID="10" presetClass="exit" presetSubtype="0" fill="hold" nodeType="withEffect">
+                                  <p:stCondLst>
+                                    <p:cond delay="0"/>
+                                  </p:stCondLst>
+                                  <p:childTnLst>
+                                    <p:animEffect transition="out" filter="fade">
+                                      <p:cBhvr>
+                                        <p:cTn id="37" dur="500"/>
+                                        <p:tgtEl>
+                                          <p:spTgt spid="24"/>
+                                        </p:tgtEl>
+                                      </p:cBhvr>
+                                    </p:animEffect>
+                                    <p:set>
+                                      <p:cBhvr>
+                                        <p:cTn id="38" dur="1" fill="hold">
+                                          <p:stCondLst>
+                                            <p:cond delay="499"/>
+                                          </p:stCondLst>
+                                        </p:cTn>
+                                        <p:tgtEl>
+                                          <p:spTgt spid="24"/>
+                                        </p:tgtEl>
+                                        <p:attrNameLst>
+                                          <p:attrName>style.visibility</p:attrName>
+                                        </p:attrNameLst>
+                                      </p:cBhvr>
+                                      <p:to>
+                                        <p:strVal val="hidden"/>
+                                      </p:to>
+                                    </p:set>
+                                  </p:childTnLst>
+                                </p:cTn>
+                              </p:par>
+                              <p:par>
+                                <p:cTn id="39" presetID="10" presetClass="exit" presetSubtype="0" fill="hold" nodeType="withEffect">
+                                  <p:stCondLst>
+                                    <p:cond delay="0"/>
+                                  </p:stCondLst>
+                                  <p:childTnLst>
+                                    <p:animEffect transition="out" filter="fade">
+                                      <p:cBhvr>
+                                        <p:cTn id="40" dur="500"/>
+                                        <p:tgtEl>
+                                          <p:spTgt spid="25"/>
+                                        </p:tgtEl>
+                                      </p:cBhvr>
+                                    </p:animEffect>
+                                    <p:set>
+                                      <p:cBhvr>
+                                        <p:cTn id="41" dur="1" fill="hold">
+                                          <p:stCondLst>
+                                            <p:cond delay="499"/>
+                                          </p:stCondLst>
+                                        </p:cTn>
+                                        <p:tgtEl>
+                                          <p:spTgt spid="25"/>
+                                        </p:tgtEl>
+                                        <p:attrNameLst>
+                                          <p:attrName>style.visibility</p:attrName>
+                                        </p:attrNameLst>
+                                      </p:cBhvr>
+                                      <p:to>
+                                        <p:strVal val="hidden"/>
+                                      </p:to>
+                                    </p:set>
+                                  </p:childTnLst>
+                                </p:cTn>
+                              </p:par>
+                              <p:par>
+                                <p:cTn id="42" presetID="10" presetClass="exit" presetSubtype="0" fill="hold" nodeType="withEffect">
+                                  <p:stCondLst>
+                                    <p:cond delay="0"/>
+                                  </p:stCondLst>
+                                  <p:childTnLst>
+                                    <p:animEffect transition="out" filter="fade">
+                                      <p:cBhvr>
+                                        <p:cTn id="43" dur="500"/>
+                                        <p:tgtEl>
+                                          <p:spTgt spid="26"/>
+                                        </p:tgtEl>
+                                      </p:cBhvr>
+                                    </p:animEffect>
+                                    <p:set>
+                                      <p:cBhvr>
+                                        <p:cTn id="44" dur="1" fill="hold">
+                                          <p:stCondLst>
+                                            <p:cond delay="499"/>
+                                          </p:stCondLst>
+                                        </p:cTn>
+                                        <p:tgtEl>
+                                          <p:spTgt spid="26"/>
+                                        </p:tgtEl>
+                                        <p:attrNameLst>
+                                          <p:attrName>style.visibility</p:attrName>
+                                        </p:attrNameLst>
+                                      </p:cBhvr>
+                                      <p:to>
+                                        <p:strVal val="hidden"/>
+                                      </p:to>
+                                    </p:set>
+                                  </p:childTnLst>
+                                </p:cTn>
+                              </p:par>
+                              <p:par>
+                                <p:cTn id="45" presetID="10" presetClass="entr" presetSubtype="0" fill="hold" nodeType="withEffect">
+                                  <p:stCondLst>
+                                    <p:cond delay="0"/>
+                                  </p:stCondLst>
+                                  <p:childTnLst>
+                                    <p:set>
+                                      <p:cBhvr>
+                                        <p:cTn id="46" dur="1" fill="hold">
+                                          <p:stCondLst>
+                                            <p:cond delay="0"/>
+                                          </p:stCondLst>
+                                        </p:cTn>
+                                        <p:tgtEl>
+                                          <p:spTgt spid="27"/>
+                                        </p:tgtEl>
+                                        <p:attrNameLst>
+                                          <p:attrName>style.visibility</p:attrName>
+                                        </p:attrNameLst>
+                                      </p:cBhvr>
+                                      <p:to>
+                                        <p:strVal val="visible"/>
+                                      </p:to>
+                                    </p:set>
+                                    <p:animEffect transition="in" filter="fade">
+                                      <p:cBhvr>
+                                        <p:cTn id="47" dur="500"/>
+                                        <p:tgtEl>
+                                          <p:spTgt spid="27"/>
+                                        </p:tgtEl>
+                                      </p:cBhvr>
+                                    </p:animEffect>
+                                  </p:childTnLst>
+                                </p:cTn>
+                              </p:par>
+                              <p:par>
+                                <p:cTn id="48" presetID="10" presetClass="entr" presetSubtype="0" fill="hold" nodeType="withEffect">
+                                  <p:stCondLst>
+                                    <p:cond delay="0"/>
+                                  </p:stCondLst>
+                                  <p:childTnLst>
+                                    <p:set>
+                                      <p:cBhvr>
+                                        <p:cTn id="49" dur="1" fill="hold">
+                                          <p:stCondLst>
+                                            <p:cond delay="0"/>
+                                          </p:stCondLst>
+                                        </p:cTn>
+                                        <p:tgtEl>
+                                          <p:spTgt spid="3">
+                                            <p:txEl>
+                                              <p:pRg st="3" end="3"/>
+                                            </p:txEl>
+                                          </p:spTgt>
+                                        </p:tgtEl>
+                                        <p:attrNameLst>
+                                          <p:attrName>style.visibility</p:attrName>
+                                        </p:attrNameLst>
+                                      </p:cBhvr>
+                                      <p:to>
+                                        <p:strVal val="visible"/>
+                                      </p:to>
+                                    </p:set>
+                                    <p:animEffect transition="in" filter="fade">
+                                      <p:cBhvr>
+                                        <p:cTn id="50" dur="500"/>
+                                        <p:tgtEl>
+                                          <p:spTgt spid="3">
+                                            <p:txEl>
+                                              <p:pRg st="3" end="3"/>
+                                            </p:txEl>
+                                          </p:spTgt>
+                                        </p:tgtEl>
+                                      </p:cBhvr>
+                                    </p:animEffect>
+                                  </p:childTnLst>
+                                </p:cTn>
+                              </p:par>
+                            </p:childTnLst>
+                          </p:cTn>
+                        </p:par>
+                      </p:childTnLst>
+                    </p:cTn>
+                  </p:par>
+                  <p:par>
+                    <p:cTn id="51" fill="hold">
+                      <p:stCondLst>
+                        <p:cond delay="indefinite"/>
+                      </p:stCondLst>
+                      <p:childTnLst>
+                        <p:par>
+                          <p:cTn id="52" fill="hold">
+                            <p:stCondLst>
+                              <p:cond delay="0"/>
+                            </p:stCondLst>
+                            <p:childTnLst>
+                              <p:par>
+                                <p:cTn id="53" presetID="10" presetClass="entr" presetSubtype="0" fill="hold" nodeType="clickEffect">
+                                  <p:stCondLst>
+                                    <p:cond delay="0"/>
+                                  </p:stCondLst>
+                                  <p:childTnLst>
+                                    <p:set>
+                                      <p:cBhvr>
+                                        <p:cTn id="54" dur="1" fill="hold">
+                                          <p:stCondLst>
+                                            <p:cond delay="0"/>
+                                          </p:stCondLst>
+                                        </p:cTn>
+                                        <p:tgtEl>
+                                          <p:spTgt spid="3">
+                                            <p:txEl>
+                                              <p:pRg st="10" end="10"/>
+                                            </p:txEl>
+                                          </p:spTgt>
+                                        </p:tgtEl>
+                                        <p:attrNameLst>
+                                          <p:attrName>style.visibility</p:attrName>
+                                        </p:attrNameLst>
+                                      </p:cBhvr>
+                                      <p:to>
+                                        <p:strVal val="visible"/>
+                                      </p:to>
+                                    </p:set>
+                                    <p:animEffect transition="in" filter="fade">
+                                      <p:cBhvr>
+                                        <p:cTn id="55" dur="500"/>
+                                        <p:tgtEl>
+                                          <p:spTgt spid="3">
+                                            <p:txEl>
+                                              <p:pRg st="10" end="10"/>
+                                            </p:txEl>
+                                          </p:spTgt>
+                                        </p:tgtEl>
+                                      </p:cBhvr>
+                                    </p:animEffect>
+                                  </p:childTnLst>
+                                </p:cTn>
+                              </p:par>
+                              <p:par>
+                                <p:cTn id="56" presetID="10" presetClass="entr" presetSubtype="0" fill="hold" nodeType="withEffect">
+                                  <p:stCondLst>
+                                    <p:cond delay="0"/>
+                                  </p:stCondLst>
+                                  <p:childTnLst>
+                                    <p:set>
+                                      <p:cBhvr>
+                                        <p:cTn id="57" dur="1" fill="hold">
+                                          <p:stCondLst>
+                                            <p:cond delay="0"/>
+                                          </p:stCondLst>
+                                        </p:cTn>
+                                        <p:tgtEl>
+                                          <p:spTgt spid="28"/>
+                                        </p:tgtEl>
+                                        <p:attrNameLst>
+                                          <p:attrName>style.visibility</p:attrName>
+                                        </p:attrNameLst>
+                                      </p:cBhvr>
+                                      <p:to>
+                                        <p:strVal val="visible"/>
+                                      </p:to>
+                                    </p:set>
+                                    <p:animEffect transition="in" filter="fade">
+                                      <p:cBhvr>
+                                        <p:cTn id="58" dur="500"/>
+                                        <p:tgtEl>
+                                          <p:spTgt spid="28"/>
+                                        </p:tgtEl>
+                                      </p:cBhvr>
+                                    </p:animEffect>
+                                  </p:childTnLst>
+                                </p:cTn>
+                              </p:par>
+                            </p:childTnLst>
+                          </p:cTn>
+                        </p:par>
+                      </p:childTnLst>
+                    </p:cTn>
+                  </p:par>
+                </p:childTnLst>
+              </p:cTn>
+              <p:prevCondLst>
+                <p:cond evt="onPrev" delay="0">
+                  <p:tgtEl>
+                    <p:sldTgt/>
+                  </p:tgtEl>
+                </p:cond>
+              </p:prevCondLst>
+              <p:nextCondLst>
+                <p:cond evt="onNext" delay="0">
+                  <p:tgtEl>
+                    <p:sldTgt/>
+                  </p:tgtEl>
+                </p:cond>
+              </p:nextCondLst>
+            </p:seq>
+          </p:childTnLst>
+        </p:cTn>
+      </p:par>
+    </p:tnLst>
+  </p:timing>
+</p:sld>
+</file>
+
+<file path=ppt/slides/slide6.xml><?xml version="1.0" encoding="utf-8"?>
+<p:sld xmlns:a="http://schemas.openxmlformats.org/drawingml/2006/main" xmlns:r="http://schemas.openxmlformats.org/officeDocument/2006/relationships" xmlns:p="http://schemas.openxmlformats.org/presentationml/2006/main">
+  <p:cSld>
+    <p:spTree>
+      <p:nvGrpSpPr>
+        <p:cNvPr id="1" name=""/>
+        <p:cNvGrpSpPr/>
+        <p:nvPr/>
+      </p:nvGrpSpPr>
+      <p:grpSpPr>
+        <a:xfrm>
+          <a:off x="0" y="0"/>
+          <a:ext cx="0" cy="0"/>
+          <a:chOff x="0" y="0"/>
+          <a:chExt cx="0" cy="0"/>
+        </a:xfrm>
+      </p:grpSpPr>
+      <p:sp>
+        <p:nvSpPr>
+          <p:cNvPr id="2" name="標題 1"/>
+          <p:cNvSpPr>
+            <a:spLocks noGrp="1"/>
+          </p:cNvSpPr>
+          <p:nvPr>
+            <p:ph type="title"/>
+          </p:nvPr>
+        </p:nvSpPr>
+        <p:spPr/>
+        <p:txBody>
+          <a:bodyPr>
+            <a:normAutofit/>
+          </a:bodyPr>
+          <a:lstStyle/>
+          <a:p>
+            <a:r>
+              <a:rPr lang="en-US" altLang="zh-TW" sz="3200" b="1" dirty="0" smtClean="0"/>
+              <a:t>Hello Word’s Sample Usage</a:t>
+            </a:r>
+            <a:endParaRPr lang="zh-TW" altLang="en-US" sz="3200" dirty="0"/>
+          </a:p>
+        </p:txBody>
+      </p:sp>
+      <p:sp>
+        <p:nvSpPr>
+          <p:cNvPr id="3" name="內容版面配置區 2"/>
+          <p:cNvSpPr>
+            <a:spLocks noGrp="1"/>
+          </p:cNvSpPr>
+          <p:nvPr>
+            <p:ph idx="1"/>
+          </p:nvPr>
+        </p:nvSpPr>
+        <p:spPr>
+          <a:xfrm>
+            <a:off x="457200" y="1412776"/>
+            <a:ext cx="8686800" cy="5256584"/>
+          </a:xfrm>
+        </p:spPr>
+        <p:txBody>
+          <a:bodyPr>
+            <a:normAutofit/>
+          </a:bodyPr>
+          <a:lstStyle/>
+          <a:p>
+            <a:r>
+              <a:rPr lang="en-US" altLang="zh-TW" sz="1800" dirty="0" smtClean="0"/>
+              <a:t>Below is the console output</a:t>
+            </a:r>
+          </a:p>
+        </p:txBody>
+      </p:sp>
+      <p:pic>
+        <p:nvPicPr>
+          <p:cNvPr id="4" name="圖片 3"/>
+          <p:cNvPicPr>
+            <a:picLocks noChangeAspect="1"/>
+          </p:cNvPicPr>
+          <p:nvPr/>
+        </p:nvPicPr>
+        <p:blipFill>
+          <a:blip r:embed="rId2">
+            <a:extLst>
+              <a:ext uri="{28A0092B-C50C-407E-A947-70E740481C1C}">
+                <a14:useLocalDpi xmlns:a14="http://schemas.microsoft.com/office/drawing/2010/main" val="0"/>
+              </a:ext>
+            </a:extLst>
+          </a:blip>
+          <a:stretch>
+            <a:fillRect/>
+          </a:stretch>
+        </p:blipFill>
+        <p:spPr>
+          <a:xfrm>
+            <a:off x="827584" y="1700808"/>
+            <a:ext cx="5839640" cy="4010585"/>
+          </a:xfrm>
+          <a:prstGeom prst="rect">
+            <a:avLst/>
+          </a:prstGeom>
+        </p:spPr>
+      </p:pic>
+      <p:pic>
+        <p:nvPicPr>
+          <p:cNvPr id="5" name="圖片 4"/>
+          <p:cNvPicPr>
+            <a:picLocks noChangeAspect="1"/>
+          </p:cNvPicPr>
+          <p:nvPr/>
+        </p:nvPicPr>
+        <p:blipFill>
+          <a:blip r:embed="rId3">
+            <a:extLst>
+              <a:ext uri="{28A0092B-C50C-407E-A947-70E740481C1C}">
+                <a14:useLocalDpi xmlns:a14="http://schemas.microsoft.com/office/drawing/2010/main" val="0"/>
+              </a:ext>
+            </a:extLst>
+          </a:blip>
+          <a:stretch>
+            <a:fillRect/>
+          </a:stretch>
+        </p:blipFill>
+        <p:spPr>
+          <a:xfrm>
+            <a:off x="980005" y="1834158"/>
+            <a:ext cx="5534798" cy="4001059"/>
+          </a:xfrm>
+          <a:prstGeom prst="rect">
+            <a:avLst/>
+          </a:prstGeom>
+          <a:effectLst>
+            <a:glow rad="228600">
+              <a:schemeClr val="accent2">
+                <a:satMod val="175000"/>
+                <a:alpha val="40000"/>
+              </a:schemeClr>
+            </a:glow>
+          </a:effectLst>
+        </p:spPr>
+      </p:pic>
+      <p:pic>
+        <p:nvPicPr>
+          <p:cNvPr id="6" name="圖片 5"/>
+          <p:cNvPicPr>
+            <a:picLocks noChangeAspect="1"/>
+          </p:cNvPicPr>
+          <p:nvPr/>
+        </p:nvPicPr>
+        <p:blipFill>
+          <a:blip r:embed="rId4">
+            <a:extLst>
+              <a:ext uri="{28A0092B-C50C-407E-A947-70E740481C1C}">
+                <a14:useLocalDpi xmlns:a14="http://schemas.microsoft.com/office/drawing/2010/main" val="0"/>
+              </a:ext>
+            </a:extLst>
+          </a:blip>
+          <a:stretch>
+            <a:fillRect/>
+          </a:stretch>
+        </p:blipFill>
+        <p:spPr>
+          <a:xfrm>
+            <a:off x="1115616" y="1916832"/>
+            <a:ext cx="5706272" cy="4048690"/>
+          </a:xfrm>
+          <a:prstGeom prst="rect">
+            <a:avLst/>
+          </a:prstGeom>
+          <a:effectLst>
+            <a:glow rad="228600">
+              <a:schemeClr val="accent2">
+                <a:satMod val="175000"/>
+                <a:alpha val="40000"/>
+              </a:schemeClr>
+            </a:glow>
+          </a:effectLst>
+        </p:spPr>
+      </p:pic>
+      <p:pic>
+        <p:nvPicPr>
+          <p:cNvPr id="7" name="圖片 6"/>
+          <p:cNvPicPr>
+            <a:picLocks noChangeAspect="1"/>
+          </p:cNvPicPr>
+          <p:nvPr/>
+        </p:nvPicPr>
+        <p:blipFill>
+          <a:blip r:embed="rId5">
+            <a:extLst>
+              <a:ext uri="{28A0092B-C50C-407E-A947-70E740481C1C}">
+                <a14:useLocalDpi xmlns:a14="http://schemas.microsoft.com/office/drawing/2010/main" val="0"/>
+              </a:ext>
+            </a:extLst>
+          </a:blip>
+          <a:stretch>
+            <a:fillRect/>
+          </a:stretch>
+        </p:blipFill>
+        <p:spPr>
+          <a:xfrm>
+            <a:off x="1259632" y="1997420"/>
+            <a:ext cx="7602011" cy="3667637"/>
+          </a:xfrm>
+          <a:prstGeom prst="rect">
+            <a:avLst/>
+          </a:prstGeom>
+          <a:effectLst>
+            <a:glow rad="228600">
+              <a:schemeClr val="accent2">
+                <a:satMod val="175000"/>
+                <a:alpha val="40000"/>
+              </a:schemeClr>
+            </a:glow>
+          </a:effectLst>
+        </p:spPr>
+      </p:pic>
+    </p:spTree>
+    <p:extLst>
+      <p:ext uri="{BB962C8B-B14F-4D97-AF65-F5344CB8AC3E}">
+        <p14:creationId xmlns:p14="http://schemas.microsoft.com/office/powerpoint/2010/main" val="211631389"/>
+      </p:ext>
+    </p:extLst>
+  </p:cSld>
+  <p:clrMapOvr>
+    <a:masterClrMapping/>
+  </p:clrMapOvr>
+  <p:timing>
+    <p:tnLst>
+      <p:par>
+        <p:cTn id="1" dur="indefinite" restart="never" nodeType="tmRoot">
+          <p:childTnLst>
+            <p:seq concurrent="1" nextAc="seek">
+              <p:cTn id="2" dur="indefinite" nodeType="mainSeq">
+                <p:childTnLst>
+                  <p:par>
+                    <p:cTn id="3" fill="hold">
+                      <p:stCondLst>
+                        <p:cond delay="indefinite"/>
+                      </p:stCondLst>
+                      <p:childTnLst>
+                        <p:par>
+                          <p:cTn id="4" fill="hold">
+                            <p:stCondLst>
+                              <p:cond delay="0"/>
+                            </p:stCondLst>
+                            <p:childTnLst>
+                              <p:par>
+                                <p:cTn id="5" presetID="10" presetClass="entr" presetSubtype="0" fill="hold" nodeType="clickEffect">
+                                  <p:stCondLst>
+                                    <p:cond delay="0"/>
+                                  </p:stCondLst>
+                                  <p:childTnLst>
+                                    <p:set>
+                                      <p:cBhvr>
+                                        <p:cTn id="6" dur="1" fill="hold">
+                                          <p:stCondLst>
+                                            <p:cond delay="0"/>
+                                          </p:stCondLst>
+                                        </p:cTn>
+                                        <p:tgtEl>
+                                          <p:spTgt spid="5"/>
+                                        </p:tgtEl>
+                                        <p:attrNameLst>
+                                          <p:attrName>style.visibility</p:attrName>
+                                        </p:attrNameLst>
+                                      </p:cBhvr>
+                                      <p:to>
+                                        <p:strVal val="visible"/>
+                                      </p:to>
+                                    </p:set>
+                                    <p:animEffect transition="in" filter="fade">
+                                      <p:cBhvr>
+                                        <p:cTn id="7" dur="500"/>
+                                        <p:tgtEl>
+                                          <p:spTgt spid="5"/>
+                                        </p:tgtEl>
+                                      </p:cBhvr>
+                                    </p:animEffect>
+                                  </p:childTnLst>
+                                </p:cTn>
+                              </p:par>
+                            </p:childTnLst>
+                          </p:cTn>
+                        </p:par>
+                      </p:childTnLst>
+                    </p:cTn>
+                  </p:par>
+                  <p:par>
+                    <p:cTn id="8" fill="hold">
+                      <p:stCondLst>
+                        <p:cond delay="indefinite"/>
+                      </p:stCondLst>
+                      <p:childTnLst>
+                        <p:par>
+                          <p:cTn id="9" fill="hold">
+                            <p:stCondLst>
+                              <p:cond delay="0"/>
+                            </p:stCondLst>
+                            <p:childTnLst>
+                              <p:par>
+                                <p:cTn id="10" presetID="10" presetClass="entr" presetSubtype="0" fill="hold" nodeType="clickEffect">
+                                  <p:stCondLst>
+                                    <p:cond delay="0"/>
+                                  </p:stCondLst>
+                                  <p:childTnLst>
+                                    <p:set>
+                                      <p:cBhvr>
+                                        <p:cTn id="11" dur="1" fill="hold">
+                                          <p:stCondLst>
+                                            <p:cond delay="0"/>
+                                          </p:stCondLst>
+                                        </p:cTn>
+                                        <p:tgtEl>
+                                          <p:spTgt spid="6"/>
+                                        </p:tgtEl>
+                                        <p:attrNameLst>
+                                          <p:attrName>style.visibility</p:attrName>
+                                        </p:attrNameLst>
+                                      </p:cBhvr>
+                                      <p:to>
+                                        <p:strVal val="visible"/>
+                                      </p:to>
+                                    </p:set>
+                                    <p:animEffect transition="in" filter="fade">
+                                      <p:cBhvr>
+                                        <p:cTn id="12" dur="500"/>
+                                        <p:tgtEl>
+                                          <p:spTgt spid="6"/>
+                                        </p:tgtEl>
+                                      </p:cBhvr>
+                                    </p:animEffect>
+                                  </p:childTnLst>
+                                </p:cTn>
+                              </p:par>
+                            </p:childTnLst>
+                          </p:cTn>
+                        </p:par>
+                      </p:childTnLst>
+                    </p:cTn>
+                  </p:par>
+                  <p:par>
+                    <p:cTn id="13" fill="hold">
+                      <p:stCondLst>
+                        <p:cond delay="indefinite"/>
+                      </p:stCondLst>
+                      <p:childTnLst>
+                        <p:par>
+                          <p:cTn id="14" fill="hold">
+                            <p:stCondLst>
+                              <p:cond delay="0"/>
+                            </p:stCondLst>
+                            <p:childTnLst>
+                              <p:par>
+                                <p:cTn id="15" presetID="10" presetClass="entr" presetSubtype="0" fill="hold" nodeType="clickEffect">
+                                  <p:stCondLst>
+                                    <p:cond delay="0"/>
+                                  </p:stCondLst>
+                                  <p:childTnLst>
+                                    <p:set>
+                                      <p:cBhvr>
+                                        <p:cTn id="16" dur="1" fill="hold">
+                                          <p:stCondLst>
+                                            <p:cond delay="0"/>
+                                          </p:stCondLst>
+                                        </p:cTn>
+                                        <p:tgtEl>
+                                          <p:spTgt spid="7"/>
+                                        </p:tgtEl>
+                                        <p:attrNameLst>
+                                          <p:attrName>style.visibility</p:attrName>
+                                        </p:attrNameLst>
+                                      </p:cBhvr>
+                                      <p:to>
+                                        <p:strVal val="visible"/>
+                                      </p:to>
+                                    </p:set>
+                                    <p:animEffect transition="in" filter="fade">
+                                      <p:cBhvr>
+                                        <p:cTn id="17" dur="500"/>
+                                        <p:tgtEl>
+                                          <p:spTgt spid="7"/>
                                         </p:tgtEl>
                                       </p:cBhvr>
                                     </p:animEffect>

</xml_diff>

<commit_message>
- Update Introduction doc - Upload log4j.properties, tld-names.txt
</commit_message>
<xml_diff>
--- a/SD_Crawler4j/docs/Crawler4j_Introduction.pptx
+++ b/SD_Crawler4j/docs/Crawler4j_Introduction.pptx
@@ -6,11 +6,13 @@
   </p:sldMasterIdLst>
   <p:sldIdLst>
     <p:sldId id="256" r:id="rId2"/>
-    <p:sldId id="257" r:id="rId3"/>
-    <p:sldId id="258" r:id="rId4"/>
-    <p:sldId id="259" r:id="rId5"/>
-    <p:sldId id="260" r:id="rId6"/>
-    <p:sldId id="261" r:id="rId7"/>
+    <p:sldId id="262" r:id="rId3"/>
+    <p:sldId id="257" r:id="rId4"/>
+    <p:sldId id="258" r:id="rId5"/>
+    <p:sldId id="259" r:id="rId6"/>
+    <p:sldId id="260" r:id="rId7"/>
+    <p:sldId id="261" r:id="rId8"/>
+    <p:sldId id="263" r:id="rId9"/>
   </p:sldIdLst>
   <p:sldSz cx="9144000" cy="6858000" type="screen4x3"/>
   <p:notesSz cx="6858000" cy="9144000"/>
@@ -293,7 +295,7 @@
           <a:p>
             <a:fld id="{5BBEAD13-0566-4C6C-97E7-55F17F24B09F}" type="datetimeFigureOut">
               <a:rPr lang="zh-TW" altLang="en-US" smtClean="0"/>
-              <a:t>2014/3/16</a:t>
+              <a:t>2014/3/20</a:t>
             </a:fld>
             <a:endParaRPr lang="zh-TW" altLang="en-US"/>
           </a:p>
@@ -458,7 +460,7 @@
           <a:p>
             <a:fld id="{5BBEAD13-0566-4C6C-97E7-55F17F24B09F}" type="datetimeFigureOut">
               <a:rPr lang="zh-TW" altLang="en-US" smtClean="0"/>
-              <a:t>2014/3/16</a:t>
+              <a:t>2014/3/20</a:t>
             </a:fld>
             <a:endParaRPr lang="zh-TW" altLang="en-US"/>
           </a:p>
@@ -633,7 +635,7 @@
           <a:p>
             <a:fld id="{5BBEAD13-0566-4C6C-97E7-55F17F24B09F}" type="datetimeFigureOut">
               <a:rPr lang="zh-TW" altLang="en-US" smtClean="0"/>
-              <a:t>2014/3/16</a:t>
+              <a:t>2014/3/20</a:t>
             </a:fld>
             <a:endParaRPr lang="zh-TW" altLang="en-US"/>
           </a:p>
@@ -798,7 +800,7 @@
           <a:p>
             <a:fld id="{5BBEAD13-0566-4C6C-97E7-55F17F24B09F}" type="datetimeFigureOut">
               <a:rPr lang="zh-TW" altLang="en-US" smtClean="0"/>
-              <a:t>2014/3/16</a:t>
+              <a:t>2014/3/20</a:t>
             </a:fld>
             <a:endParaRPr lang="zh-TW" altLang="en-US"/>
           </a:p>
@@ -1039,7 +1041,7 @@
           <a:p>
             <a:fld id="{5BBEAD13-0566-4C6C-97E7-55F17F24B09F}" type="datetimeFigureOut">
               <a:rPr lang="zh-TW" altLang="en-US" smtClean="0"/>
-              <a:t>2014/3/16</a:t>
+              <a:t>2014/3/20</a:t>
             </a:fld>
             <a:endParaRPr lang="zh-TW" altLang="en-US"/>
           </a:p>
@@ -1322,7 +1324,7 @@
           <a:p>
             <a:fld id="{5BBEAD13-0566-4C6C-97E7-55F17F24B09F}" type="datetimeFigureOut">
               <a:rPr lang="zh-TW" altLang="en-US" smtClean="0"/>
-              <a:t>2014/3/16</a:t>
+              <a:t>2014/3/20</a:t>
             </a:fld>
             <a:endParaRPr lang="zh-TW" altLang="en-US"/>
           </a:p>
@@ -1739,7 +1741,7 @@
           <a:p>
             <a:fld id="{5BBEAD13-0566-4C6C-97E7-55F17F24B09F}" type="datetimeFigureOut">
               <a:rPr lang="zh-TW" altLang="en-US" smtClean="0"/>
-              <a:t>2014/3/16</a:t>
+              <a:t>2014/3/20</a:t>
             </a:fld>
             <a:endParaRPr lang="zh-TW" altLang="en-US"/>
           </a:p>
@@ -1852,7 +1854,7 @@
           <a:p>
             <a:fld id="{5BBEAD13-0566-4C6C-97E7-55F17F24B09F}" type="datetimeFigureOut">
               <a:rPr lang="zh-TW" altLang="en-US" smtClean="0"/>
-              <a:t>2014/3/16</a:t>
+              <a:t>2014/3/20</a:t>
             </a:fld>
             <a:endParaRPr lang="zh-TW" altLang="en-US"/>
           </a:p>
@@ -1942,7 +1944,7 @@
           <a:p>
             <a:fld id="{5BBEAD13-0566-4C6C-97E7-55F17F24B09F}" type="datetimeFigureOut">
               <a:rPr lang="zh-TW" altLang="en-US" smtClean="0"/>
-              <a:t>2014/3/16</a:t>
+              <a:t>2014/3/20</a:t>
             </a:fld>
             <a:endParaRPr lang="zh-TW" altLang="en-US"/>
           </a:p>
@@ -2214,7 +2216,7 @@
           <a:p>
             <a:fld id="{5BBEAD13-0566-4C6C-97E7-55F17F24B09F}" type="datetimeFigureOut">
               <a:rPr lang="zh-TW" altLang="en-US" smtClean="0"/>
-              <a:t>2014/3/16</a:t>
+              <a:t>2014/3/20</a:t>
             </a:fld>
             <a:endParaRPr lang="zh-TW" altLang="en-US"/>
           </a:p>
@@ -2462,7 +2464,7 @@
           <a:p>
             <a:fld id="{5BBEAD13-0566-4C6C-97E7-55F17F24B09F}" type="datetimeFigureOut">
               <a:rPr lang="zh-TW" altLang="en-US" smtClean="0"/>
-              <a:t>2014/3/16</a:t>
+              <a:t>2014/3/20</a:t>
             </a:fld>
             <a:endParaRPr lang="zh-TW" altLang="en-US"/>
           </a:p>
@@ -2670,7 +2672,7 @@
           <a:p>
             <a:fld id="{5BBEAD13-0566-4C6C-97E7-55F17F24B09F}" type="datetimeFigureOut">
               <a:rPr lang="zh-TW" altLang="en-US" smtClean="0"/>
-              <a:t>2014/3/16</a:t>
+              <a:t>2014/3/20</a:t>
             </a:fld>
             <a:endParaRPr lang="zh-TW" altLang="en-US"/>
           </a:p>
@@ -3137,6 +3139,205 @@
       </p:grpSpPr>
       <p:sp>
         <p:nvSpPr>
+          <p:cNvPr id="2" name="標題 1"/>
+          <p:cNvSpPr>
+            <a:spLocks noGrp="1"/>
+          </p:cNvSpPr>
+          <p:nvPr>
+            <p:ph type="title"/>
+          </p:nvPr>
+        </p:nvSpPr>
+        <p:spPr/>
+        <p:txBody>
+          <a:bodyPr>
+            <a:normAutofit/>
+          </a:bodyPr>
+          <a:lstStyle/>
+          <a:p>
+            <a:r>
+              <a:rPr lang="en-US" altLang="zh-TW" sz="3200" b="1" dirty="0" smtClean="0"/>
+              <a:t>Crawler4j 3.5</a:t>
+            </a:r>
+            <a:endParaRPr lang="zh-TW" altLang="en-US" sz="3200" dirty="0"/>
+          </a:p>
+        </p:txBody>
+      </p:sp>
+      <p:sp>
+        <p:nvSpPr>
+          <p:cNvPr id="3" name="內容版面配置區 2"/>
+          <p:cNvSpPr>
+            <a:spLocks noGrp="1"/>
+          </p:cNvSpPr>
+          <p:nvPr>
+            <p:ph idx="1"/>
+          </p:nvPr>
+        </p:nvSpPr>
+        <p:spPr>
+          <a:xfrm>
+            <a:off x="457200" y="1412776"/>
+            <a:ext cx="8686800" cy="5256584"/>
+          </a:xfrm>
+        </p:spPr>
+        <p:txBody>
+          <a:bodyPr>
+            <a:normAutofit/>
+          </a:bodyPr>
+          <a:lstStyle/>
+          <a:p>
+            <a:r>
+              <a:rPr lang="en-US" altLang="zh-TW" sz="1800" b="1" dirty="0">
+                <a:hlinkClick r:id="rId2"/>
+              </a:rPr>
+              <a:t>Crawler4j</a:t>
+            </a:r>
+            <a:r>
+              <a:rPr lang="en-US" altLang="zh-TW" sz="1800" dirty="0"/>
+              <a:t> is an open source Java crawler which provides a simple interface for crawling the Web. You can setup a multi-threaded web crawler in 5 </a:t>
+            </a:r>
+            <a:r>
+              <a:rPr lang="en-US" altLang="zh-TW" sz="1800" dirty="0" smtClean="0"/>
+              <a:t>minutes!</a:t>
+            </a:r>
+          </a:p>
+          <a:p>
+            <a:r>
+              <a:rPr lang="en-US" altLang="zh-TW" sz="1600" dirty="0" smtClean="0"/>
+              <a:t>Original Source code can be retrieved via </a:t>
+            </a:r>
+            <a:r>
+              <a:rPr lang="en-US" altLang="zh-TW" sz="1600" dirty="0" err="1" smtClean="0"/>
+              <a:t>Git</a:t>
+            </a:r>
+            <a:r>
+              <a:rPr lang="en-US" altLang="zh-TW" sz="1600" dirty="0" smtClean="0"/>
+              <a:t>: </a:t>
+            </a:r>
+            <a:r>
+              <a:rPr lang="en-US" altLang="zh-TW" sz="1600" dirty="0" err="1">
+                <a:solidFill>
+                  <a:srgbClr val="0070C0"/>
+                </a:solidFill>
+              </a:rPr>
+              <a:t>git</a:t>
+            </a:r>
+            <a:r>
+              <a:rPr lang="en-US" altLang="zh-TW" sz="1600" dirty="0">
+                <a:solidFill>
+                  <a:srgbClr val="0070C0"/>
+                </a:solidFill>
+              </a:rPr>
+              <a:t> clone https://code.google.com/p/crawler4j/</a:t>
+            </a:r>
+          </a:p>
+          <a:p>
+            <a:r>
+              <a:rPr lang="en-US" altLang="zh-TW" sz="1600" dirty="0" smtClean="0"/>
+              <a:t>I have enhanced part of it and upload to </a:t>
+            </a:r>
+            <a:r>
+              <a:rPr lang="en-US" altLang="zh-TW" sz="1600" b="1" dirty="0" err="1" smtClean="0">
+                <a:hlinkClick r:id="rId3"/>
+              </a:rPr>
+              <a:t>Github</a:t>
+            </a:r>
+            <a:r>
+              <a:rPr lang="en-US" altLang="zh-TW" sz="1600" dirty="0"/>
+              <a:t>: </a:t>
+            </a:r>
+            <a:r>
+              <a:rPr lang="en-US" altLang="zh-TW" sz="1600" dirty="0">
+                <a:hlinkClick r:id="rId4"/>
+              </a:rPr>
+              <a:t>https://</a:t>
+            </a:r>
+            <a:r>
+              <a:rPr lang="en-US" altLang="zh-TW" sz="1600" dirty="0" smtClean="0">
+                <a:hlinkClick r:id="rId4"/>
+              </a:rPr>
+              <a:t>github.com/johnklee/sd2014.git</a:t>
+            </a:r>
+            <a:endParaRPr lang="en-US" altLang="zh-TW" sz="1600" dirty="0" smtClean="0"/>
+          </a:p>
+          <a:p>
+            <a:pPr lvl="1"/>
+            <a:r>
+              <a:rPr lang="en-US" altLang="zh-TW" sz="1600" dirty="0" smtClean="0"/>
+              <a:t>Support &lt;script </a:t>
+            </a:r>
+            <a:r>
+              <a:rPr lang="en-US" altLang="zh-TW" sz="1600" dirty="0" err="1" smtClean="0"/>
+              <a:t>src</a:t>
+            </a:r>
+            <a:r>
+              <a:rPr lang="en-US" altLang="zh-TW" sz="1600" dirty="0" smtClean="0"/>
+              <a:t>=‘…’&gt;&lt;/script&gt; tag. </a:t>
+            </a:r>
+          </a:p>
+          <a:p>
+            <a:pPr lvl="1"/>
+            <a:r>
+              <a:rPr lang="en-US" altLang="zh-TW" sz="1600" dirty="0"/>
+              <a:t>Read “</a:t>
+            </a:r>
+            <a:r>
+              <a:rPr lang="en-US" altLang="zh-TW" sz="1600" dirty="0" smtClean="0"/>
+              <a:t>tld-names.txt” outside the jar space.</a:t>
+            </a:r>
+          </a:p>
+          <a:p>
+            <a:pPr marL="457200" lvl="1" indent="0">
+              <a:buNone/>
+            </a:pPr>
+            <a:r>
+              <a:rPr lang="en-US" altLang="zh-TW" sz="1200" dirty="0"/>
+              <a:t/>
+            </a:r>
+            <a:br>
+              <a:rPr lang="en-US" altLang="zh-TW" sz="1200" dirty="0"/>
+            </a:br>
+            <a:endParaRPr lang="zh-TW" altLang="en-US" sz="1200" dirty="0"/>
+          </a:p>
+        </p:txBody>
+      </p:sp>
+    </p:spTree>
+    <p:extLst>
+      <p:ext uri="{BB962C8B-B14F-4D97-AF65-F5344CB8AC3E}">
+        <p14:creationId xmlns:p14="http://schemas.microsoft.com/office/powerpoint/2010/main" val="2555254221"/>
+      </p:ext>
+    </p:extLst>
+  </p:cSld>
+  <p:clrMapOvr>
+    <a:masterClrMapping/>
+  </p:clrMapOvr>
+  <p:timing>
+    <p:tnLst>
+      <p:par>
+        <p:cTn id="1" dur="indefinite" restart="never" nodeType="tmRoot"/>
+      </p:par>
+    </p:tnLst>
+  </p:timing>
+</p:sld>
+</file>
+
+<file path=ppt/slides/slide3.xml><?xml version="1.0" encoding="utf-8"?>
+<p:sld xmlns:a="http://schemas.openxmlformats.org/drawingml/2006/main" xmlns:r="http://schemas.openxmlformats.org/officeDocument/2006/relationships" xmlns:p="http://schemas.openxmlformats.org/presentationml/2006/main">
+  <p:cSld>
+    <p:spTree>
+      <p:nvGrpSpPr>
+        <p:cNvPr id="1" name=""/>
+        <p:cNvGrpSpPr/>
+        <p:nvPr/>
+      </p:nvGrpSpPr>
+      <p:grpSpPr>
+        <a:xfrm>
+          <a:off x="0" y="0"/>
+          <a:ext cx="0" cy="0"/>
+          <a:chOff x="0" y="0"/>
+          <a:chExt cx="0" cy="0"/>
+        </a:xfrm>
+      </p:grpSpPr>
+      <p:sp>
+        <p:nvSpPr>
           <p:cNvPr id="3" name="內容版面配置區 2"/>
           <p:cNvSpPr>
             <a:spLocks noGrp="1"/>
@@ -3159,15 +3360,7 @@
           <a:p>
             <a:r>
               <a:rPr lang="en-US" altLang="zh-TW" sz="1800" dirty="0" smtClean="0"/>
-              <a:t>In the beginning, let’s </a:t>
-            </a:r>
-            <a:r>
-              <a:rPr lang="en-US" altLang="zh-TW" sz="1800" dirty="0" smtClean="0"/>
-              <a:t>check the </a:t>
-            </a:r>
-            <a:r>
-              <a:rPr lang="en-US" altLang="zh-TW" sz="1800" dirty="0" smtClean="0"/>
-              <a:t>class diagram of what we will use later:</a:t>
+              <a:t>In the beginning, let’s check the class diagram of what we will use later:</a:t>
             </a:r>
             <a:endParaRPr lang="zh-TW" altLang="en-US" sz="1800" dirty="0"/>
           </a:p>
@@ -4289,11 +4482,6 @@
                 </a:rPr>
                 <a:t>Anchor text</a:t>
               </a:r>
-              <a:endParaRPr lang="en-US" altLang="zh-TW" dirty="0">
-                <a:solidFill>
-                  <a:schemeClr val="tx1"/>
-                </a:solidFill>
-              </a:endParaRPr>
             </a:p>
             <a:p>
               <a:r>
@@ -4770,7 +4958,7 @@
 </p:sld>
 </file>
 
-<file path=ppt/slides/slide3.xml><?xml version="1.0" encoding="utf-8"?>
+<file path=ppt/slides/slide4.xml><?xml version="1.0" encoding="utf-8"?>
 <p:sld xmlns:a="http://schemas.openxmlformats.org/drawingml/2006/main" xmlns:r="http://schemas.openxmlformats.org/officeDocument/2006/relationships" xmlns:p="http://schemas.openxmlformats.org/presentationml/2006/main">
   <p:cSld>
     <p:spTree>
@@ -4836,11 +5024,7 @@
           <a:p>
             <a:r>
               <a:rPr lang="en-US" altLang="zh-TW" sz="1800" dirty="0" smtClean="0"/>
-              <a:t>Now is time to know how to use crawler4j. </a:t>
-            </a:r>
-            <a:r>
-              <a:rPr lang="en-US" altLang="zh-TW" sz="1800" dirty="0" smtClean="0"/>
-              <a:t>Actually, it is quite simple. Just only 4 steps is needed:</a:t>
+              <a:t>Now is time to know how to use crawler4j. Actually, it is quite simple. Just only 4 steps is needed:</a:t>
             </a:r>
           </a:p>
           <a:p>
@@ -5126,11 +5310,7 @@
             </a:r>
             <a:r>
               <a:rPr lang="en-US" altLang="zh-TW" sz="1600" b="1" dirty="0" err="1" smtClean="0"/>
-              <a:t>API:</a:t>
-            </a:r>
-            <a:r>
-              <a:rPr lang="en-US" altLang="zh-TW" sz="1600" b="1" dirty="0" err="1" smtClean="0"/>
-              <a:t>addSeed</a:t>
+              <a:t>API:addSeed</a:t>
             </a:r>
             <a:r>
               <a:rPr lang="en-US" altLang="zh-TW" sz="1600" b="1" dirty="0" smtClean="0"/>
@@ -5198,7 +5378,7 @@
 </p:sld>
 </file>
 
-<file path=ppt/slides/slide4.xml><?xml version="1.0" encoding="utf-8"?>
+<file path=ppt/slides/slide5.xml><?xml version="1.0" encoding="utf-8"?>
 <p:sld xmlns:a="http://schemas.openxmlformats.org/drawingml/2006/main" xmlns:r="http://schemas.openxmlformats.org/officeDocument/2006/relationships" xmlns:p="http://schemas.openxmlformats.org/presentationml/2006/main">
   <p:cSld>
     <p:spTree>
@@ -6181,7 +6361,7 @@
 </p:sld>
 </file>
 
-<file path=ppt/slides/slide5.xml><?xml version="1.0" encoding="utf-8"?>
+<file path=ppt/slides/slide6.xml><?xml version="1.0" encoding="utf-8"?>
 <p:sld xmlns:a="http://schemas.openxmlformats.org/drawingml/2006/main" xmlns:r="http://schemas.openxmlformats.org/officeDocument/2006/relationships" xmlns:p="http://schemas.openxmlformats.org/presentationml/2006/main">
   <p:cSld>
     <p:spTree>
@@ -7226,7 +7406,7 @@
 </p:sld>
 </file>
 
-<file path=ppt/slides/slide6.xml><?xml version="1.0" encoding="utf-8"?>
+<file path=ppt/slides/slide7.xml><?xml version="1.0" encoding="utf-8"?>
 <p:sld xmlns:a="http://schemas.openxmlformats.org/drawingml/2006/main" xmlns:r="http://schemas.openxmlformats.org/officeDocument/2006/relationships" xmlns:p="http://schemas.openxmlformats.org/presentationml/2006/main">
   <p:cSld>
     <p:spTree>
@@ -7643,6 +7823,114 @@
 </p:sld>
 </file>
 
+<file path=ppt/slides/slide8.xml><?xml version="1.0" encoding="utf-8"?>
+<p:sld xmlns:a="http://schemas.openxmlformats.org/drawingml/2006/main" xmlns:r="http://schemas.openxmlformats.org/officeDocument/2006/relationships" xmlns:p="http://schemas.openxmlformats.org/presentationml/2006/main">
+  <p:cSld>
+    <p:spTree>
+      <p:nvGrpSpPr>
+        <p:cNvPr id="1" name=""/>
+        <p:cNvGrpSpPr/>
+        <p:nvPr/>
+      </p:nvGrpSpPr>
+      <p:grpSpPr>
+        <a:xfrm>
+          <a:off x="0" y="0"/>
+          <a:ext cx="0" cy="0"/>
+          <a:chOff x="0" y="0"/>
+          <a:chExt cx="0" cy="0"/>
+        </a:xfrm>
+      </p:grpSpPr>
+      <p:sp>
+        <p:nvSpPr>
+          <p:cNvPr id="2" name="標題 1"/>
+          <p:cNvSpPr>
+            <a:spLocks noGrp="1"/>
+          </p:cNvSpPr>
+          <p:nvPr>
+            <p:ph type="title"/>
+          </p:nvPr>
+        </p:nvSpPr>
+        <p:spPr/>
+        <p:txBody>
+          <a:bodyPr>
+            <a:normAutofit/>
+          </a:bodyPr>
+          <a:lstStyle/>
+          <a:p>
+            <a:r>
+              <a:rPr lang="en-US" altLang="zh-TW" sz="3200" b="1" dirty="0" smtClean="0"/>
+              <a:t>Next Week To Do</a:t>
+            </a:r>
+            <a:endParaRPr lang="zh-TW" altLang="en-US" sz="3200" dirty="0"/>
+          </a:p>
+        </p:txBody>
+      </p:sp>
+      <p:sp>
+        <p:nvSpPr>
+          <p:cNvPr id="3" name="內容版面配置區 2"/>
+          <p:cNvSpPr>
+            <a:spLocks noGrp="1"/>
+          </p:cNvSpPr>
+          <p:nvPr>
+            <p:ph idx="1"/>
+          </p:nvPr>
+        </p:nvSpPr>
+        <p:spPr>
+          <a:xfrm>
+            <a:off x="457200" y="1412776"/>
+            <a:ext cx="8686800" cy="5256584"/>
+          </a:xfrm>
+        </p:spPr>
+        <p:txBody>
+          <a:bodyPr>
+            <a:normAutofit/>
+          </a:bodyPr>
+          <a:lstStyle/>
+          <a:p>
+            <a:r>
+              <a:rPr lang="en-US" altLang="zh-TW" sz="1800" dirty="0" smtClean="0"/>
+              <a:t>Add JUnit Test Cases to make sure the enhancement/original functionalities work.</a:t>
+            </a:r>
+          </a:p>
+          <a:p>
+            <a:r>
+              <a:rPr lang="en-US" altLang="zh-TW" sz="1800" dirty="0" smtClean="0"/>
+              <a:t>Buildup a PoC UI to visualize the crawling result.</a:t>
+            </a:r>
+          </a:p>
+          <a:p>
+            <a:r>
+              <a:rPr lang="en-US" altLang="zh-TW" sz="1800" dirty="0" smtClean="0"/>
+              <a:t>Add more cases for downloading different </a:t>
+            </a:r>
+            <a:r>
+              <a:rPr lang="en-US" altLang="zh-TW" sz="1800" smtClean="0"/>
+              <a:t>file type/mime type.</a:t>
+            </a:r>
+            <a:endParaRPr lang="en-US" altLang="zh-TW" sz="1800" dirty="0" smtClean="0"/>
+          </a:p>
+        </p:txBody>
+      </p:sp>
+    </p:spTree>
+    <p:extLst>
+      <p:ext uri="{BB962C8B-B14F-4D97-AF65-F5344CB8AC3E}">
+        <p14:creationId xmlns:p14="http://schemas.microsoft.com/office/powerpoint/2010/main" val="131659866"/>
+      </p:ext>
+    </p:extLst>
+  </p:cSld>
+  <p:clrMapOvr>
+    <a:masterClrMapping/>
+  </p:clrMapOvr>
+  <p:timing>
+    <p:tnLst>
+      <p:par>
+        <p:cTn id="1" dur="indefinite" restart="never" nodeType="tmRoot"/>
+      </p:par>
+    </p:tnLst>
+  </p:timing>
+</p:sld>
+</file>
+
 <file path=ppt/theme/theme1.xml><?xml version="1.0" encoding="utf-8"?>
 <a:theme xmlns:a="http://schemas.openxmlformats.org/drawingml/2006/main" name="Office 佈景主題">
   <a:themeElements>

</xml_diff>